<commit_message>
Link Notion powerpoint e txt sequencial
</commit_message>
<xml_diff>
--- a/Minicurso webdev.pptx
+++ b/Minicurso webdev.pptx
@@ -10888,7 +10888,7 @@
           <a:p>
             <a:fld id="{614FA48D-C7A6-4B17-A1F9-314489ABC9B6}" type="datetimeFigureOut">
               <a:rPr lang="pt-BR" smtClean="0"/>
-              <a:t>24/10/2022</a:t>
+              <a:t>25/10/2022</a:t>
             </a:fld>
             <a:endParaRPr lang="pt-BR"/>
           </a:p>
@@ -11425,7 +11425,7 @@
           <a:p>
             <a:fld id="{E83299DA-88C4-4232-8624-CCA9FC52552D}" type="datetimeFigureOut">
               <a:rPr lang="pt-BR" smtClean="0"/>
-              <a:t>24/10/2022</a:t>
+              <a:t>25/10/2022</a:t>
             </a:fld>
             <a:endParaRPr lang="pt-BR"/>
           </a:p>
@@ -11703,7 +11703,7 @@
           <a:p>
             <a:fld id="{E83299DA-88C4-4232-8624-CCA9FC52552D}" type="datetimeFigureOut">
               <a:rPr lang="pt-BR" smtClean="0"/>
-              <a:t>24/10/2022</a:t>
+              <a:t>25/10/2022</a:t>
             </a:fld>
             <a:endParaRPr lang="pt-BR"/>
           </a:p>
@@ -11900,7 +11900,7 @@
           <a:p>
             <a:fld id="{E83299DA-88C4-4232-8624-CCA9FC52552D}" type="datetimeFigureOut">
               <a:rPr lang="pt-BR" smtClean="0"/>
-              <a:t>24/10/2022</a:t>
+              <a:t>25/10/2022</a:t>
             </a:fld>
             <a:endParaRPr lang="pt-BR"/>
           </a:p>
@@ -12176,7 +12176,7 @@
           <a:p>
             <a:fld id="{E83299DA-88C4-4232-8624-CCA9FC52552D}" type="datetimeFigureOut">
               <a:rPr lang="pt-BR" smtClean="0"/>
-              <a:t>24/10/2022</a:t>
+              <a:t>25/10/2022</a:t>
             </a:fld>
             <a:endParaRPr lang="pt-BR"/>
           </a:p>
@@ -12520,7 +12520,7 @@
           <a:p>
             <a:fld id="{E83299DA-88C4-4232-8624-CCA9FC52552D}" type="datetimeFigureOut">
               <a:rPr lang="pt-BR" smtClean="0"/>
-              <a:t>24/10/2022</a:t>
+              <a:t>25/10/2022</a:t>
             </a:fld>
             <a:endParaRPr lang="pt-BR"/>
           </a:p>
@@ -13146,7 +13146,7 @@
           <a:p>
             <a:fld id="{E83299DA-88C4-4232-8624-CCA9FC52552D}" type="datetimeFigureOut">
               <a:rPr lang="pt-BR" smtClean="0"/>
-              <a:t>24/10/2022</a:t>
+              <a:t>25/10/2022</a:t>
             </a:fld>
             <a:endParaRPr lang="pt-BR"/>
           </a:p>
@@ -14009,7 +14009,7 @@
           <a:p>
             <a:fld id="{E83299DA-88C4-4232-8624-CCA9FC52552D}" type="datetimeFigureOut">
               <a:rPr lang="pt-BR" smtClean="0"/>
-              <a:t>24/10/2022</a:t>
+              <a:t>25/10/2022</a:t>
             </a:fld>
             <a:endParaRPr lang="pt-BR"/>
           </a:p>
@@ -14182,7 +14182,7 @@
           <a:p>
             <a:fld id="{E83299DA-88C4-4232-8624-CCA9FC52552D}" type="datetimeFigureOut">
               <a:rPr lang="pt-BR" smtClean="0"/>
-              <a:t>24/10/2022</a:t>
+              <a:t>25/10/2022</a:t>
             </a:fld>
             <a:endParaRPr lang="pt-BR"/>
           </a:p>
@@ -14365,7 +14365,7 @@
           <a:p>
             <a:fld id="{E83299DA-88C4-4232-8624-CCA9FC52552D}" type="datetimeFigureOut">
               <a:rPr lang="pt-BR" smtClean="0"/>
-              <a:t>24/10/2022</a:t>
+              <a:t>25/10/2022</a:t>
             </a:fld>
             <a:endParaRPr lang="pt-BR"/>
           </a:p>
@@ -14538,7 +14538,7 @@
           <a:p>
             <a:fld id="{E83299DA-88C4-4232-8624-CCA9FC52552D}" type="datetimeFigureOut">
               <a:rPr lang="pt-BR" smtClean="0"/>
-              <a:t>24/10/2022</a:t>
+              <a:t>25/10/2022</a:t>
             </a:fld>
             <a:endParaRPr lang="pt-BR"/>
           </a:p>
@@ -14788,7 +14788,7 @@
           <a:p>
             <a:fld id="{E83299DA-88C4-4232-8624-CCA9FC52552D}" type="datetimeFigureOut">
               <a:rPr lang="pt-BR" smtClean="0"/>
-              <a:t>24/10/2022</a:t>
+              <a:t>25/10/2022</a:t>
             </a:fld>
             <a:endParaRPr lang="pt-BR"/>
           </a:p>
@@ -15083,7 +15083,7 @@
           <a:p>
             <a:fld id="{E83299DA-88C4-4232-8624-CCA9FC52552D}" type="datetimeFigureOut">
               <a:rPr lang="pt-BR" smtClean="0"/>
-              <a:t>24/10/2022</a:t>
+              <a:t>25/10/2022</a:t>
             </a:fld>
             <a:endParaRPr lang="pt-BR"/>
           </a:p>
@@ -15530,7 +15530,7 @@
           <a:p>
             <a:fld id="{E83299DA-88C4-4232-8624-CCA9FC52552D}" type="datetimeFigureOut">
               <a:rPr lang="pt-BR" smtClean="0"/>
-              <a:t>24/10/2022</a:t>
+              <a:t>25/10/2022</a:t>
             </a:fld>
             <a:endParaRPr lang="pt-BR"/>
           </a:p>
@@ -15651,7 +15651,7 @@
           <a:p>
             <a:fld id="{E83299DA-88C4-4232-8624-CCA9FC52552D}" type="datetimeFigureOut">
               <a:rPr lang="pt-BR" smtClean="0"/>
-              <a:t>24/10/2022</a:t>
+              <a:t>25/10/2022</a:t>
             </a:fld>
             <a:endParaRPr lang="pt-BR"/>
           </a:p>
@@ -15749,7 +15749,7 @@
           <a:p>
             <a:fld id="{E83299DA-88C4-4232-8624-CCA9FC52552D}" type="datetimeFigureOut">
               <a:rPr lang="pt-BR" smtClean="0"/>
-              <a:t>24/10/2022</a:t>
+              <a:t>25/10/2022</a:t>
             </a:fld>
             <a:endParaRPr lang="pt-BR"/>
           </a:p>
@@ -16031,7 +16031,7 @@
           <a:p>
             <a:fld id="{E83299DA-88C4-4232-8624-CCA9FC52552D}" type="datetimeFigureOut">
               <a:rPr lang="pt-BR" smtClean="0"/>
-              <a:t>24/10/2022</a:t>
+              <a:t>25/10/2022</a:t>
             </a:fld>
             <a:endParaRPr lang="pt-BR"/>
           </a:p>
@@ -16309,7 +16309,7 @@
           <a:p>
             <a:fld id="{E83299DA-88C4-4232-8624-CCA9FC52552D}" type="datetimeFigureOut">
               <a:rPr lang="pt-BR" smtClean="0"/>
-              <a:t>24/10/2022</a:t>
+              <a:t>25/10/2022</a:t>
             </a:fld>
             <a:endParaRPr lang="pt-BR"/>
           </a:p>
@@ -16741,7 +16741,7 @@
           <a:p>
             <a:fld id="{E83299DA-88C4-4232-8624-CCA9FC52552D}" type="datetimeFigureOut">
               <a:rPr lang="pt-BR" smtClean="0"/>
-              <a:t>24/10/2022</a:t>
+              <a:t>25/10/2022</a:t>
             </a:fld>
             <a:endParaRPr lang="pt-BR"/>
           </a:p>
@@ -17309,7 +17309,7 @@
                 <a16:creationId xmlns:a16="http://schemas.microsoft.com/office/drawing/2014/main" id="{DE27238C-8EAF-4098-86E6-7723B7DAE601}"/>
               </a:ext>
               <a:ext uri="{C183D7F6-B498-43B3-948B-1728B52AA6E4}">
-                <adec:decorative xmlns="" xmlns:adec="http://schemas.microsoft.com/office/drawing/2017/decorative" val="1"/>
+                <adec:decorative xmlns:adec="http://schemas.microsoft.com/office/drawing/2017/decorative" xmlns="" val="1"/>
               </a:ext>
             </a:extLst>
           </p:cNvPr>
@@ -17372,7 +17372,7 @@
                 <a16:creationId xmlns:a16="http://schemas.microsoft.com/office/drawing/2014/main" id="{992F97B1-1891-4FCC-9E5F-BA97EDB48F89}"/>
               </a:ext>
               <a:ext uri="{C183D7F6-B498-43B3-948B-1728B52AA6E4}">
-                <adec:decorative xmlns="" xmlns:adec="http://schemas.microsoft.com/office/drawing/2017/decorative" val="1"/>
+                <adec:decorative xmlns:adec="http://schemas.microsoft.com/office/drawing/2017/decorative" xmlns="" val="1"/>
               </a:ext>
             </a:extLst>
           </p:cNvPr>
@@ -17726,7 +17726,7 @@
                 <a16:creationId xmlns:a16="http://schemas.microsoft.com/office/drawing/2014/main" id="{78C6C821-FEE1-4EB6-9590-C021440C77DE}"/>
               </a:ext>
               <a:ext uri="{C183D7F6-B498-43B3-948B-1728B52AA6E4}">
-                <adec:decorative xmlns="" xmlns:adec="http://schemas.microsoft.com/office/drawing/2017/decorative" val="1"/>
+                <adec:decorative xmlns:adec="http://schemas.microsoft.com/office/drawing/2017/decorative" xmlns="" val="1"/>
               </a:ext>
             </a:extLst>
           </p:cNvPr>
@@ -18310,7 +18310,7 @@
                 <a16:creationId xmlns:a16="http://schemas.microsoft.com/office/drawing/2014/main" id="{B61A74B3-E247-44D4-8C48-FAE8E2056401}"/>
               </a:ext>
               <a:ext uri="{C183D7F6-B498-43B3-948B-1728B52AA6E4}">
-                <adec:decorative xmlns="" xmlns:adec="http://schemas.microsoft.com/office/drawing/2017/decorative" val="1"/>
+                <adec:decorative xmlns:adec="http://schemas.microsoft.com/office/drawing/2017/decorative" xmlns="" val="1"/>
               </a:ext>
             </a:extLst>
           </p:cNvPr>
@@ -18632,7 +18632,7 @@
                 <a16:creationId xmlns:a16="http://schemas.microsoft.com/office/drawing/2014/main" id="{0D9B8FD4-CDEB-4EB4-B4DE-C89E11938958}"/>
               </a:ext>
               <a:ext uri="{C183D7F6-B498-43B3-948B-1728B52AA6E4}">
-                <adec:decorative xmlns="" xmlns:adec="http://schemas.microsoft.com/office/drawing/2017/decorative" val="1"/>
+                <adec:decorative xmlns:adec="http://schemas.microsoft.com/office/drawing/2017/decorative" xmlns="" val="1"/>
               </a:ext>
             </a:extLst>
           </p:cNvPr>
@@ -18692,7 +18692,7 @@
                 <a16:creationId xmlns:a16="http://schemas.microsoft.com/office/drawing/2014/main" id="{5A2E3D1D-9E9F-4739-BA14-D4D7FA9FBDD1}"/>
               </a:ext>
               <a:ext uri="{C183D7F6-B498-43B3-948B-1728B52AA6E4}">
-                <adec:decorative xmlns="" xmlns:adec="http://schemas.microsoft.com/office/drawing/2017/decorative" val="1"/>
+                <adec:decorative xmlns:adec="http://schemas.microsoft.com/office/drawing/2017/decorative" xmlns="" val="1"/>
               </a:ext>
             </a:extLst>
           </p:cNvPr>
@@ -19044,7 +19044,7 @@
                 <a16:creationId xmlns:a16="http://schemas.microsoft.com/office/drawing/2014/main" id="{1FFB365B-E9DC-4859-B8AB-CB83EEBE4E28}"/>
               </a:ext>
               <a:ext uri="{C183D7F6-B498-43B3-948B-1728B52AA6E4}">
-                <adec:decorative xmlns="" xmlns:adec="http://schemas.microsoft.com/office/drawing/2017/decorative" val="1"/>
+                <adec:decorative xmlns:adec="http://schemas.microsoft.com/office/drawing/2017/decorative" xmlns="" val="1"/>
               </a:ext>
             </a:extLst>
           </p:cNvPr>
@@ -19534,7 +19534,7 @@
                 <a16:creationId xmlns:a16="http://schemas.microsoft.com/office/drawing/2014/main" id="{8ADAB9C8-EB37-4914-A699-C716FC8FE4FE}"/>
               </a:ext>
               <a:ext uri="{C183D7F6-B498-43B3-948B-1728B52AA6E4}">
-                <adec:decorative xmlns="" xmlns:adec="http://schemas.microsoft.com/office/drawing/2017/decorative" val="1"/>
+                <adec:decorative xmlns:adec="http://schemas.microsoft.com/office/drawing/2017/decorative" xmlns="" val="1"/>
               </a:ext>
             </a:extLst>
           </p:cNvPr>
@@ -19973,7 +19973,7 @@
                 <a16:creationId xmlns:a16="http://schemas.microsoft.com/office/drawing/2014/main" id="{0D9B8FD4-CDEB-4EB4-B4DE-C89E11938958}"/>
               </a:ext>
               <a:ext uri="{C183D7F6-B498-43B3-948B-1728B52AA6E4}">
-                <adec:decorative xmlns="" xmlns:adec="http://schemas.microsoft.com/office/drawing/2017/decorative" val="1"/>
+                <adec:decorative xmlns:adec="http://schemas.microsoft.com/office/drawing/2017/decorative" xmlns="" val="1"/>
               </a:ext>
             </a:extLst>
           </p:cNvPr>
@@ -20033,7 +20033,7 @@
                 <a16:creationId xmlns:a16="http://schemas.microsoft.com/office/drawing/2014/main" id="{5A2E3D1D-9E9F-4739-BA14-D4D7FA9FBDD1}"/>
               </a:ext>
               <a:ext uri="{C183D7F6-B498-43B3-948B-1728B52AA6E4}">
-                <adec:decorative xmlns="" xmlns:adec="http://schemas.microsoft.com/office/drawing/2017/decorative" val="1"/>
+                <adec:decorative xmlns:adec="http://schemas.microsoft.com/office/drawing/2017/decorative" xmlns="" val="1"/>
               </a:ext>
             </a:extLst>
           </p:cNvPr>
@@ -20385,7 +20385,7 @@
                 <a16:creationId xmlns:a16="http://schemas.microsoft.com/office/drawing/2014/main" id="{1FFB365B-E9DC-4859-B8AB-CB83EEBE4E28}"/>
               </a:ext>
               <a:ext uri="{C183D7F6-B498-43B3-948B-1728B52AA6E4}">
-                <adec:decorative xmlns="" xmlns:adec="http://schemas.microsoft.com/office/drawing/2017/decorative" val="1"/>
+                <adec:decorative xmlns:adec="http://schemas.microsoft.com/office/drawing/2017/decorative" xmlns="" val="1"/>
               </a:ext>
             </a:extLst>
           </p:cNvPr>
@@ -20875,7 +20875,7 @@
                 <a16:creationId xmlns:a16="http://schemas.microsoft.com/office/drawing/2014/main" id="{8ADAB9C8-EB37-4914-A699-C716FC8FE4FE}"/>
               </a:ext>
               <a:ext uri="{C183D7F6-B498-43B3-948B-1728B52AA6E4}">
-                <adec:decorative xmlns="" xmlns:adec="http://schemas.microsoft.com/office/drawing/2017/decorative" val="1"/>
+                <adec:decorative xmlns:adec="http://schemas.microsoft.com/office/drawing/2017/decorative" xmlns="" val="1"/>
               </a:ext>
             </a:extLst>
           </p:cNvPr>
@@ -21355,7 +21355,7 @@
                 <a16:creationId xmlns:a16="http://schemas.microsoft.com/office/drawing/2014/main" id="{41B68C77-138E-4BF7-A276-BD0C78A4219F}"/>
               </a:ext>
               <a:ext uri="{C183D7F6-B498-43B3-948B-1728B52AA6E4}">
-                <adec:decorative xmlns="" xmlns:adec="http://schemas.microsoft.com/office/drawing/2017/decorative" val="1"/>
+                <adec:decorative xmlns:adec="http://schemas.microsoft.com/office/drawing/2017/decorative" xmlns="" val="1"/>
               </a:ext>
             </a:extLst>
           </p:cNvPr>
@@ -21399,7 +21399,7 @@
                 <a16:creationId xmlns:a16="http://schemas.microsoft.com/office/drawing/2014/main" id="{7C268552-D473-46ED-B1B8-422042C4DEF1}"/>
               </a:ext>
               <a:ext uri="{C183D7F6-B498-43B3-948B-1728B52AA6E4}">
-                <adec:decorative xmlns="" xmlns:adec="http://schemas.microsoft.com/office/drawing/2017/decorative" val="1"/>
+                <adec:decorative xmlns:adec="http://schemas.microsoft.com/office/drawing/2017/decorative" xmlns="" val="1"/>
               </a:ext>
             </a:extLst>
           </p:cNvPr>
@@ -21443,7 +21443,7 @@
                 <a16:creationId xmlns:a16="http://schemas.microsoft.com/office/drawing/2014/main" id="{4AC0CD9D-7610-4620-93B4-798CCD9AB581}"/>
               </a:ext>
               <a:ext uri="{C183D7F6-B498-43B3-948B-1728B52AA6E4}">
-                <adec:decorative xmlns="" xmlns:adec="http://schemas.microsoft.com/office/drawing/2017/decorative" val="1"/>
+                <adec:decorative xmlns:adec="http://schemas.microsoft.com/office/drawing/2017/decorative" xmlns="" val="1"/>
               </a:ext>
             </a:extLst>
           </p:cNvPr>
@@ -21523,7 +21523,7 @@
                 <a16:creationId xmlns:a16="http://schemas.microsoft.com/office/drawing/2014/main" id="{B9238B3E-24AA-439A-B527-6C5DF6D72145}"/>
               </a:ext>
               <a:ext uri="{C183D7F6-B498-43B3-948B-1728B52AA6E4}">
-                <adec:decorative xmlns="" xmlns:adec="http://schemas.microsoft.com/office/drawing/2017/decorative" val="1"/>
+                <adec:decorative xmlns:adec="http://schemas.microsoft.com/office/drawing/2017/decorative" xmlns="" val="1"/>
               </a:ext>
             </a:extLst>
           </p:cNvPr>
@@ -21567,7 +21567,7 @@
                 <a16:creationId xmlns:a16="http://schemas.microsoft.com/office/drawing/2014/main" id="{69F01145-BEA3-4CBF-AA21-10077B948CA8}"/>
               </a:ext>
               <a:ext uri="{C183D7F6-B498-43B3-948B-1728B52AA6E4}">
-                <adec:decorative xmlns="" xmlns:adec="http://schemas.microsoft.com/office/drawing/2017/decorative" val="1"/>
+                <adec:decorative xmlns:adec="http://schemas.microsoft.com/office/drawing/2017/decorative" xmlns="" val="1"/>
               </a:ext>
             </a:extLst>
           </p:cNvPr>
@@ -21611,7 +21611,7 @@
                 <a16:creationId xmlns:a16="http://schemas.microsoft.com/office/drawing/2014/main" id="{DE4D62F9-188E-4530-84C2-24BDEE4BEB82}"/>
               </a:ext>
               <a:ext uri="{C183D7F6-B498-43B3-948B-1728B52AA6E4}">
-                <adec:decorative xmlns="" xmlns:adec="http://schemas.microsoft.com/office/drawing/2017/decorative" val="1"/>
+                <adec:decorative xmlns:adec="http://schemas.microsoft.com/office/drawing/2017/decorative" xmlns="" val="1"/>
               </a:ext>
             </a:extLst>
           </p:cNvPr>
@@ -21664,7 +21664,7 @@
                 <a16:creationId xmlns:a16="http://schemas.microsoft.com/office/drawing/2014/main" id="{757B325C-3E35-45CF-9D07-3BCB281F3B9C}"/>
               </a:ext>
               <a:ext uri="{C183D7F6-B498-43B3-948B-1728B52AA6E4}">
-                <adec:decorative xmlns="" xmlns:adec="http://schemas.microsoft.com/office/drawing/2017/decorative" val="1"/>
+                <adec:decorative xmlns:adec="http://schemas.microsoft.com/office/drawing/2017/decorative" xmlns="" val="1"/>
               </a:ext>
             </a:extLst>
           </p:cNvPr>
@@ -21842,7 +21842,7 @@
                 <a16:creationId xmlns:a16="http://schemas.microsoft.com/office/drawing/2014/main" id="{C24BEC42-AFF3-40D1-93A2-A27A42E1E23C}"/>
               </a:ext>
               <a:ext uri="{C183D7F6-B498-43B3-948B-1728B52AA6E4}">
-                <adec:decorative xmlns="" xmlns:adec="http://schemas.microsoft.com/office/drawing/2017/decorative" val="1"/>
+                <adec:decorative xmlns:adec="http://schemas.microsoft.com/office/drawing/2017/decorative" xmlns="" val="1"/>
               </a:ext>
             </a:extLst>
           </p:cNvPr>
@@ -22194,7 +22194,7 @@
                 <a16:creationId xmlns:a16="http://schemas.microsoft.com/office/drawing/2014/main" id="{608F427C-1EC9-4280-9367-F2B3AA063E82}"/>
               </a:ext>
               <a:ext uri="{C183D7F6-B498-43B3-948B-1728B52AA6E4}">
-                <adec:decorative xmlns="" xmlns:adec="http://schemas.microsoft.com/office/drawing/2017/decorative" val="1"/>
+                <adec:decorative xmlns:adec="http://schemas.microsoft.com/office/drawing/2017/decorative" xmlns="" val="1"/>
               </a:ext>
             </a:extLst>
           </p:cNvPr>
@@ -22683,7 +22683,7 @@
                 <a16:creationId xmlns:a16="http://schemas.microsoft.com/office/drawing/2014/main" id="{F98810A7-E114-447A-A7D6-69B27CFB5650}"/>
               </a:ext>
               <a:ext uri="{C183D7F6-B498-43B3-948B-1728B52AA6E4}">
-                <adec:decorative xmlns="" xmlns:adec="http://schemas.microsoft.com/office/drawing/2017/decorative" val="1"/>
+                <adec:decorative xmlns:adec="http://schemas.microsoft.com/office/drawing/2017/decorative" xmlns="" val="1"/>
               </a:ext>
             </a:extLst>
           </p:cNvPr>
@@ -22832,7 +22832,7 @@
                 <a16:creationId xmlns:a16="http://schemas.microsoft.com/office/drawing/2014/main" id="{DF19BAF3-7E20-4B9D-B544-BABAEEA1FA75}"/>
               </a:ext>
               <a:ext uri="{C183D7F6-B498-43B3-948B-1728B52AA6E4}">
-                <adec:decorative xmlns="" xmlns:adec="http://schemas.microsoft.com/office/drawing/2017/decorative" val="1"/>
+                <adec:decorative xmlns:adec="http://schemas.microsoft.com/office/drawing/2017/decorative" xmlns="" val="1"/>
               </a:ext>
             </a:extLst>
           </p:cNvPr>
@@ -22876,7 +22876,7 @@
                 <a16:creationId xmlns:a16="http://schemas.microsoft.com/office/drawing/2014/main" id="{950648F4-ABCD-4DF0-8641-76CFB2354721}"/>
               </a:ext>
               <a:ext uri="{C183D7F6-B498-43B3-948B-1728B52AA6E4}">
-                <adec:decorative xmlns="" xmlns:adec="http://schemas.microsoft.com/office/drawing/2017/decorative" val="1"/>
+                <adec:decorative xmlns:adec="http://schemas.microsoft.com/office/drawing/2017/decorative" xmlns="" val="1"/>
               </a:ext>
             </a:extLst>
           </p:cNvPr>
@@ -22920,7 +22920,7 @@
                 <a16:creationId xmlns:a16="http://schemas.microsoft.com/office/drawing/2014/main" id="{989BE678-777B-482A-A616-FEDC47B162E5}"/>
               </a:ext>
               <a:ext uri="{C183D7F6-B498-43B3-948B-1728B52AA6E4}">
-                <adec:decorative xmlns="" xmlns:adec="http://schemas.microsoft.com/office/drawing/2017/decorative" val="1"/>
+                <adec:decorative xmlns:adec="http://schemas.microsoft.com/office/drawing/2017/decorative" xmlns="" val="1"/>
               </a:ext>
             </a:extLst>
           </p:cNvPr>
@@ -23000,7 +23000,7 @@
                 <a16:creationId xmlns:a16="http://schemas.microsoft.com/office/drawing/2014/main" id="{CF1EB4BD-9C7E-4AA3-9681-C7EB0DA6250B}"/>
               </a:ext>
               <a:ext uri="{C183D7F6-B498-43B3-948B-1728B52AA6E4}">
-                <adec:decorative xmlns="" xmlns:adec="http://schemas.microsoft.com/office/drawing/2017/decorative" val="1"/>
+                <adec:decorative xmlns:adec="http://schemas.microsoft.com/office/drawing/2017/decorative" xmlns="" val="1"/>
               </a:ext>
             </a:extLst>
           </p:cNvPr>
@@ -23044,7 +23044,7 @@
                 <a16:creationId xmlns:a16="http://schemas.microsoft.com/office/drawing/2014/main" id="{94AAE3AA-3759-4D28-B0EF-575F25A5146C}"/>
               </a:ext>
               <a:ext uri="{C183D7F6-B498-43B3-948B-1728B52AA6E4}">
-                <adec:decorative xmlns="" xmlns:adec="http://schemas.microsoft.com/office/drawing/2017/decorative" val="1"/>
+                <adec:decorative xmlns:adec="http://schemas.microsoft.com/office/drawing/2017/decorative" xmlns="" val="1"/>
               </a:ext>
             </a:extLst>
           </p:cNvPr>
@@ -23088,7 +23088,7 @@
                 <a16:creationId xmlns:a16="http://schemas.microsoft.com/office/drawing/2014/main" id="{D28BE0C3-2102-4820-B88B-A448B1840D14}"/>
               </a:ext>
               <a:ext uri="{C183D7F6-B498-43B3-948B-1728B52AA6E4}">
-                <adec:decorative xmlns="" xmlns:adec="http://schemas.microsoft.com/office/drawing/2017/decorative" val="1"/>
+                <adec:decorative xmlns:adec="http://schemas.microsoft.com/office/drawing/2017/decorative" xmlns="" val="1"/>
               </a:ext>
             </a:extLst>
           </p:cNvPr>
@@ -23141,7 +23141,7 @@
                 <a16:creationId xmlns:a16="http://schemas.microsoft.com/office/drawing/2014/main" id="{F3F4807A-5068-4492-8025-D75F320E908D}"/>
               </a:ext>
               <a:ext uri="{C183D7F6-B498-43B3-948B-1728B52AA6E4}">
-                <adec:decorative xmlns="" xmlns:adec="http://schemas.microsoft.com/office/drawing/2017/decorative" val="1"/>
+                <adec:decorative xmlns:adec="http://schemas.microsoft.com/office/drawing/2017/decorative" xmlns="" val="1"/>
               </a:ext>
             </a:extLst>
           </p:cNvPr>
@@ -23242,7 +23242,7 @@
                 <a16:creationId xmlns:a16="http://schemas.microsoft.com/office/drawing/2014/main" id="{B24996F8-180C-4DCB-8A26-DFA336CDEFBC}"/>
               </a:ext>
               <a:ext uri="{C183D7F6-B498-43B3-948B-1728B52AA6E4}">
-                <adec:decorative xmlns="" xmlns:adec="http://schemas.microsoft.com/office/drawing/2017/decorative" val="1"/>
+                <adec:decorative xmlns:adec="http://schemas.microsoft.com/office/drawing/2017/decorative" xmlns="" val="1"/>
               </a:ext>
             </a:extLst>
           </p:cNvPr>
@@ -23808,7 +23808,7 @@
                 <a16:creationId xmlns:a16="http://schemas.microsoft.com/office/drawing/2014/main" id="{630182B0-3559-41D5-9EBC-0BD86BEDAD09}"/>
               </a:ext>
               <a:ext uri="{C183D7F6-B498-43B3-948B-1728B52AA6E4}">
-                <adec:decorative xmlns="" xmlns:adec="http://schemas.microsoft.com/office/drawing/2017/decorative" val="1"/>
+                <adec:decorative xmlns:adec="http://schemas.microsoft.com/office/drawing/2017/decorative" xmlns="" val="1"/>
               </a:ext>
             </a:extLst>
           </p:cNvPr>
@@ -23918,7 +23918,7 @@
                 <a16:creationId xmlns:a16="http://schemas.microsoft.com/office/drawing/2014/main" id="{0D9B8FD4-CDEB-4EB4-B4DE-C89E11938958}"/>
               </a:ext>
               <a:ext uri="{C183D7F6-B498-43B3-948B-1728B52AA6E4}">
-                <adec:decorative xmlns="" xmlns:adec="http://schemas.microsoft.com/office/drawing/2017/decorative" val="1"/>
+                <adec:decorative xmlns:adec="http://schemas.microsoft.com/office/drawing/2017/decorative" xmlns="" val="1"/>
               </a:ext>
             </a:extLst>
           </p:cNvPr>
@@ -23978,7 +23978,7 @@
                 <a16:creationId xmlns:a16="http://schemas.microsoft.com/office/drawing/2014/main" id="{5A2E3D1D-9E9F-4739-BA14-D4D7FA9FBDD1}"/>
               </a:ext>
               <a:ext uri="{C183D7F6-B498-43B3-948B-1728B52AA6E4}">
-                <adec:decorative xmlns="" xmlns:adec="http://schemas.microsoft.com/office/drawing/2017/decorative" val="1"/>
+                <adec:decorative xmlns:adec="http://schemas.microsoft.com/office/drawing/2017/decorative" xmlns="" val="1"/>
               </a:ext>
             </a:extLst>
           </p:cNvPr>
@@ -24330,7 +24330,7 @@
                 <a16:creationId xmlns:a16="http://schemas.microsoft.com/office/drawing/2014/main" id="{1FFB365B-E9DC-4859-B8AB-CB83EEBE4E28}"/>
               </a:ext>
               <a:ext uri="{C183D7F6-B498-43B3-948B-1728B52AA6E4}">
-                <adec:decorative xmlns="" xmlns:adec="http://schemas.microsoft.com/office/drawing/2017/decorative" val="1"/>
+                <adec:decorative xmlns:adec="http://schemas.microsoft.com/office/drawing/2017/decorative" xmlns="" val="1"/>
               </a:ext>
             </a:extLst>
           </p:cNvPr>
@@ -24820,7 +24820,7 @@
                 <a16:creationId xmlns:a16="http://schemas.microsoft.com/office/drawing/2014/main" id="{8ADAB9C8-EB37-4914-A699-C716FC8FE4FE}"/>
               </a:ext>
               <a:ext uri="{C183D7F6-B498-43B3-948B-1728B52AA6E4}">
-                <adec:decorative xmlns="" xmlns:adec="http://schemas.microsoft.com/office/drawing/2017/decorative" val="1"/>
+                <adec:decorative xmlns:adec="http://schemas.microsoft.com/office/drawing/2017/decorative" xmlns="" val="1"/>
               </a:ext>
             </a:extLst>
           </p:cNvPr>
@@ -25091,7 +25091,7 @@
                 <a16:creationId xmlns:a16="http://schemas.microsoft.com/office/drawing/2014/main" id="{0D9B8FD4-CDEB-4EB4-B4DE-C89E11938958}"/>
               </a:ext>
               <a:ext uri="{C183D7F6-B498-43B3-948B-1728B52AA6E4}">
-                <adec:decorative xmlns="" xmlns:adec="http://schemas.microsoft.com/office/drawing/2017/decorative" val="1"/>
+                <adec:decorative xmlns:adec="http://schemas.microsoft.com/office/drawing/2017/decorative" xmlns="" val="1"/>
               </a:ext>
             </a:extLst>
           </p:cNvPr>
@@ -25151,7 +25151,7 @@
                 <a16:creationId xmlns:a16="http://schemas.microsoft.com/office/drawing/2014/main" id="{5A2E3D1D-9E9F-4739-BA14-D4D7FA9FBDD1}"/>
               </a:ext>
               <a:ext uri="{C183D7F6-B498-43B3-948B-1728B52AA6E4}">
-                <adec:decorative xmlns="" xmlns:adec="http://schemas.microsoft.com/office/drawing/2017/decorative" val="1"/>
+                <adec:decorative xmlns:adec="http://schemas.microsoft.com/office/drawing/2017/decorative" xmlns="" val="1"/>
               </a:ext>
             </a:extLst>
           </p:cNvPr>
@@ -25503,7 +25503,7 @@
                 <a16:creationId xmlns:a16="http://schemas.microsoft.com/office/drawing/2014/main" id="{1FFB365B-E9DC-4859-B8AB-CB83EEBE4E28}"/>
               </a:ext>
               <a:ext uri="{C183D7F6-B498-43B3-948B-1728B52AA6E4}">
-                <adec:decorative xmlns="" xmlns:adec="http://schemas.microsoft.com/office/drawing/2017/decorative" val="1"/>
+                <adec:decorative xmlns:adec="http://schemas.microsoft.com/office/drawing/2017/decorative" xmlns="" val="1"/>
               </a:ext>
             </a:extLst>
           </p:cNvPr>
@@ -25993,7 +25993,7 @@
                 <a16:creationId xmlns:a16="http://schemas.microsoft.com/office/drawing/2014/main" id="{8ADAB9C8-EB37-4914-A699-C716FC8FE4FE}"/>
               </a:ext>
               <a:ext uri="{C183D7F6-B498-43B3-948B-1728B52AA6E4}">
-                <adec:decorative xmlns="" xmlns:adec="http://schemas.microsoft.com/office/drawing/2017/decorative" val="1"/>
+                <adec:decorative xmlns:adec="http://schemas.microsoft.com/office/drawing/2017/decorative" xmlns="" val="1"/>
               </a:ext>
             </a:extLst>
           </p:cNvPr>
@@ -26353,7 +26353,7 @@
                 <a16:creationId xmlns:a16="http://schemas.microsoft.com/office/drawing/2014/main" id="{0D9B8FD4-CDEB-4EB4-B4DE-C89E11938958}"/>
               </a:ext>
               <a:ext uri="{C183D7F6-B498-43B3-948B-1728B52AA6E4}">
-                <adec:decorative xmlns="" xmlns:adec="http://schemas.microsoft.com/office/drawing/2017/decorative" val="1"/>
+                <adec:decorative xmlns:adec="http://schemas.microsoft.com/office/drawing/2017/decorative" xmlns="" val="1"/>
               </a:ext>
             </a:extLst>
           </p:cNvPr>
@@ -26413,7 +26413,7 @@
                 <a16:creationId xmlns:a16="http://schemas.microsoft.com/office/drawing/2014/main" id="{5A2E3D1D-9E9F-4739-BA14-D4D7FA9FBDD1}"/>
               </a:ext>
               <a:ext uri="{C183D7F6-B498-43B3-948B-1728B52AA6E4}">
-                <adec:decorative xmlns="" xmlns:adec="http://schemas.microsoft.com/office/drawing/2017/decorative" val="1"/>
+                <adec:decorative xmlns:adec="http://schemas.microsoft.com/office/drawing/2017/decorative" xmlns="" val="1"/>
               </a:ext>
             </a:extLst>
           </p:cNvPr>
@@ -26765,7 +26765,7 @@
                 <a16:creationId xmlns:a16="http://schemas.microsoft.com/office/drawing/2014/main" id="{1FFB365B-E9DC-4859-B8AB-CB83EEBE4E28}"/>
               </a:ext>
               <a:ext uri="{C183D7F6-B498-43B3-948B-1728B52AA6E4}">
-                <adec:decorative xmlns="" xmlns:adec="http://schemas.microsoft.com/office/drawing/2017/decorative" val="1"/>
+                <adec:decorative xmlns:adec="http://schemas.microsoft.com/office/drawing/2017/decorative" xmlns="" val="1"/>
               </a:ext>
             </a:extLst>
           </p:cNvPr>
@@ -27255,7 +27255,7 @@
                 <a16:creationId xmlns:a16="http://schemas.microsoft.com/office/drawing/2014/main" id="{8ADAB9C8-EB37-4914-A699-C716FC8FE4FE}"/>
               </a:ext>
               <a:ext uri="{C183D7F6-B498-43B3-948B-1728B52AA6E4}">
-                <adec:decorative xmlns="" xmlns:adec="http://schemas.microsoft.com/office/drawing/2017/decorative" val="1"/>
+                <adec:decorative xmlns:adec="http://schemas.microsoft.com/office/drawing/2017/decorative" xmlns="" val="1"/>
               </a:ext>
             </a:extLst>
           </p:cNvPr>
@@ -27535,7 +27535,7 @@
                 <a16:creationId xmlns:a16="http://schemas.microsoft.com/office/drawing/2014/main" id="{0D9B8FD4-CDEB-4EB4-B4DE-C89E11938958}"/>
               </a:ext>
               <a:ext uri="{C183D7F6-B498-43B3-948B-1728B52AA6E4}">
-                <adec:decorative xmlns="" xmlns:adec="http://schemas.microsoft.com/office/drawing/2017/decorative" val="1"/>
+                <adec:decorative xmlns:adec="http://schemas.microsoft.com/office/drawing/2017/decorative" xmlns="" val="1"/>
               </a:ext>
             </a:extLst>
           </p:cNvPr>
@@ -27595,7 +27595,7 @@
                 <a16:creationId xmlns:a16="http://schemas.microsoft.com/office/drawing/2014/main" id="{5A2E3D1D-9E9F-4739-BA14-D4D7FA9FBDD1}"/>
               </a:ext>
               <a:ext uri="{C183D7F6-B498-43B3-948B-1728B52AA6E4}">
-                <adec:decorative xmlns="" xmlns:adec="http://schemas.microsoft.com/office/drawing/2017/decorative" val="1"/>
+                <adec:decorative xmlns:adec="http://schemas.microsoft.com/office/drawing/2017/decorative" xmlns="" val="1"/>
               </a:ext>
             </a:extLst>
           </p:cNvPr>
@@ -27947,7 +27947,7 @@
                 <a16:creationId xmlns:a16="http://schemas.microsoft.com/office/drawing/2014/main" id="{1FFB365B-E9DC-4859-B8AB-CB83EEBE4E28}"/>
               </a:ext>
               <a:ext uri="{C183D7F6-B498-43B3-948B-1728B52AA6E4}">
-                <adec:decorative xmlns="" xmlns:adec="http://schemas.microsoft.com/office/drawing/2017/decorative" val="1"/>
+                <adec:decorative xmlns:adec="http://schemas.microsoft.com/office/drawing/2017/decorative" xmlns="" val="1"/>
               </a:ext>
             </a:extLst>
           </p:cNvPr>
@@ -28437,7 +28437,7 @@
                 <a16:creationId xmlns:a16="http://schemas.microsoft.com/office/drawing/2014/main" id="{8ADAB9C8-EB37-4914-A699-C716FC8FE4FE}"/>
               </a:ext>
               <a:ext uri="{C183D7F6-B498-43B3-948B-1728B52AA6E4}">
-                <adec:decorative xmlns="" xmlns:adec="http://schemas.microsoft.com/office/drawing/2017/decorative" val="1"/>
+                <adec:decorative xmlns:adec="http://schemas.microsoft.com/office/drawing/2017/decorative" xmlns="" val="1"/>
               </a:ext>
             </a:extLst>
           </p:cNvPr>
@@ -28673,22 +28673,25 @@
             </a:pPr>
             <a:r>
               <a:rPr lang="pt-BR" sz="2800" u="sng" dirty="0">
+                <a:solidFill>
+                  <a:schemeClr val="bg2">
+                    <a:lumMod val="40000"/>
+                    <a:lumOff val="60000"/>
+                  </a:schemeClr>
+                </a:solidFill>
                 <a:latin typeface="Arial"/>
                 <a:cs typeface="Arial"/>
-                <a:hlinkClick r:id="rId3"/>
               </a:rPr>
-              <a:t>https://www.notion.so/Material-CDG-Hub-80ea9c9b60b24debaf7f32e4138283cf</a:t>
+              <a:t>https://cookie-submarine-e90.notion.site/Material-CDG-Hub-80ea9c9b60b24debaf7f32e4138283cf</a:t>
             </a:r>
-            <a:endParaRPr lang="pt-BR" sz="2800" u="sng" dirty="0">
-              <a:latin typeface="Arial"/>
-              <a:cs typeface="Arial"/>
+            <a:endParaRPr lang="pt-BR" u="sng" dirty="0">
+              <a:solidFill>
+                <a:schemeClr val="bg2">
+                  <a:lumMod val="40000"/>
+                  <a:lumOff val="60000"/>
+                </a:schemeClr>
+              </a:solidFill>
             </a:endParaRPr>
-          </a:p>
-          <a:p>
-            <a:pPr marL="0" indent="0">
-              <a:buNone/>
-            </a:pPr>
-            <a:endParaRPr lang="pt-BR" u="sng" dirty="0"/>
           </a:p>
           <a:p>
             <a:endParaRPr lang="pt-BR" dirty="0"/>
@@ -28844,7 +28847,7 @@
                 <a:hlinkClick r:id="rId3">
                   <a:extLst>
                     <a:ext uri="{A12FA001-AC4F-418D-AE19-62706E023703}">
-                      <ahyp:hlinkClr xmlns="" xmlns:ahyp="http://schemas.microsoft.com/office/drawing/2018/hyperlinkcolor" val="tx"/>
+                      <ahyp:hlinkClr xmlns:ahyp="http://schemas.microsoft.com/office/drawing/2018/hyperlinkcolor" xmlns="" val="tx"/>
                     </a:ext>
                   </a:extLst>
                 </a:hlinkClick>
@@ -28920,7 +28923,7 @@
                 <a:hlinkClick r:id="rId4">
                   <a:extLst>
                     <a:ext uri="{A12FA001-AC4F-418D-AE19-62706E023703}">
-                      <ahyp:hlinkClr xmlns="" xmlns:ahyp="http://schemas.microsoft.com/office/drawing/2018/hyperlinkcolor" val="tx"/>
+                      <ahyp:hlinkClr xmlns:ahyp="http://schemas.microsoft.com/office/drawing/2018/hyperlinkcolor" xmlns="" val="tx"/>
                     </a:ext>
                   </a:extLst>
                 </a:hlinkClick>
@@ -28946,7 +28949,7 @@
                 <a16:creationId xmlns:a16="http://schemas.microsoft.com/office/drawing/2014/main" id="{0D187C4E-14B9-4504-B200-5127823FA78C}"/>
               </a:ext>
               <a:ext uri="{C183D7F6-B498-43B3-948B-1728B52AA6E4}">
-                <adec:decorative xmlns="" xmlns:adec="http://schemas.microsoft.com/office/drawing/2017/decorative" val="1"/>
+                <adec:decorative xmlns:adec="http://schemas.microsoft.com/office/drawing/2017/decorative" xmlns="" val="1"/>
               </a:ext>
             </a:extLst>
           </p:cNvPr>
@@ -29307,7 +29310,7 @@
                 <a16:creationId xmlns:a16="http://schemas.microsoft.com/office/drawing/2014/main" id="{0D9B8FD4-CDEB-4EB4-B4DE-C89E11938958}"/>
               </a:ext>
               <a:ext uri="{C183D7F6-B498-43B3-948B-1728B52AA6E4}">
-                <adec:decorative xmlns="" xmlns:adec="http://schemas.microsoft.com/office/drawing/2017/decorative" val="1"/>
+                <adec:decorative xmlns:adec="http://schemas.microsoft.com/office/drawing/2017/decorative" xmlns="" val="1"/>
               </a:ext>
             </a:extLst>
           </p:cNvPr>
@@ -29367,7 +29370,7 @@
                 <a16:creationId xmlns:a16="http://schemas.microsoft.com/office/drawing/2014/main" id="{5A2E3D1D-9E9F-4739-BA14-D4D7FA9FBDD1}"/>
               </a:ext>
               <a:ext uri="{C183D7F6-B498-43B3-948B-1728B52AA6E4}">
-                <adec:decorative xmlns="" xmlns:adec="http://schemas.microsoft.com/office/drawing/2017/decorative" val="1"/>
+                <adec:decorative xmlns:adec="http://schemas.microsoft.com/office/drawing/2017/decorative" xmlns="" val="1"/>
               </a:ext>
             </a:extLst>
           </p:cNvPr>
@@ -29719,7 +29722,7 @@
                 <a16:creationId xmlns:a16="http://schemas.microsoft.com/office/drawing/2014/main" id="{1FFB365B-E9DC-4859-B8AB-CB83EEBE4E28}"/>
               </a:ext>
               <a:ext uri="{C183D7F6-B498-43B3-948B-1728B52AA6E4}">
-                <adec:decorative xmlns="" xmlns:adec="http://schemas.microsoft.com/office/drawing/2017/decorative" val="1"/>
+                <adec:decorative xmlns:adec="http://schemas.microsoft.com/office/drawing/2017/decorative" xmlns="" val="1"/>
               </a:ext>
             </a:extLst>
           </p:cNvPr>
@@ -30209,7 +30212,7 @@
                 <a16:creationId xmlns:a16="http://schemas.microsoft.com/office/drawing/2014/main" id="{8ADAB9C8-EB37-4914-A699-C716FC8FE4FE}"/>
               </a:ext>
               <a:ext uri="{C183D7F6-B498-43B3-948B-1728B52AA6E4}">
-                <adec:decorative xmlns="" xmlns:adec="http://schemas.microsoft.com/office/drawing/2017/decorative" val="1"/>
+                <adec:decorative xmlns:adec="http://schemas.microsoft.com/office/drawing/2017/decorative" xmlns="" val="1"/>
               </a:ext>
             </a:extLst>
           </p:cNvPr>
@@ -30446,7 +30449,7 @@
                 <a16:creationId xmlns:a16="http://schemas.microsoft.com/office/drawing/2014/main" id="{C9ECDD5C-152A-4CC7-8333-0F367B3A62EA}"/>
               </a:ext>
               <a:ext uri="{C183D7F6-B498-43B3-948B-1728B52AA6E4}">
-                <adec:decorative xmlns="" xmlns:adec="http://schemas.microsoft.com/office/drawing/2017/decorative" val="1"/>
+                <adec:decorative xmlns:adec="http://schemas.microsoft.com/office/drawing/2017/decorative" xmlns="" val="1"/>
               </a:ext>
             </a:extLst>
           </p:cNvPr>
@@ -30490,7 +30493,7 @@
                 <a16:creationId xmlns:a16="http://schemas.microsoft.com/office/drawing/2014/main" id="{7F5C92A3-369B-43F3-BDCE-E560B1B0EC89}"/>
               </a:ext>
               <a:ext uri="{C183D7F6-B498-43B3-948B-1728B52AA6E4}">
-                <adec:decorative xmlns="" xmlns:adec="http://schemas.microsoft.com/office/drawing/2017/decorative" val="1"/>
+                <adec:decorative xmlns:adec="http://schemas.microsoft.com/office/drawing/2017/decorative" xmlns="" val="1"/>
               </a:ext>
             </a:extLst>
           </p:cNvPr>
@@ -30534,7 +30537,7 @@
                 <a16:creationId xmlns:a16="http://schemas.microsoft.com/office/drawing/2014/main" id="{AEBE9F1A-B38D-446E-83AE-14B17CE77FF2}"/>
               </a:ext>
               <a:ext uri="{C183D7F6-B498-43B3-948B-1728B52AA6E4}">
-                <adec:decorative xmlns="" xmlns:adec="http://schemas.microsoft.com/office/drawing/2017/decorative" val="1"/>
+                <adec:decorative xmlns:adec="http://schemas.microsoft.com/office/drawing/2017/decorative" xmlns="" val="1"/>
               </a:ext>
             </a:extLst>
           </p:cNvPr>
@@ -30614,7 +30617,7 @@
                 <a16:creationId xmlns:a16="http://schemas.microsoft.com/office/drawing/2014/main" id="{915B5014-A7EC-4BA6-9C83-8840CF81DB28}"/>
               </a:ext>
               <a:ext uri="{C183D7F6-B498-43B3-948B-1728B52AA6E4}">
-                <adec:decorative xmlns="" xmlns:adec="http://schemas.microsoft.com/office/drawing/2017/decorative" val="1"/>
+                <adec:decorative xmlns:adec="http://schemas.microsoft.com/office/drawing/2017/decorative" xmlns="" val="1"/>
               </a:ext>
             </a:extLst>
           </p:cNvPr>
@@ -30658,7 +30661,7 @@
                 <a16:creationId xmlns:a16="http://schemas.microsoft.com/office/drawing/2014/main" id="{022C43AB-86D7-420D-8AD7-DC0A15FDD0AF}"/>
               </a:ext>
               <a:ext uri="{C183D7F6-B498-43B3-948B-1728B52AA6E4}">
-                <adec:decorative xmlns="" xmlns:adec="http://schemas.microsoft.com/office/drawing/2017/decorative" val="1"/>
+                <adec:decorative xmlns:adec="http://schemas.microsoft.com/office/drawing/2017/decorative" xmlns="" val="1"/>
               </a:ext>
             </a:extLst>
           </p:cNvPr>
@@ -30702,7 +30705,7 @@
                 <a16:creationId xmlns:a16="http://schemas.microsoft.com/office/drawing/2014/main" id="{5E3EB826-A471-488F-9E8A-D65528A3C0CA}"/>
               </a:ext>
               <a:ext uri="{C183D7F6-B498-43B3-948B-1728B52AA6E4}">
-                <adec:decorative xmlns="" xmlns:adec="http://schemas.microsoft.com/office/drawing/2017/decorative" val="1"/>
+                <adec:decorative xmlns:adec="http://schemas.microsoft.com/office/drawing/2017/decorative" xmlns="" val="1"/>
               </a:ext>
             </a:extLst>
           </p:cNvPr>
@@ -30755,7 +30758,7 @@
                 <a16:creationId xmlns:a16="http://schemas.microsoft.com/office/drawing/2014/main" id="{DFB3CEA1-88D9-42FB-88ED-1E9807FE6596}"/>
               </a:ext>
               <a:ext uri="{C183D7F6-B498-43B3-948B-1728B52AA6E4}">
-                <adec:decorative xmlns="" xmlns:adec="http://schemas.microsoft.com/office/drawing/2017/decorative" val="1"/>
+                <adec:decorative xmlns:adec="http://schemas.microsoft.com/office/drawing/2017/decorative" xmlns="" val="1"/>
               </a:ext>
             </a:extLst>
           </p:cNvPr>
@@ -30848,7 +30851,7 @@
                 <a16:creationId xmlns:a16="http://schemas.microsoft.com/office/drawing/2014/main" id="{9A6C928E-4252-4F33-8C34-E50A12A3170B}"/>
               </a:ext>
               <a:ext uri="{C183D7F6-B498-43B3-948B-1728B52AA6E4}">
-                <adec:decorative xmlns="" xmlns:adec="http://schemas.microsoft.com/office/drawing/2017/decorative" val="1"/>
+                <adec:decorative xmlns:adec="http://schemas.microsoft.com/office/drawing/2017/decorative" xmlns="" val="1"/>
               </a:ext>
             </a:extLst>
           </p:cNvPr>
@@ -30942,7 +30945,7 @@
                 <a16:creationId xmlns:a16="http://schemas.microsoft.com/office/drawing/2014/main" id="{5F3FC718-FDE3-4EF7-921E-A5F374EAF824}"/>
               </a:ext>
               <a:ext uri="{C183D7F6-B498-43B3-948B-1728B52AA6E4}">
-                <adec:decorative xmlns="" xmlns:adec="http://schemas.microsoft.com/office/drawing/2017/decorative" val="1"/>
+                <adec:decorative xmlns:adec="http://schemas.microsoft.com/office/drawing/2017/decorative" xmlns="" val="1"/>
               </a:ext>
             </a:extLst>
           </p:cNvPr>
@@ -31002,7 +31005,7 @@
                 <a16:creationId xmlns:a16="http://schemas.microsoft.com/office/drawing/2014/main" id="{FAA0F719-3DC8-4F08-AD8F-5A845658CB9D}"/>
               </a:ext>
               <a:ext uri="{C183D7F6-B498-43B3-948B-1728B52AA6E4}">
-                <adec:decorative xmlns="" xmlns:adec="http://schemas.microsoft.com/office/drawing/2017/decorative" val="1"/>
+                <adec:decorative xmlns:adec="http://schemas.microsoft.com/office/drawing/2017/decorative" xmlns="" val="1"/>
               </a:ext>
             </a:extLst>
           </p:cNvPr>
@@ -31354,7 +31357,7 @@
                 <a16:creationId xmlns:a16="http://schemas.microsoft.com/office/drawing/2014/main" id="{7DCB61BE-FA0F-4EFB-BE0E-268BAD8E30D6}"/>
               </a:ext>
               <a:ext uri="{C183D7F6-B498-43B3-948B-1728B52AA6E4}">
-                <adec:decorative xmlns="" xmlns:adec="http://schemas.microsoft.com/office/drawing/2017/decorative" val="1"/>
+                <adec:decorative xmlns:adec="http://schemas.microsoft.com/office/drawing/2017/decorative" xmlns="" val="1"/>
               </a:ext>
             </a:extLst>
           </p:cNvPr>
@@ -31817,7 +31820,7 @@
                 <a16:creationId xmlns:a16="http://schemas.microsoft.com/office/drawing/2014/main" id="{A4B31EAA-7423-46F7-9B90-4AB2B09C35C4}"/>
               </a:ext>
               <a:ext uri="{C183D7F6-B498-43B3-948B-1728B52AA6E4}">
-                <adec:decorative xmlns="" xmlns:adec="http://schemas.microsoft.com/office/drawing/2017/decorative" val="1"/>
+                <adec:decorative xmlns:adec="http://schemas.microsoft.com/office/drawing/2017/decorative" xmlns="" val="1"/>
               </a:ext>
             </a:extLst>
           </p:cNvPr>
@@ -32009,7 +32012,7 @@
                 <a16:creationId xmlns:a16="http://schemas.microsoft.com/office/drawing/2014/main" id="{5F3FC718-FDE3-4EF7-921E-A5F374EAF824}"/>
               </a:ext>
               <a:ext uri="{C183D7F6-B498-43B3-948B-1728B52AA6E4}">
-                <adec:decorative xmlns="" xmlns:adec="http://schemas.microsoft.com/office/drawing/2017/decorative" val="1"/>
+                <adec:decorative xmlns:adec="http://schemas.microsoft.com/office/drawing/2017/decorative" xmlns="" val="1"/>
               </a:ext>
             </a:extLst>
           </p:cNvPr>
@@ -32118,7 +32121,7 @@
                 <a16:creationId xmlns:a16="http://schemas.microsoft.com/office/drawing/2014/main" id="{FAA0F719-3DC8-4F08-AD8F-5A845658CB9D}"/>
               </a:ext>
               <a:ext uri="{C183D7F6-B498-43B3-948B-1728B52AA6E4}">
-                <adec:decorative xmlns="" xmlns:adec="http://schemas.microsoft.com/office/drawing/2017/decorative" val="1"/>
+                <adec:decorative xmlns:adec="http://schemas.microsoft.com/office/drawing/2017/decorative" xmlns="" val="1"/>
               </a:ext>
             </a:extLst>
           </p:cNvPr>
@@ -32470,7 +32473,7 @@
                 <a16:creationId xmlns:a16="http://schemas.microsoft.com/office/drawing/2014/main" id="{7DCB61BE-FA0F-4EFB-BE0E-268BAD8E30D6}"/>
               </a:ext>
               <a:ext uri="{C183D7F6-B498-43B3-948B-1728B52AA6E4}">
-                <adec:decorative xmlns="" xmlns:adec="http://schemas.microsoft.com/office/drawing/2017/decorative" val="1"/>
+                <adec:decorative xmlns:adec="http://schemas.microsoft.com/office/drawing/2017/decorative" xmlns="" val="1"/>
               </a:ext>
             </a:extLst>
           </p:cNvPr>
@@ -32933,7 +32936,7 @@
                 <a16:creationId xmlns:a16="http://schemas.microsoft.com/office/drawing/2014/main" id="{A4B31EAA-7423-46F7-9B90-4AB2B09C35C4}"/>
               </a:ext>
               <a:ext uri="{C183D7F6-B498-43B3-948B-1728B52AA6E4}">
-                <adec:decorative xmlns="" xmlns:adec="http://schemas.microsoft.com/office/drawing/2017/decorative" val="1"/>
+                <adec:decorative xmlns:adec="http://schemas.microsoft.com/office/drawing/2017/decorative" xmlns="" val="1"/>
               </a:ext>
             </a:extLst>
           </p:cNvPr>
@@ -33989,7 +33992,7 @@
                 <a16:creationId xmlns:a16="http://schemas.microsoft.com/office/drawing/2014/main" id="{B4AAD3FD-83A5-4B89-9F8F-01B8870865BE}"/>
               </a:ext>
               <a:ext uri="{C183D7F6-B498-43B3-948B-1728B52AA6E4}">
-                <adec:decorative xmlns="" xmlns:adec="http://schemas.microsoft.com/office/drawing/2017/decorative" val="1"/>
+                <adec:decorative xmlns:adec="http://schemas.microsoft.com/office/drawing/2017/decorative" xmlns="" val="1"/>
               </a:ext>
             </a:extLst>
           </p:cNvPr>
@@ -34049,7 +34052,7 @@
                 <a16:creationId xmlns:a16="http://schemas.microsoft.com/office/drawing/2014/main" id="{61752F1D-FC0F-4103-9584-630E643CCDA6}"/>
               </a:ext>
               <a:ext uri="{C183D7F6-B498-43B3-948B-1728B52AA6E4}">
-                <adec:decorative xmlns="" xmlns:adec="http://schemas.microsoft.com/office/drawing/2017/decorative" val="1"/>
+                <adec:decorative xmlns:adec="http://schemas.microsoft.com/office/drawing/2017/decorative" xmlns="" val="1"/>
               </a:ext>
             </a:extLst>
           </p:cNvPr>
@@ -34401,7 +34404,7 @@
                 <a16:creationId xmlns:a16="http://schemas.microsoft.com/office/drawing/2014/main" id="{70151CB7-E7DE-4917-B831-01DF9CE01306}"/>
               </a:ext>
               <a:ext uri="{C183D7F6-B498-43B3-948B-1728B52AA6E4}">
-                <adec:decorative xmlns="" xmlns:adec="http://schemas.microsoft.com/office/drawing/2017/decorative" val="1"/>
+                <adec:decorative xmlns:adec="http://schemas.microsoft.com/office/drawing/2017/decorative" xmlns="" val="1"/>
               </a:ext>
             </a:extLst>
           </p:cNvPr>
@@ -34895,7 +34898,7 @@
                 <a16:creationId xmlns:a16="http://schemas.microsoft.com/office/drawing/2014/main" id="{A92A1116-1C84-41DF-B803-1F7B0883EC82}"/>
               </a:ext>
               <a:ext uri="{C183D7F6-B498-43B3-948B-1728B52AA6E4}">
-                <adec:decorative xmlns="" xmlns:adec="http://schemas.microsoft.com/office/drawing/2017/decorative" val="1"/>
+                <adec:decorative xmlns:adec="http://schemas.microsoft.com/office/drawing/2017/decorative" xmlns="" val="1"/>
               </a:ext>
             </a:extLst>
           </p:cNvPr>
@@ -35190,7 +35193,7 @@
                 <a16:creationId xmlns:a16="http://schemas.microsoft.com/office/drawing/2014/main" id="{B4AAD3FD-83A5-4B89-9F8F-01B8870865BE}"/>
               </a:ext>
               <a:ext uri="{C183D7F6-B498-43B3-948B-1728B52AA6E4}">
-                <adec:decorative xmlns="" xmlns:adec="http://schemas.microsoft.com/office/drawing/2017/decorative" val="1"/>
+                <adec:decorative xmlns:adec="http://schemas.microsoft.com/office/drawing/2017/decorative" xmlns="" val="1"/>
               </a:ext>
             </a:extLst>
           </p:cNvPr>
@@ -35294,7 +35297,7 @@
                 <a16:creationId xmlns:a16="http://schemas.microsoft.com/office/drawing/2014/main" id="{61752F1D-FC0F-4103-9584-630E643CCDA6}"/>
               </a:ext>
               <a:ext uri="{C183D7F6-B498-43B3-948B-1728B52AA6E4}">
-                <adec:decorative xmlns="" xmlns:adec="http://schemas.microsoft.com/office/drawing/2017/decorative" val="1"/>
+                <adec:decorative xmlns:adec="http://schemas.microsoft.com/office/drawing/2017/decorative" xmlns="" val="1"/>
               </a:ext>
             </a:extLst>
           </p:cNvPr>
@@ -35646,7 +35649,7 @@
                 <a16:creationId xmlns:a16="http://schemas.microsoft.com/office/drawing/2014/main" id="{70151CB7-E7DE-4917-B831-01DF9CE01306}"/>
               </a:ext>
               <a:ext uri="{C183D7F6-B498-43B3-948B-1728B52AA6E4}">
-                <adec:decorative xmlns="" xmlns:adec="http://schemas.microsoft.com/office/drawing/2017/decorative" val="1"/>
+                <adec:decorative xmlns:adec="http://schemas.microsoft.com/office/drawing/2017/decorative" xmlns="" val="1"/>
               </a:ext>
             </a:extLst>
           </p:cNvPr>
@@ -36140,7 +36143,7 @@
                 <a16:creationId xmlns:a16="http://schemas.microsoft.com/office/drawing/2014/main" id="{A92A1116-1C84-41DF-B803-1F7B0883EC82}"/>
               </a:ext>
               <a:ext uri="{C183D7F6-B498-43B3-948B-1728B52AA6E4}">
-                <adec:decorative xmlns="" xmlns:adec="http://schemas.microsoft.com/office/drawing/2017/decorative" val="1"/>
+                <adec:decorative xmlns:adec="http://schemas.microsoft.com/office/drawing/2017/decorative" xmlns="" val="1"/>
               </a:ext>
             </a:extLst>
           </p:cNvPr>

</xml_diff>

<commit_message>
inversao da tela roadmap
</commit_message>
<xml_diff>
--- a/Minicurso webdev.pptx
+++ b/Minicurso webdev.pptx
@@ -25,8 +25,8 @@
     <p:sldId id="267" r:id="rId16"/>
     <p:sldId id="268" r:id="rId17"/>
     <p:sldId id="275" r:id="rId18"/>
-    <p:sldId id="266" r:id="rId19"/>
-    <p:sldId id="264" r:id="rId20"/>
+    <p:sldId id="264" r:id="rId19"/>
+    <p:sldId id="266" r:id="rId20"/>
   </p:sldIdLst>
   <p:sldSz cx="12192000" cy="6858000"/>
   <p:notesSz cx="6858000" cy="9144000"/>
@@ -17309,7 +17309,7 @@
                 <a16:creationId xmlns:a16="http://schemas.microsoft.com/office/drawing/2014/main" id="{DE27238C-8EAF-4098-86E6-7723B7DAE601}"/>
               </a:ext>
               <a:ext uri="{C183D7F6-B498-43B3-948B-1728B52AA6E4}">
-                <adec:decorative xmlns:adec="http://schemas.microsoft.com/office/drawing/2017/decorative" xmlns="" val="1"/>
+                <adec:decorative xmlns="" xmlns:adec="http://schemas.microsoft.com/office/drawing/2017/decorative" val="1"/>
               </a:ext>
             </a:extLst>
           </p:cNvPr>
@@ -17372,7 +17372,7 @@
                 <a16:creationId xmlns:a16="http://schemas.microsoft.com/office/drawing/2014/main" id="{992F97B1-1891-4FCC-9E5F-BA97EDB48F89}"/>
               </a:ext>
               <a:ext uri="{C183D7F6-B498-43B3-948B-1728B52AA6E4}">
-                <adec:decorative xmlns:adec="http://schemas.microsoft.com/office/drawing/2017/decorative" xmlns="" val="1"/>
+                <adec:decorative xmlns="" xmlns:adec="http://schemas.microsoft.com/office/drawing/2017/decorative" val="1"/>
               </a:ext>
             </a:extLst>
           </p:cNvPr>
@@ -17726,7 +17726,7 @@
                 <a16:creationId xmlns:a16="http://schemas.microsoft.com/office/drawing/2014/main" id="{78C6C821-FEE1-4EB6-9590-C021440C77DE}"/>
               </a:ext>
               <a:ext uri="{C183D7F6-B498-43B3-948B-1728B52AA6E4}">
-                <adec:decorative xmlns:adec="http://schemas.microsoft.com/office/drawing/2017/decorative" xmlns="" val="1"/>
+                <adec:decorative xmlns="" xmlns:adec="http://schemas.microsoft.com/office/drawing/2017/decorative" val="1"/>
               </a:ext>
             </a:extLst>
           </p:cNvPr>
@@ -18310,7 +18310,7 @@
                 <a16:creationId xmlns:a16="http://schemas.microsoft.com/office/drawing/2014/main" id="{B61A74B3-E247-44D4-8C48-FAE8E2056401}"/>
               </a:ext>
               <a:ext uri="{C183D7F6-B498-43B3-948B-1728B52AA6E4}">
-                <adec:decorative xmlns:adec="http://schemas.microsoft.com/office/drawing/2017/decorative" xmlns="" val="1"/>
+                <adec:decorative xmlns="" xmlns:adec="http://schemas.microsoft.com/office/drawing/2017/decorative" val="1"/>
               </a:ext>
             </a:extLst>
           </p:cNvPr>
@@ -18632,7 +18632,7 @@
                 <a16:creationId xmlns:a16="http://schemas.microsoft.com/office/drawing/2014/main" id="{0D9B8FD4-CDEB-4EB4-B4DE-C89E11938958}"/>
               </a:ext>
               <a:ext uri="{C183D7F6-B498-43B3-948B-1728B52AA6E4}">
-                <adec:decorative xmlns:adec="http://schemas.microsoft.com/office/drawing/2017/decorative" xmlns="" val="1"/>
+                <adec:decorative xmlns="" xmlns:adec="http://schemas.microsoft.com/office/drawing/2017/decorative" val="1"/>
               </a:ext>
             </a:extLst>
           </p:cNvPr>
@@ -18692,7 +18692,7 @@
                 <a16:creationId xmlns:a16="http://schemas.microsoft.com/office/drawing/2014/main" id="{5A2E3D1D-9E9F-4739-BA14-D4D7FA9FBDD1}"/>
               </a:ext>
               <a:ext uri="{C183D7F6-B498-43B3-948B-1728B52AA6E4}">
-                <adec:decorative xmlns:adec="http://schemas.microsoft.com/office/drawing/2017/decorative" xmlns="" val="1"/>
+                <adec:decorative xmlns="" xmlns:adec="http://schemas.microsoft.com/office/drawing/2017/decorative" val="1"/>
               </a:ext>
             </a:extLst>
           </p:cNvPr>
@@ -19044,7 +19044,7 @@
                 <a16:creationId xmlns:a16="http://schemas.microsoft.com/office/drawing/2014/main" id="{1FFB365B-E9DC-4859-B8AB-CB83EEBE4E28}"/>
               </a:ext>
               <a:ext uri="{C183D7F6-B498-43B3-948B-1728B52AA6E4}">
-                <adec:decorative xmlns:adec="http://schemas.microsoft.com/office/drawing/2017/decorative" xmlns="" val="1"/>
+                <adec:decorative xmlns="" xmlns:adec="http://schemas.microsoft.com/office/drawing/2017/decorative" val="1"/>
               </a:ext>
             </a:extLst>
           </p:cNvPr>
@@ -19534,7 +19534,7 @@
                 <a16:creationId xmlns:a16="http://schemas.microsoft.com/office/drawing/2014/main" id="{8ADAB9C8-EB37-4914-A699-C716FC8FE4FE}"/>
               </a:ext>
               <a:ext uri="{C183D7F6-B498-43B3-948B-1728B52AA6E4}">
-                <adec:decorative xmlns:adec="http://schemas.microsoft.com/office/drawing/2017/decorative" xmlns="" val="1"/>
+                <adec:decorative xmlns="" xmlns:adec="http://schemas.microsoft.com/office/drawing/2017/decorative" val="1"/>
               </a:ext>
             </a:extLst>
           </p:cNvPr>
@@ -19973,7 +19973,7 @@
                 <a16:creationId xmlns:a16="http://schemas.microsoft.com/office/drawing/2014/main" id="{0D9B8FD4-CDEB-4EB4-B4DE-C89E11938958}"/>
               </a:ext>
               <a:ext uri="{C183D7F6-B498-43B3-948B-1728B52AA6E4}">
-                <adec:decorative xmlns:adec="http://schemas.microsoft.com/office/drawing/2017/decorative" xmlns="" val="1"/>
+                <adec:decorative xmlns="" xmlns:adec="http://schemas.microsoft.com/office/drawing/2017/decorative" val="1"/>
               </a:ext>
             </a:extLst>
           </p:cNvPr>
@@ -20033,7 +20033,7 @@
                 <a16:creationId xmlns:a16="http://schemas.microsoft.com/office/drawing/2014/main" id="{5A2E3D1D-9E9F-4739-BA14-D4D7FA9FBDD1}"/>
               </a:ext>
               <a:ext uri="{C183D7F6-B498-43B3-948B-1728B52AA6E4}">
-                <adec:decorative xmlns:adec="http://schemas.microsoft.com/office/drawing/2017/decorative" xmlns="" val="1"/>
+                <adec:decorative xmlns="" xmlns:adec="http://schemas.microsoft.com/office/drawing/2017/decorative" val="1"/>
               </a:ext>
             </a:extLst>
           </p:cNvPr>
@@ -20385,7 +20385,7 @@
                 <a16:creationId xmlns:a16="http://schemas.microsoft.com/office/drawing/2014/main" id="{1FFB365B-E9DC-4859-B8AB-CB83EEBE4E28}"/>
               </a:ext>
               <a:ext uri="{C183D7F6-B498-43B3-948B-1728B52AA6E4}">
-                <adec:decorative xmlns:adec="http://schemas.microsoft.com/office/drawing/2017/decorative" xmlns="" val="1"/>
+                <adec:decorative xmlns="" xmlns:adec="http://schemas.microsoft.com/office/drawing/2017/decorative" val="1"/>
               </a:ext>
             </a:extLst>
           </p:cNvPr>
@@ -20875,7 +20875,7 @@
                 <a16:creationId xmlns:a16="http://schemas.microsoft.com/office/drawing/2014/main" id="{8ADAB9C8-EB37-4914-A699-C716FC8FE4FE}"/>
               </a:ext>
               <a:ext uri="{C183D7F6-B498-43B3-948B-1728B52AA6E4}">
-                <adec:decorative xmlns:adec="http://schemas.microsoft.com/office/drawing/2017/decorative" xmlns="" val="1"/>
+                <adec:decorative xmlns="" xmlns:adec="http://schemas.microsoft.com/office/drawing/2017/decorative" val="1"/>
               </a:ext>
             </a:extLst>
           </p:cNvPr>
@@ -21355,7 +21355,7 @@
                 <a16:creationId xmlns:a16="http://schemas.microsoft.com/office/drawing/2014/main" id="{41B68C77-138E-4BF7-A276-BD0C78A4219F}"/>
               </a:ext>
               <a:ext uri="{C183D7F6-B498-43B3-948B-1728B52AA6E4}">
-                <adec:decorative xmlns:adec="http://schemas.microsoft.com/office/drawing/2017/decorative" xmlns="" val="1"/>
+                <adec:decorative xmlns="" xmlns:adec="http://schemas.microsoft.com/office/drawing/2017/decorative" val="1"/>
               </a:ext>
             </a:extLst>
           </p:cNvPr>
@@ -21399,7 +21399,7 @@
                 <a16:creationId xmlns:a16="http://schemas.microsoft.com/office/drawing/2014/main" id="{7C268552-D473-46ED-B1B8-422042C4DEF1}"/>
               </a:ext>
               <a:ext uri="{C183D7F6-B498-43B3-948B-1728B52AA6E4}">
-                <adec:decorative xmlns:adec="http://schemas.microsoft.com/office/drawing/2017/decorative" xmlns="" val="1"/>
+                <adec:decorative xmlns="" xmlns:adec="http://schemas.microsoft.com/office/drawing/2017/decorative" val="1"/>
               </a:ext>
             </a:extLst>
           </p:cNvPr>
@@ -21443,7 +21443,7 @@
                 <a16:creationId xmlns:a16="http://schemas.microsoft.com/office/drawing/2014/main" id="{4AC0CD9D-7610-4620-93B4-798CCD9AB581}"/>
               </a:ext>
               <a:ext uri="{C183D7F6-B498-43B3-948B-1728B52AA6E4}">
-                <adec:decorative xmlns:adec="http://schemas.microsoft.com/office/drawing/2017/decorative" xmlns="" val="1"/>
+                <adec:decorative xmlns="" xmlns:adec="http://schemas.microsoft.com/office/drawing/2017/decorative" val="1"/>
               </a:ext>
             </a:extLst>
           </p:cNvPr>
@@ -21523,7 +21523,7 @@
                 <a16:creationId xmlns:a16="http://schemas.microsoft.com/office/drawing/2014/main" id="{B9238B3E-24AA-439A-B527-6C5DF6D72145}"/>
               </a:ext>
               <a:ext uri="{C183D7F6-B498-43B3-948B-1728B52AA6E4}">
-                <adec:decorative xmlns:adec="http://schemas.microsoft.com/office/drawing/2017/decorative" xmlns="" val="1"/>
+                <adec:decorative xmlns="" xmlns:adec="http://schemas.microsoft.com/office/drawing/2017/decorative" val="1"/>
               </a:ext>
             </a:extLst>
           </p:cNvPr>
@@ -21567,7 +21567,7 @@
                 <a16:creationId xmlns:a16="http://schemas.microsoft.com/office/drawing/2014/main" id="{69F01145-BEA3-4CBF-AA21-10077B948CA8}"/>
               </a:ext>
               <a:ext uri="{C183D7F6-B498-43B3-948B-1728B52AA6E4}">
-                <adec:decorative xmlns:adec="http://schemas.microsoft.com/office/drawing/2017/decorative" xmlns="" val="1"/>
+                <adec:decorative xmlns="" xmlns:adec="http://schemas.microsoft.com/office/drawing/2017/decorative" val="1"/>
               </a:ext>
             </a:extLst>
           </p:cNvPr>
@@ -21611,7 +21611,7 @@
                 <a16:creationId xmlns:a16="http://schemas.microsoft.com/office/drawing/2014/main" id="{DE4D62F9-188E-4530-84C2-24BDEE4BEB82}"/>
               </a:ext>
               <a:ext uri="{C183D7F6-B498-43B3-948B-1728B52AA6E4}">
-                <adec:decorative xmlns:adec="http://schemas.microsoft.com/office/drawing/2017/decorative" xmlns="" val="1"/>
+                <adec:decorative xmlns="" xmlns:adec="http://schemas.microsoft.com/office/drawing/2017/decorative" val="1"/>
               </a:ext>
             </a:extLst>
           </p:cNvPr>
@@ -21664,7 +21664,7 @@
                 <a16:creationId xmlns:a16="http://schemas.microsoft.com/office/drawing/2014/main" id="{757B325C-3E35-45CF-9D07-3BCB281F3B9C}"/>
               </a:ext>
               <a:ext uri="{C183D7F6-B498-43B3-948B-1728B52AA6E4}">
-                <adec:decorative xmlns:adec="http://schemas.microsoft.com/office/drawing/2017/decorative" xmlns="" val="1"/>
+                <adec:decorative xmlns="" xmlns:adec="http://schemas.microsoft.com/office/drawing/2017/decorative" val="1"/>
               </a:ext>
             </a:extLst>
           </p:cNvPr>
@@ -21842,7 +21842,7 @@
                 <a16:creationId xmlns:a16="http://schemas.microsoft.com/office/drawing/2014/main" id="{C24BEC42-AFF3-40D1-93A2-A27A42E1E23C}"/>
               </a:ext>
               <a:ext uri="{C183D7F6-B498-43B3-948B-1728B52AA6E4}">
-                <adec:decorative xmlns:adec="http://schemas.microsoft.com/office/drawing/2017/decorative" xmlns="" val="1"/>
+                <adec:decorative xmlns="" xmlns:adec="http://schemas.microsoft.com/office/drawing/2017/decorative" val="1"/>
               </a:ext>
             </a:extLst>
           </p:cNvPr>
@@ -22194,7 +22194,7 @@
                 <a16:creationId xmlns:a16="http://schemas.microsoft.com/office/drawing/2014/main" id="{608F427C-1EC9-4280-9367-F2B3AA063E82}"/>
               </a:ext>
               <a:ext uri="{C183D7F6-B498-43B3-948B-1728B52AA6E4}">
-                <adec:decorative xmlns:adec="http://schemas.microsoft.com/office/drawing/2017/decorative" xmlns="" val="1"/>
+                <adec:decorative xmlns="" xmlns:adec="http://schemas.microsoft.com/office/drawing/2017/decorative" val="1"/>
               </a:ext>
             </a:extLst>
           </p:cNvPr>
@@ -22683,7 +22683,7 @@
                 <a16:creationId xmlns:a16="http://schemas.microsoft.com/office/drawing/2014/main" id="{F98810A7-E114-447A-A7D6-69B27CFB5650}"/>
               </a:ext>
               <a:ext uri="{C183D7F6-B498-43B3-948B-1728B52AA6E4}">
-                <adec:decorative xmlns:adec="http://schemas.microsoft.com/office/drawing/2017/decorative" xmlns="" val="1"/>
+                <adec:decorative xmlns="" xmlns:adec="http://schemas.microsoft.com/office/drawing/2017/decorative" val="1"/>
               </a:ext>
             </a:extLst>
           </p:cNvPr>
@@ -22832,7 +22832,7 @@
                 <a16:creationId xmlns:a16="http://schemas.microsoft.com/office/drawing/2014/main" id="{DF19BAF3-7E20-4B9D-B544-BABAEEA1FA75}"/>
               </a:ext>
               <a:ext uri="{C183D7F6-B498-43B3-948B-1728B52AA6E4}">
-                <adec:decorative xmlns:adec="http://schemas.microsoft.com/office/drawing/2017/decorative" xmlns="" val="1"/>
+                <adec:decorative xmlns="" xmlns:adec="http://schemas.microsoft.com/office/drawing/2017/decorative" val="1"/>
               </a:ext>
             </a:extLst>
           </p:cNvPr>
@@ -22876,7 +22876,7 @@
                 <a16:creationId xmlns:a16="http://schemas.microsoft.com/office/drawing/2014/main" id="{950648F4-ABCD-4DF0-8641-76CFB2354721}"/>
               </a:ext>
               <a:ext uri="{C183D7F6-B498-43B3-948B-1728B52AA6E4}">
-                <adec:decorative xmlns:adec="http://schemas.microsoft.com/office/drawing/2017/decorative" xmlns="" val="1"/>
+                <adec:decorative xmlns="" xmlns:adec="http://schemas.microsoft.com/office/drawing/2017/decorative" val="1"/>
               </a:ext>
             </a:extLst>
           </p:cNvPr>
@@ -22920,7 +22920,7 @@
                 <a16:creationId xmlns:a16="http://schemas.microsoft.com/office/drawing/2014/main" id="{989BE678-777B-482A-A616-FEDC47B162E5}"/>
               </a:ext>
               <a:ext uri="{C183D7F6-B498-43B3-948B-1728B52AA6E4}">
-                <adec:decorative xmlns:adec="http://schemas.microsoft.com/office/drawing/2017/decorative" xmlns="" val="1"/>
+                <adec:decorative xmlns="" xmlns:adec="http://schemas.microsoft.com/office/drawing/2017/decorative" val="1"/>
               </a:ext>
             </a:extLst>
           </p:cNvPr>
@@ -23000,7 +23000,7 @@
                 <a16:creationId xmlns:a16="http://schemas.microsoft.com/office/drawing/2014/main" id="{CF1EB4BD-9C7E-4AA3-9681-C7EB0DA6250B}"/>
               </a:ext>
               <a:ext uri="{C183D7F6-B498-43B3-948B-1728B52AA6E4}">
-                <adec:decorative xmlns:adec="http://schemas.microsoft.com/office/drawing/2017/decorative" xmlns="" val="1"/>
+                <adec:decorative xmlns="" xmlns:adec="http://schemas.microsoft.com/office/drawing/2017/decorative" val="1"/>
               </a:ext>
             </a:extLst>
           </p:cNvPr>
@@ -23044,7 +23044,7 @@
                 <a16:creationId xmlns:a16="http://schemas.microsoft.com/office/drawing/2014/main" id="{94AAE3AA-3759-4D28-B0EF-575F25A5146C}"/>
               </a:ext>
               <a:ext uri="{C183D7F6-B498-43B3-948B-1728B52AA6E4}">
-                <adec:decorative xmlns:adec="http://schemas.microsoft.com/office/drawing/2017/decorative" xmlns="" val="1"/>
+                <adec:decorative xmlns="" xmlns:adec="http://schemas.microsoft.com/office/drawing/2017/decorative" val="1"/>
               </a:ext>
             </a:extLst>
           </p:cNvPr>
@@ -23088,7 +23088,7 @@
                 <a16:creationId xmlns:a16="http://schemas.microsoft.com/office/drawing/2014/main" id="{D28BE0C3-2102-4820-B88B-A448B1840D14}"/>
               </a:ext>
               <a:ext uri="{C183D7F6-B498-43B3-948B-1728B52AA6E4}">
-                <adec:decorative xmlns:adec="http://schemas.microsoft.com/office/drawing/2017/decorative" xmlns="" val="1"/>
+                <adec:decorative xmlns="" xmlns:adec="http://schemas.microsoft.com/office/drawing/2017/decorative" val="1"/>
               </a:ext>
             </a:extLst>
           </p:cNvPr>
@@ -23141,7 +23141,7 @@
                 <a16:creationId xmlns:a16="http://schemas.microsoft.com/office/drawing/2014/main" id="{F3F4807A-5068-4492-8025-D75F320E908D}"/>
               </a:ext>
               <a:ext uri="{C183D7F6-B498-43B3-948B-1728B52AA6E4}">
-                <adec:decorative xmlns:adec="http://schemas.microsoft.com/office/drawing/2017/decorative" xmlns="" val="1"/>
+                <adec:decorative xmlns="" xmlns:adec="http://schemas.microsoft.com/office/drawing/2017/decorative" val="1"/>
               </a:ext>
             </a:extLst>
           </p:cNvPr>
@@ -23242,7 +23242,7 @@
                 <a16:creationId xmlns:a16="http://schemas.microsoft.com/office/drawing/2014/main" id="{B24996F8-180C-4DCB-8A26-DFA336CDEFBC}"/>
               </a:ext>
               <a:ext uri="{C183D7F6-B498-43B3-948B-1728B52AA6E4}">
-                <adec:decorative xmlns:adec="http://schemas.microsoft.com/office/drawing/2017/decorative" xmlns="" val="1"/>
+                <adec:decorative xmlns="" xmlns:adec="http://schemas.microsoft.com/office/drawing/2017/decorative" val="1"/>
               </a:ext>
             </a:extLst>
           </p:cNvPr>
@@ -23808,7 +23808,7 @@
                 <a16:creationId xmlns:a16="http://schemas.microsoft.com/office/drawing/2014/main" id="{630182B0-3559-41D5-9EBC-0BD86BEDAD09}"/>
               </a:ext>
               <a:ext uri="{C183D7F6-B498-43B3-948B-1728B52AA6E4}">
-                <adec:decorative xmlns:adec="http://schemas.microsoft.com/office/drawing/2017/decorative" xmlns="" val="1"/>
+                <adec:decorative xmlns="" xmlns:adec="http://schemas.microsoft.com/office/drawing/2017/decorative" val="1"/>
               </a:ext>
             </a:extLst>
           </p:cNvPr>
@@ -23918,7 +23918,7 @@
                 <a16:creationId xmlns:a16="http://schemas.microsoft.com/office/drawing/2014/main" id="{0D9B8FD4-CDEB-4EB4-B4DE-C89E11938958}"/>
               </a:ext>
               <a:ext uri="{C183D7F6-B498-43B3-948B-1728B52AA6E4}">
-                <adec:decorative xmlns:adec="http://schemas.microsoft.com/office/drawing/2017/decorative" xmlns="" val="1"/>
+                <adec:decorative xmlns="" xmlns:adec="http://schemas.microsoft.com/office/drawing/2017/decorative" val="1"/>
               </a:ext>
             </a:extLst>
           </p:cNvPr>
@@ -23978,7 +23978,7 @@
                 <a16:creationId xmlns:a16="http://schemas.microsoft.com/office/drawing/2014/main" id="{5A2E3D1D-9E9F-4739-BA14-D4D7FA9FBDD1}"/>
               </a:ext>
               <a:ext uri="{C183D7F6-B498-43B3-948B-1728B52AA6E4}">
-                <adec:decorative xmlns:adec="http://schemas.microsoft.com/office/drawing/2017/decorative" xmlns="" val="1"/>
+                <adec:decorative xmlns="" xmlns:adec="http://schemas.microsoft.com/office/drawing/2017/decorative" val="1"/>
               </a:ext>
             </a:extLst>
           </p:cNvPr>
@@ -24330,7 +24330,7 @@
                 <a16:creationId xmlns:a16="http://schemas.microsoft.com/office/drawing/2014/main" id="{1FFB365B-E9DC-4859-B8AB-CB83EEBE4E28}"/>
               </a:ext>
               <a:ext uri="{C183D7F6-B498-43B3-948B-1728B52AA6E4}">
-                <adec:decorative xmlns:adec="http://schemas.microsoft.com/office/drawing/2017/decorative" xmlns="" val="1"/>
+                <adec:decorative xmlns="" xmlns:adec="http://schemas.microsoft.com/office/drawing/2017/decorative" val="1"/>
               </a:ext>
             </a:extLst>
           </p:cNvPr>
@@ -24820,7 +24820,7 @@
                 <a16:creationId xmlns:a16="http://schemas.microsoft.com/office/drawing/2014/main" id="{8ADAB9C8-EB37-4914-A699-C716FC8FE4FE}"/>
               </a:ext>
               <a:ext uri="{C183D7F6-B498-43B3-948B-1728B52AA6E4}">
-                <adec:decorative xmlns:adec="http://schemas.microsoft.com/office/drawing/2017/decorative" xmlns="" val="1"/>
+                <adec:decorative xmlns="" xmlns:adec="http://schemas.microsoft.com/office/drawing/2017/decorative" val="1"/>
               </a:ext>
             </a:extLst>
           </p:cNvPr>
@@ -25091,7 +25091,7 @@
                 <a16:creationId xmlns:a16="http://schemas.microsoft.com/office/drawing/2014/main" id="{0D9B8FD4-CDEB-4EB4-B4DE-C89E11938958}"/>
               </a:ext>
               <a:ext uri="{C183D7F6-B498-43B3-948B-1728B52AA6E4}">
-                <adec:decorative xmlns:adec="http://schemas.microsoft.com/office/drawing/2017/decorative" xmlns="" val="1"/>
+                <adec:decorative xmlns="" xmlns:adec="http://schemas.microsoft.com/office/drawing/2017/decorative" val="1"/>
               </a:ext>
             </a:extLst>
           </p:cNvPr>
@@ -25151,7 +25151,7 @@
                 <a16:creationId xmlns:a16="http://schemas.microsoft.com/office/drawing/2014/main" id="{5A2E3D1D-9E9F-4739-BA14-D4D7FA9FBDD1}"/>
               </a:ext>
               <a:ext uri="{C183D7F6-B498-43B3-948B-1728B52AA6E4}">
-                <adec:decorative xmlns:adec="http://schemas.microsoft.com/office/drawing/2017/decorative" xmlns="" val="1"/>
+                <adec:decorative xmlns="" xmlns:adec="http://schemas.microsoft.com/office/drawing/2017/decorative" val="1"/>
               </a:ext>
             </a:extLst>
           </p:cNvPr>
@@ -25503,7 +25503,7 @@
                 <a16:creationId xmlns:a16="http://schemas.microsoft.com/office/drawing/2014/main" id="{1FFB365B-E9DC-4859-B8AB-CB83EEBE4E28}"/>
               </a:ext>
               <a:ext uri="{C183D7F6-B498-43B3-948B-1728B52AA6E4}">
-                <adec:decorative xmlns:adec="http://schemas.microsoft.com/office/drawing/2017/decorative" xmlns="" val="1"/>
+                <adec:decorative xmlns="" xmlns:adec="http://schemas.microsoft.com/office/drawing/2017/decorative" val="1"/>
               </a:ext>
             </a:extLst>
           </p:cNvPr>
@@ -25993,7 +25993,7 @@
                 <a16:creationId xmlns:a16="http://schemas.microsoft.com/office/drawing/2014/main" id="{8ADAB9C8-EB37-4914-A699-C716FC8FE4FE}"/>
               </a:ext>
               <a:ext uri="{C183D7F6-B498-43B3-948B-1728B52AA6E4}">
-                <adec:decorative xmlns:adec="http://schemas.microsoft.com/office/drawing/2017/decorative" xmlns="" val="1"/>
+                <adec:decorative xmlns="" xmlns:adec="http://schemas.microsoft.com/office/drawing/2017/decorative" val="1"/>
               </a:ext>
             </a:extLst>
           </p:cNvPr>
@@ -26347,13 +26347,13 @@
       </p:grpSpPr>
       <p:sp useBgFill="1">
         <p:nvSpPr>
-          <p:cNvPr id="11" name="Rectangle 7">
+          <p:cNvPr id="8" name="Rectangle 7">
             <a:extLst>
               <a:ext uri="{FF2B5EF4-FFF2-40B4-BE49-F238E27FC236}">
                 <a16:creationId xmlns:a16="http://schemas.microsoft.com/office/drawing/2014/main" id="{0D9B8FD4-CDEB-4EB4-B4DE-C89E11938958}"/>
               </a:ext>
               <a:ext uri="{C183D7F6-B498-43B3-948B-1728B52AA6E4}">
-                <adec:decorative xmlns:adec="http://schemas.microsoft.com/office/drawing/2017/decorative" xmlns="" val="1"/>
+                <adec:decorative xmlns="" xmlns:adec="http://schemas.microsoft.com/office/drawing/2017/decorative" val="1"/>
               </a:ext>
             </a:extLst>
           </p:cNvPr>
@@ -26407,13 +26407,13 @@
       </p:sp>
       <p:sp>
         <p:nvSpPr>
-          <p:cNvPr id="13" name="Freeform 36">
+          <p:cNvPr id="10" name="Freeform 36">
             <a:extLst>
               <a:ext uri="{FF2B5EF4-FFF2-40B4-BE49-F238E27FC236}">
                 <a16:creationId xmlns:a16="http://schemas.microsoft.com/office/drawing/2014/main" id="{5A2E3D1D-9E9F-4739-BA14-D4D7FA9FBDD1}"/>
               </a:ext>
               <a:ext uri="{C183D7F6-B498-43B3-948B-1728B52AA6E4}">
-                <adec:decorative xmlns:adec="http://schemas.microsoft.com/office/drawing/2017/decorative" xmlns="" val="1"/>
+                <adec:decorative xmlns="" xmlns:adec="http://schemas.microsoft.com/office/drawing/2017/decorative" val="1"/>
               </a:ext>
             </a:extLst>
           </p:cNvPr>
@@ -26759,13 +26759,13 @@
       </p:sp>
       <p:sp>
         <p:nvSpPr>
-          <p:cNvPr id="15" name="Freeform: Shape 11">
+          <p:cNvPr id="12" name="Freeform: Shape 11">
             <a:extLst>
               <a:ext uri="{FF2B5EF4-FFF2-40B4-BE49-F238E27FC236}">
                 <a16:creationId xmlns:a16="http://schemas.microsoft.com/office/drawing/2014/main" id="{1FFB365B-E9DC-4859-B8AB-CB83EEBE4E28}"/>
               </a:ext>
               <a:ext uri="{C183D7F6-B498-43B3-948B-1728B52AA6E4}">
-                <adec:decorative xmlns:adec="http://schemas.microsoft.com/office/drawing/2017/decorative" xmlns="" val="1"/>
+                <adec:decorative xmlns="" xmlns:adec="http://schemas.microsoft.com/office/drawing/2017/decorative" val="1"/>
               </a:ext>
             </a:extLst>
           </p:cNvPr>
@@ -27249,1195 +27249,13 @@
       </p:sp>
       <p:sp>
         <p:nvSpPr>
-          <p:cNvPr id="17" name="Rectangle 13">
-            <a:extLst>
-              <a:ext uri="{FF2B5EF4-FFF2-40B4-BE49-F238E27FC236}">
-                <a16:creationId xmlns:a16="http://schemas.microsoft.com/office/drawing/2014/main" id="{8ADAB9C8-EB37-4914-A699-C716FC8FE4FE}"/>
-              </a:ext>
-              <a:ext uri="{C183D7F6-B498-43B3-948B-1728B52AA6E4}">
-                <adec:decorative xmlns:adec="http://schemas.microsoft.com/office/drawing/2017/decorative" xmlns="" val="1"/>
-              </a:ext>
-            </a:extLst>
-          </p:cNvPr>
-          <p:cNvSpPr>
-            <a:spLocks noGrp="1" noRot="1" noChangeAspect="1" noMove="1" noResize="1" noEditPoints="1" noAdjustHandles="1" noChangeArrowheads="1" noChangeShapeType="1" noTextEdit="1"/>
-          </p:cNvSpPr>
-          <p:nvPr>
-            <p:extLst>
-              <p:ext uri="{386F3935-93C4-4BCD-93E2-E3B085C9AB24}">
-                <p16:designElem xmlns:p16="http://schemas.microsoft.com/office/powerpoint/2015/main" val="1"/>
-              </p:ext>
-            </p:extLst>
-          </p:nvPr>
-        </p:nvSpPr>
-        <p:spPr>
-          <a:xfrm>
-            <a:off x="10437812" y="0"/>
-            <a:ext cx="685800" cy="1143000"/>
-          </a:xfrm>
-          <a:prstGeom prst="rect">
-            <a:avLst/>
-          </a:prstGeom>
-          <a:solidFill>
-            <a:schemeClr val="accent1"/>
-          </a:solidFill>
-          <a:ln>
-            <a:noFill/>
-          </a:ln>
-        </p:spPr>
-        <p:style>
-          <a:lnRef idx="1">
-            <a:schemeClr val="accent1"/>
-          </a:lnRef>
-          <a:fillRef idx="3">
-            <a:schemeClr val="accent1"/>
-          </a:fillRef>
-          <a:effectRef idx="2">
-            <a:schemeClr val="accent1"/>
-          </a:effectRef>
-          <a:fontRef idx="minor">
-            <a:schemeClr val="lt1"/>
-          </a:fontRef>
-        </p:style>
-      </p:sp>
-      <p:sp>
-        <p:nvSpPr>
-          <p:cNvPr id="2" name="Título 1">
-            <a:extLst>
-              <a:ext uri="{FF2B5EF4-FFF2-40B4-BE49-F238E27FC236}">
-                <a16:creationId xmlns:a16="http://schemas.microsoft.com/office/drawing/2014/main" id="{766E7729-507A-4963-8D21-F1DA9947AF7B}"/>
-              </a:ext>
-            </a:extLst>
-          </p:cNvPr>
-          <p:cNvSpPr>
-            <a:spLocks noGrp="1"/>
-          </p:cNvSpPr>
-          <p:nvPr>
-            <p:ph type="title"/>
-          </p:nvPr>
-        </p:nvSpPr>
-        <p:spPr>
-          <a:xfrm>
-            <a:off x="653143" y="1645920"/>
-            <a:ext cx="3522879" cy="4470821"/>
-          </a:xfrm>
-        </p:spPr>
-        <p:txBody>
-          <a:bodyPr>
-            <a:normAutofit/>
-          </a:bodyPr>
-          <a:lstStyle/>
-          <a:p>
-            <a:pPr algn="r"/>
-            <a:r>
-              <a:rPr lang="pt-BR">
-                <a:solidFill>
-                  <a:schemeClr val="bg2"/>
-                </a:solidFill>
-                <a:latin typeface="Arial" panose="020B0604020202020204" pitchFamily="34" charset="0"/>
-                <a:cs typeface="Arial" panose="020B0604020202020204" pitchFamily="34" charset="0"/>
-              </a:rPr>
-              <a:t>Roadmap</a:t>
-            </a:r>
-          </a:p>
-        </p:txBody>
-      </p:sp>
-      <p:sp>
-        <p:nvSpPr>
-          <p:cNvPr id="3" name="Espaço Reservado para Conteúdo 2">
-            <a:extLst>
-              <a:ext uri="{FF2B5EF4-FFF2-40B4-BE49-F238E27FC236}">
-                <a16:creationId xmlns:a16="http://schemas.microsoft.com/office/drawing/2014/main" id="{78875C80-6D58-4D9A-93D9-1A0771E562AE}"/>
-              </a:ext>
-            </a:extLst>
-          </p:cNvPr>
-          <p:cNvSpPr>
-            <a:spLocks noGrp="1"/>
-          </p:cNvSpPr>
-          <p:nvPr>
-            <p:ph idx="1"/>
-          </p:nvPr>
-        </p:nvSpPr>
-        <p:spPr>
-          <a:xfrm>
-            <a:off x="5204109" y="1645920"/>
-            <a:ext cx="6269434" cy="4873387"/>
-          </a:xfrm>
-        </p:spPr>
-        <p:txBody>
-          <a:bodyPr vert="horz" lIns="91440" tIns="45720" rIns="91440" bIns="45720" rtlCol="0" anchor="t">
-            <a:noAutofit/>
-          </a:bodyPr>
-          <a:lstStyle/>
-          <a:p>
-            <a:r>
-              <a:rPr lang="pt-BR" sz="2800" dirty="0">
-                <a:latin typeface="Arial"/>
-                <a:cs typeface="Arial"/>
-              </a:rPr>
-              <a:t>Veremos por aqui, caminhos a seguir de um desenvolvedor web.</a:t>
-            </a:r>
-          </a:p>
-          <a:p>
-            <a:pPr marL="0" indent="0">
-              <a:buNone/>
-            </a:pPr>
-            <a:endParaRPr lang="pt-BR" sz="2800" dirty="0">
-              <a:latin typeface="Arial"/>
-              <a:cs typeface="Arial"/>
-            </a:endParaRPr>
-          </a:p>
-          <a:p>
-            <a:r>
-              <a:rPr lang="pt-BR" sz="2800" dirty="0">
-                <a:latin typeface="Arial"/>
-                <a:cs typeface="Arial"/>
-              </a:rPr>
-              <a:t>Link do site:</a:t>
-            </a:r>
-          </a:p>
-          <a:p>
-            <a:pPr marL="0" indent="0">
-              <a:buNone/>
-            </a:pPr>
-            <a:r>
-              <a:rPr lang="pt-BR" sz="2800" dirty="0">
-                <a:latin typeface="Arial"/>
-                <a:cs typeface="Arial"/>
-                <a:hlinkClick r:id="rId3"/>
-              </a:rPr>
-              <a:t>https://roadmap.sh/</a:t>
-            </a:r>
-            <a:endParaRPr lang="pt-BR" sz="2800" dirty="0">
-              <a:latin typeface="Arial"/>
-              <a:cs typeface="Arial"/>
-            </a:endParaRPr>
-          </a:p>
-          <a:p>
-            <a:pPr marL="0" indent="0">
-              <a:buNone/>
-            </a:pPr>
-            <a:endParaRPr lang="pt-BR" sz="2800" dirty="0">
-              <a:latin typeface="Arial"/>
-              <a:cs typeface="Arial"/>
-            </a:endParaRPr>
-          </a:p>
-          <a:p>
-            <a:r>
-              <a:rPr lang="pt-BR" sz="2800" dirty="0">
-                <a:latin typeface="Arial"/>
-                <a:cs typeface="Arial"/>
-              </a:rPr>
-              <a:t>Link para o </a:t>
-            </a:r>
-            <a:r>
-              <a:rPr lang="pt-BR" sz="2800" dirty="0" err="1">
-                <a:latin typeface="Arial"/>
-                <a:cs typeface="Arial"/>
-              </a:rPr>
-              <a:t>Roadmap</a:t>
-            </a:r>
-            <a:r>
-              <a:rPr lang="pt-BR" sz="2800" dirty="0">
-                <a:latin typeface="Arial"/>
-                <a:cs typeface="Arial"/>
-              </a:rPr>
-              <a:t> (direto):</a:t>
-            </a:r>
-          </a:p>
-          <a:p>
-            <a:pPr marL="0" indent="0">
-              <a:buNone/>
-            </a:pPr>
-            <a:r>
-              <a:rPr lang="pt-BR" sz="2800" dirty="0">
-                <a:latin typeface="Arial"/>
-                <a:cs typeface="Arial"/>
-                <a:hlinkClick r:id="rId4"/>
-              </a:rPr>
-              <a:t>https://github.com/kamranahmedse/developer-roadmap</a:t>
-            </a:r>
-            <a:endParaRPr lang="pt-BR" sz="2800" dirty="0">
-              <a:latin typeface="Arial"/>
-              <a:cs typeface="Arial"/>
-            </a:endParaRPr>
-          </a:p>
-          <a:p>
-            <a:pPr marL="0" indent="0">
-              <a:buNone/>
-            </a:pPr>
-            <a:endParaRPr lang="pt-BR" dirty="0"/>
-          </a:p>
-        </p:txBody>
-      </p:sp>
-    </p:spTree>
-    <p:extLst>
-      <p:ext uri="{BB962C8B-B14F-4D97-AF65-F5344CB8AC3E}">
-        <p14:creationId xmlns:p14="http://schemas.microsoft.com/office/powerpoint/2010/main" val="1302451237"/>
-      </p:ext>
-    </p:extLst>
-  </p:cSld>
-  <p:clrMapOvr>
-    <a:masterClrMapping/>
-  </p:clrMapOvr>
-  <p:transition spd="med">
-    <p:pull/>
-  </p:transition>
-</p:sld>
-</file>
-
-<file path=ppt/slides/slide19.xml><?xml version="1.0" encoding="utf-8"?>
-<p:sld xmlns:a="http://schemas.openxmlformats.org/drawingml/2006/main" xmlns:r="http://schemas.openxmlformats.org/officeDocument/2006/relationships" xmlns:p="http://schemas.openxmlformats.org/presentationml/2006/main">
-  <p:cSld>
-    <p:bg>
-      <p:bgPr>
-        <a:blipFill rotWithShape="1">
-          <a:blip r:embed="rId2">
-            <a:duotone>
-              <a:schemeClr val="bg2">
-                <a:shade val="69000"/>
-                <a:hueMod val="108000"/>
-                <a:satMod val="164000"/>
-                <a:lumMod val="74000"/>
-              </a:schemeClr>
-              <a:schemeClr val="bg2">
-                <a:tint val="96000"/>
-                <a:hueMod val="88000"/>
-                <a:satMod val="140000"/>
-                <a:lumMod val="132000"/>
-              </a:schemeClr>
-            </a:duotone>
-          </a:blip>
-          <a:stretch/>
-        </a:blipFill>
-        <a:effectLst/>
-      </p:bgPr>
-    </p:bg>
-    <p:spTree>
-      <p:nvGrpSpPr>
-        <p:cNvPr id="1" name=""/>
-        <p:cNvGrpSpPr/>
-        <p:nvPr/>
-      </p:nvGrpSpPr>
-      <p:grpSpPr>
-        <a:xfrm>
-          <a:off x="0" y="0"/>
-          <a:ext cx="0" cy="0"/>
-          <a:chOff x="0" y="0"/>
-          <a:chExt cx="0" cy="0"/>
-        </a:xfrm>
-      </p:grpSpPr>
-      <p:sp useBgFill="1">
-        <p:nvSpPr>
-          <p:cNvPr id="8" name="Rectangle 7">
-            <a:extLst>
-              <a:ext uri="{FF2B5EF4-FFF2-40B4-BE49-F238E27FC236}">
-                <a16:creationId xmlns:a16="http://schemas.microsoft.com/office/drawing/2014/main" id="{0D9B8FD4-CDEB-4EB4-B4DE-C89E11938958}"/>
-              </a:ext>
-              <a:ext uri="{C183D7F6-B498-43B3-948B-1728B52AA6E4}">
-                <adec:decorative xmlns:adec="http://schemas.microsoft.com/office/drawing/2017/decorative" xmlns="" val="1"/>
-              </a:ext>
-            </a:extLst>
-          </p:cNvPr>
-          <p:cNvSpPr>
-            <a:spLocks noGrp="1" noRot="1" noChangeAspect="1" noMove="1" noResize="1" noEditPoints="1" noAdjustHandles="1" noChangeArrowheads="1" noChangeShapeType="1" noTextEdit="1"/>
-          </p:cNvSpPr>
-          <p:nvPr>
-            <p:extLst>
-              <p:ext uri="{386F3935-93C4-4BCD-93E2-E3B085C9AB24}">
-                <p16:designElem xmlns:p16="http://schemas.microsoft.com/office/powerpoint/2015/main" val="1"/>
-              </p:ext>
-            </p:extLst>
-          </p:nvPr>
-        </p:nvSpPr>
-        <p:spPr>
-          <a:xfrm>
-            <a:off x="1" y="0"/>
-            <a:ext cx="12192000" cy="6858000"/>
-          </a:xfrm>
-          <a:prstGeom prst="rect">
-            <a:avLst/>
-          </a:prstGeom>
-          <a:ln>
-            <a:noFill/>
-          </a:ln>
-        </p:spPr>
-        <p:style>
-          <a:lnRef idx="2">
-            <a:schemeClr val="accent1">
-              <a:shade val="50000"/>
-            </a:schemeClr>
-          </a:lnRef>
-          <a:fillRef idx="1003">
-            <a:schemeClr val="dk2"/>
-          </a:fillRef>
-          <a:effectRef idx="0">
-            <a:schemeClr val="accent1"/>
-          </a:effectRef>
-          <a:fontRef idx="minor">
-            <a:schemeClr val="lt1"/>
-          </a:fontRef>
-        </p:style>
-        <p:txBody>
-          <a:bodyPr rtlCol="0" anchor="ctr"/>
-          <a:lstStyle/>
-          <a:p>
-            <a:pPr algn="ctr"/>
-            <a:endParaRPr lang="en-US"/>
-          </a:p>
-        </p:txBody>
-      </p:sp>
-      <p:sp>
-        <p:nvSpPr>
-          <p:cNvPr id="10" name="Freeform 36">
-            <a:extLst>
-              <a:ext uri="{FF2B5EF4-FFF2-40B4-BE49-F238E27FC236}">
-                <a16:creationId xmlns:a16="http://schemas.microsoft.com/office/drawing/2014/main" id="{5A2E3D1D-9E9F-4739-BA14-D4D7FA9FBDD1}"/>
-              </a:ext>
-              <a:ext uri="{C183D7F6-B498-43B3-948B-1728B52AA6E4}">
-                <adec:decorative xmlns:adec="http://schemas.microsoft.com/office/drawing/2017/decorative" xmlns="" val="1"/>
-              </a:ext>
-            </a:extLst>
-          </p:cNvPr>
-          <p:cNvSpPr>
-            <a:spLocks noGrp="1" noRot="1" noChangeAspect="1" noMove="1" noResize="1" noEditPoints="1" noAdjustHandles="1" noChangeArrowheads="1" noChangeShapeType="1" noTextEdit="1"/>
-          </p:cNvSpPr>
-          <p:nvPr>
-            <p:extLst>
-              <p:ext uri="{386F3935-93C4-4BCD-93E2-E3B085C9AB24}">
-                <p16:designElem xmlns:p16="http://schemas.microsoft.com/office/powerpoint/2015/main" val="1"/>
-              </p:ext>
-            </p:extLst>
-          </p:nvPr>
-        </p:nvSpPr>
-        <p:spPr>
-          <a:xfrm flipH="1">
-            <a:off x="4644637" y="0"/>
-            <a:ext cx="559472" cy="3709642"/>
-          </a:xfrm>
-          <a:custGeom>
-            <a:avLst/>
-            <a:gdLst>
-              <a:gd name="connsiteX0" fmla="*/ 0 w 559472"/>
-              <a:gd name="connsiteY0" fmla="*/ 0 h 3709642"/>
-              <a:gd name="connsiteX1" fmla="*/ 473952 w 559472"/>
-              <a:gd name="connsiteY1" fmla="*/ 0 h 3709642"/>
-              <a:gd name="connsiteX2" fmla="*/ 485840 w 559472"/>
-              <a:gd name="connsiteY2" fmla="*/ 161194 h 3709642"/>
-              <a:gd name="connsiteX3" fmla="*/ 523949 w 559472"/>
-              <a:gd name="connsiteY3" fmla="*/ 3672197 h 3709642"/>
-              <a:gd name="connsiteX4" fmla="*/ 454748 w 559472"/>
-              <a:gd name="connsiteY4" fmla="*/ 3709642 h 3709642"/>
-              <a:gd name="connsiteX5" fmla="*/ 448224 w 559472"/>
-              <a:gd name="connsiteY5" fmla="*/ 3510471 h 3709642"/>
-              <a:gd name="connsiteX6" fmla="*/ 443564 w 559472"/>
-              <a:gd name="connsiteY6" fmla="*/ 3408563 h 3709642"/>
-              <a:gd name="connsiteX7" fmla="*/ 438902 w 559472"/>
-              <a:gd name="connsiteY7" fmla="*/ 3304407 h 3709642"/>
-              <a:gd name="connsiteX8" fmla="*/ 433941 w 559472"/>
-              <a:gd name="connsiteY8" fmla="*/ 3198777 h 3709642"/>
-              <a:gd name="connsiteX9" fmla="*/ 427584 w 559472"/>
-              <a:gd name="connsiteY9" fmla="*/ 3092510 h 3709642"/>
-              <a:gd name="connsiteX10" fmla="*/ 420988 w 559472"/>
-              <a:gd name="connsiteY10" fmla="*/ 2984390 h 3709642"/>
-              <a:gd name="connsiteX11" fmla="*/ 414330 w 559472"/>
-              <a:gd name="connsiteY11" fmla="*/ 2874401 h 3709642"/>
-              <a:gd name="connsiteX12" fmla="*/ 406840 w 559472"/>
-              <a:gd name="connsiteY12" fmla="*/ 2762980 h 3709642"/>
-              <a:gd name="connsiteX13" fmla="*/ 397745 w 559472"/>
-              <a:gd name="connsiteY13" fmla="*/ 2650566 h 3709642"/>
-              <a:gd name="connsiteX14" fmla="*/ 389154 w 559472"/>
-              <a:gd name="connsiteY14" fmla="*/ 2536612 h 3709642"/>
-              <a:gd name="connsiteX15" fmla="*/ 379225 w 559472"/>
-              <a:gd name="connsiteY15" fmla="*/ 2421642 h 3709642"/>
-              <a:gd name="connsiteX16" fmla="*/ 368316 w 559472"/>
-              <a:gd name="connsiteY16" fmla="*/ 2305627 h 3709642"/>
-              <a:gd name="connsiteX17" fmla="*/ 357466 w 559472"/>
-              <a:gd name="connsiteY17" fmla="*/ 2189233 h 3709642"/>
-              <a:gd name="connsiteX18" fmla="*/ 344982 w 559472"/>
-              <a:gd name="connsiteY18" fmla="*/ 2071473 h 3709642"/>
-              <a:gd name="connsiteX19" fmla="*/ 332466 w 559472"/>
-              <a:gd name="connsiteY19" fmla="*/ 1952216 h 3709642"/>
-              <a:gd name="connsiteX20" fmla="*/ 319121 w 559472"/>
-              <a:gd name="connsiteY20" fmla="*/ 1833776 h 3709642"/>
-              <a:gd name="connsiteX21" fmla="*/ 304408 w 559472"/>
-              <a:gd name="connsiteY21" fmla="*/ 1713948 h 3709642"/>
-              <a:gd name="connsiteX22" fmla="*/ 288685 w 559472"/>
-              <a:gd name="connsiteY22" fmla="*/ 1592703 h 3709642"/>
-              <a:gd name="connsiteX23" fmla="*/ 273050 w 559472"/>
-              <a:gd name="connsiteY23" fmla="*/ 1471451 h 3709642"/>
-              <a:gd name="connsiteX24" fmla="*/ 255813 w 559472"/>
-              <a:gd name="connsiteY24" fmla="*/ 1350328 h 3709642"/>
-              <a:gd name="connsiteX25" fmla="*/ 237060 w 559472"/>
-              <a:gd name="connsiteY25" fmla="*/ 1227080 h 3709642"/>
-              <a:gd name="connsiteX26" fmla="*/ 218488 w 559472"/>
-              <a:gd name="connsiteY26" fmla="*/ 1106065 h 3709642"/>
-              <a:gd name="connsiteX27" fmla="*/ 198221 w 559472"/>
-              <a:gd name="connsiteY27" fmla="*/ 982940 h 3709642"/>
-              <a:gd name="connsiteX28" fmla="*/ 177152 w 559472"/>
-              <a:gd name="connsiteY28" fmla="*/ 858755 h 3709642"/>
-              <a:gd name="connsiteX29" fmla="*/ 155551 w 559472"/>
-              <a:gd name="connsiteY29" fmla="*/ 736861 h 3709642"/>
-              <a:gd name="connsiteX30" fmla="*/ 131782 w 559472"/>
-              <a:gd name="connsiteY30" fmla="*/ 613645 h 3709642"/>
-              <a:gd name="connsiteX31" fmla="*/ 107123 w 559472"/>
-              <a:gd name="connsiteY31" fmla="*/ 490500 h 3709642"/>
-              <a:gd name="connsiteX32" fmla="*/ 82552 w 559472"/>
-              <a:gd name="connsiteY32" fmla="*/ 367348 h 3709642"/>
-              <a:gd name="connsiteX33" fmla="*/ 55608 w 559472"/>
-              <a:gd name="connsiteY33" fmla="*/ 244762 h 3709642"/>
-              <a:gd name="connsiteX34" fmla="*/ 28130 w 559472"/>
-              <a:gd name="connsiteY34" fmla="*/ 122220 h 3709642"/>
-              <a:gd name="connsiteX35" fmla="*/ 0 w 559472"/>
-              <a:gd name="connsiteY35" fmla="*/ 0 h 3709642"/>
-            </a:gdLst>
-            <a:ahLst/>
-            <a:cxnLst>
-              <a:cxn ang="0">
-                <a:pos x="connsiteX0" y="connsiteY0"/>
-              </a:cxn>
-              <a:cxn ang="0">
-                <a:pos x="connsiteX1" y="connsiteY1"/>
-              </a:cxn>
-              <a:cxn ang="0">
-                <a:pos x="connsiteX2" y="connsiteY2"/>
-              </a:cxn>
-              <a:cxn ang="0">
-                <a:pos x="connsiteX3" y="connsiteY3"/>
-              </a:cxn>
-              <a:cxn ang="0">
-                <a:pos x="connsiteX4" y="connsiteY4"/>
-              </a:cxn>
-              <a:cxn ang="0">
-                <a:pos x="connsiteX5" y="connsiteY5"/>
-              </a:cxn>
-              <a:cxn ang="0">
-                <a:pos x="connsiteX6" y="connsiteY6"/>
-              </a:cxn>
-              <a:cxn ang="0">
-                <a:pos x="connsiteX7" y="connsiteY7"/>
-              </a:cxn>
-              <a:cxn ang="0">
-                <a:pos x="connsiteX8" y="connsiteY8"/>
-              </a:cxn>
-              <a:cxn ang="0">
-                <a:pos x="connsiteX9" y="connsiteY9"/>
-              </a:cxn>
-              <a:cxn ang="0">
-                <a:pos x="connsiteX10" y="connsiteY10"/>
-              </a:cxn>
-              <a:cxn ang="0">
-                <a:pos x="connsiteX11" y="connsiteY11"/>
-              </a:cxn>
-              <a:cxn ang="0">
-                <a:pos x="connsiteX12" y="connsiteY12"/>
-              </a:cxn>
-              <a:cxn ang="0">
-                <a:pos x="connsiteX13" y="connsiteY13"/>
-              </a:cxn>
-              <a:cxn ang="0">
-                <a:pos x="connsiteX14" y="connsiteY14"/>
-              </a:cxn>
-              <a:cxn ang="0">
-                <a:pos x="connsiteX15" y="connsiteY15"/>
-              </a:cxn>
-              <a:cxn ang="0">
-                <a:pos x="connsiteX16" y="connsiteY16"/>
-              </a:cxn>
-              <a:cxn ang="0">
-                <a:pos x="connsiteX17" y="connsiteY17"/>
-              </a:cxn>
-              <a:cxn ang="0">
-                <a:pos x="connsiteX18" y="connsiteY18"/>
-              </a:cxn>
-              <a:cxn ang="0">
-                <a:pos x="connsiteX19" y="connsiteY19"/>
-              </a:cxn>
-              <a:cxn ang="0">
-                <a:pos x="connsiteX20" y="connsiteY20"/>
-              </a:cxn>
-              <a:cxn ang="0">
-                <a:pos x="connsiteX21" y="connsiteY21"/>
-              </a:cxn>
-              <a:cxn ang="0">
-                <a:pos x="connsiteX22" y="connsiteY22"/>
-              </a:cxn>
-              <a:cxn ang="0">
-                <a:pos x="connsiteX23" y="connsiteY23"/>
-              </a:cxn>
-              <a:cxn ang="0">
-                <a:pos x="connsiteX24" y="connsiteY24"/>
-              </a:cxn>
-              <a:cxn ang="0">
-                <a:pos x="connsiteX25" y="connsiteY25"/>
-              </a:cxn>
-              <a:cxn ang="0">
-                <a:pos x="connsiteX26" y="connsiteY26"/>
-              </a:cxn>
-              <a:cxn ang="0">
-                <a:pos x="connsiteX27" y="connsiteY27"/>
-              </a:cxn>
-              <a:cxn ang="0">
-                <a:pos x="connsiteX28" y="connsiteY28"/>
-              </a:cxn>
-              <a:cxn ang="0">
-                <a:pos x="connsiteX29" y="connsiteY29"/>
-              </a:cxn>
-              <a:cxn ang="0">
-                <a:pos x="connsiteX30" y="connsiteY30"/>
-              </a:cxn>
-              <a:cxn ang="0">
-                <a:pos x="connsiteX31" y="connsiteY31"/>
-              </a:cxn>
-              <a:cxn ang="0">
-                <a:pos x="connsiteX32" y="connsiteY32"/>
-              </a:cxn>
-              <a:cxn ang="0">
-                <a:pos x="connsiteX33" y="connsiteY33"/>
-              </a:cxn>
-              <a:cxn ang="0">
-                <a:pos x="connsiteX34" y="connsiteY34"/>
-              </a:cxn>
-              <a:cxn ang="0">
-                <a:pos x="connsiteX35" y="connsiteY35"/>
-              </a:cxn>
-            </a:cxnLst>
-            <a:rect l="l" t="t" r="r" b="b"/>
-            <a:pathLst>
-              <a:path w="559472" h="3709642">
-                <a:moveTo>
-                  <a:pt x="0" y="0"/>
-                </a:moveTo>
-                <a:lnTo>
-                  <a:pt x="473952" y="0"/>
-                </a:lnTo>
-                <a:lnTo>
-                  <a:pt x="485840" y="161194"/>
-                </a:lnTo>
-                <a:cubicBezTo>
-                  <a:pt x="552063" y="1147770"/>
-                  <a:pt x="592441" y="3086737"/>
-                  <a:pt x="523949" y="3672197"/>
-                </a:cubicBezTo>
-                <a:cubicBezTo>
-                  <a:pt x="500842" y="3684557"/>
-                  <a:pt x="477855" y="3697282"/>
-                  <a:pt x="454748" y="3709642"/>
-                </a:cubicBezTo>
-                <a:lnTo>
-                  <a:pt x="448224" y="3510471"/>
-                </a:lnTo>
-                <a:lnTo>
-                  <a:pt x="443564" y="3408563"/>
-                </a:lnTo>
-                <a:lnTo>
-                  <a:pt x="438902" y="3304407"/>
-                </a:lnTo>
-                <a:lnTo>
-                  <a:pt x="433941" y="3198777"/>
-                </a:lnTo>
-                <a:lnTo>
-                  <a:pt x="427584" y="3092510"/>
-                </a:lnTo>
-                <a:lnTo>
-                  <a:pt x="420988" y="2984390"/>
-                </a:lnTo>
-                <a:lnTo>
-                  <a:pt x="414330" y="2874401"/>
-                </a:lnTo>
-                <a:lnTo>
-                  <a:pt x="406840" y="2762980"/>
-                </a:lnTo>
-                <a:lnTo>
-                  <a:pt x="397745" y="2650566"/>
-                </a:lnTo>
-                <a:lnTo>
-                  <a:pt x="389154" y="2536612"/>
-                </a:lnTo>
-                <a:lnTo>
-                  <a:pt x="379225" y="2421642"/>
-                </a:lnTo>
-                <a:lnTo>
-                  <a:pt x="368316" y="2305627"/>
-                </a:lnTo>
-                <a:lnTo>
-                  <a:pt x="357466" y="2189233"/>
-                </a:lnTo>
-                <a:lnTo>
-                  <a:pt x="344982" y="2071473"/>
-                </a:lnTo>
-                <a:lnTo>
-                  <a:pt x="332466" y="1952216"/>
-                </a:lnTo>
-                <a:lnTo>
-                  <a:pt x="319121" y="1833776"/>
-                </a:lnTo>
-                <a:lnTo>
-                  <a:pt x="304408" y="1713948"/>
-                </a:lnTo>
-                <a:lnTo>
-                  <a:pt x="288685" y="1592703"/>
-                </a:lnTo>
-                <a:lnTo>
-                  <a:pt x="273050" y="1471451"/>
-                </a:lnTo>
-                <a:lnTo>
-                  <a:pt x="255813" y="1350328"/>
-                </a:lnTo>
-                <a:lnTo>
-                  <a:pt x="237060" y="1227080"/>
-                </a:lnTo>
-                <a:lnTo>
-                  <a:pt x="218488" y="1106065"/>
-                </a:lnTo>
-                <a:lnTo>
-                  <a:pt x="198221" y="982940"/>
-                </a:lnTo>
-                <a:lnTo>
-                  <a:pt x="177152" y="858755"/>
-                </a:lnTo>
-                <a:lnTo>
-                  <a:pt x="155551" y="736861"/>
-                </a:lnTo>
-                <a:lnTo>
-                  <a:pt x="131782" y="613645"/>
-                </a:lnTo>
-                <a:lnTo>
-                  <a:pt x="107123" y="490500"/>
-                </a:lnTo>
-                <a:lnTo>
-                  <a:pt x="82552" y="367348"/>
-                </a:lnTo>
-                <a:lnTo>
-                  <a:pt x="55608" y="244762"/>
-                </a:lnTo>
-                <a:lnTo>
-                  <a:pt x="28130" y="122220"/>
-                </a:lnTo>
-                <a:lnTo>
-                  <a:pt x="0" y="0"/>
-                </a:lnTo>
-                <a:close/>
-              </a:path>
-            </a:pathLst>
-          </a:custGeom>
-          <a:solidFill>
-            <a:schemeClr val="tx1">
-              <a:alpha val="20000"/>
-            </a:schemeClr>
-          </a:solidFill>
-          <a:ln>
-            <a:noFill/>
-          </a:ln>
-        </p:spPr>
-        <p:txBody>
-          <a:bodyPr rtlCol="0" anchor="ctr"/>
-          <a:lstStyle/>
-          <a:p>
-            <a:pPr algn="ctr"/>
-            <a:endParaRPr lang="en-US"/>
-          </a:p>
-        </p:txBody>
-      </p:sp>
-      <p:sp>
-        <p:nvSpPr>
-          <p:cNvPr id="12" name="Freeform: Shape 11">
-            <a:extLst>
-              <a:ext uri="{FF2B5EF4-FFF2-40B4-BE49-F238E27FC236}">
-                <a16:creationId xmlns:a16="http://schemas.microsoft.com/office/drawing/2014/main" id="{1FFB365B-E9DC-4859-B8AB-CB83EEBE4E28}"/>
-              </a:ext>
-              <a:ext uri="{C183D7F6-B498-43B3-948B-1728B52AA6E4}">
-                <adec:decorative xmlns:adec="http://schemas.microsoft.com/office/drawing/2017/decorative" xmlns="" val="1"/>
-              </a:ext>
-            </a:extLst>
-          </p:cNvPr>
-          <p:cNvSpPr>
-            <a:spLocks noGrp="1" noRot="1" noChangeAspect="1" noMove="1" noResize="1" noEditPoints="1" noAdjustHandles="1" noChangeArrowheads="1" noChangeShapeType="1" noTextEdit="1"/>
-          </p:cNvSpPr>
-          <p:nvPr>
-            <p:extLst>
-              <p:ext uri="{386F3935-93C4-4BCD-93E2-E3B085C9AB24}">
-                <p16:designElem xmlns:p16="http://schemas.microsoft.com/office/powerpoint/2015/main" val="1"/>
-              </p:ext>
-            </p:extLst>
-          </p:nvPr>
-        </p:nvSpPr>
-        <p:spPr>
-          <a:xfrm>
-            <a:off x="1" y="1"/>
-            <a:ext cx="4990911" cy="6858001"/>
-          </a:xfrm>
-          <a:custGeom>
-            <a:avLst/>
-            <a:gdLst>
-              <a:gd name="connsiteX0" fmla="*/ 3646196 w 4990911"/>
-              <a:gd name="connsiteY0" fmla="*/ 0 h 6858001"/>
-              <a:gd name="connsiteX1" fmla="*/ 4989734 w 4990911"/>
-              <a:gd name="connsiteY1" fmla="*/ 0 h 6858001"/>
-              <a:gd name="connsiteX2" fmla="*/ 4964689 w 4990911"/>
-              <a:gd name="connsiteY2" fmla="*/ 155677 h 6858001"/>
-              <a:gd name="connsiteX3" fmla="*/ 4940820 w 4990911"/>
-              <a:gd name="connsiteY3" fmla="*/ 310668 h 6858001"/>
-              <a:gd name="connsiteX4" fmla="*/ 4917456 w 4990911"/>
-              <a:gd name="connsiteY4" fmla="*/ 466344 h 6858001"/>
-              <a:gd name="connsiteX5" fmla="*/ 4897453 w 4990911"/>
-              <a:gd name="connsiteY5" fmla="*/ 622707 h 6858001"/>
-              <a:gd name="connsiteX6" fmla="*/ 4877282 w 4990911"/>
-              <a:gd name="connsiteY6" fmla="*/ 778383 h 6858001"/>
-              <a:gd name="connsiteX7" fmla="*/ 4858456 w 4990911"/>
-              <a:gd name="connsiteY7" fmla="*/ 934746 h 6858001"/>
-              <a:gd name="connsiteX8" fmla="*/ 4842320 w 4990911"/>
-              <a:gd name="connsiteY8" fmla="*/ 1089051 h 6858001"/>
-              <a:gd name="connsiteX9" fmla="*/ 4827024 w 4990911"/>
-              <a:gd name="connsiteY9" fmla="*/ 1245413 h 6858001"/>
-              <a:gd name="connsiteX10" fmla="*/ 4813072 w 4990911"/>
-              <a:gd name="connsiteY10" fmla="*/ 1401090 h 6858001"/>
-              <a:gd name="connsiteX11" fmla="*/ 4800970 w 4990911"/>
-              <a:gd name="connsiteY11" fmla="*/ 1554023 h 6858001"/>
-              <a:gd name="connsiteX12" fmla="*/ 4788867 w 4990911"/>
-              <a:gd name="connsiteY12" fmla="*/ 1709014 h 6858001"/>
-              <a:gd name="connsiteX13" fmla="*/ 4778782 w 4990911"/>
-              <a:gd name="connsiteY13" fmla="*/ 1861947 h 6858001"/>
-              <a:gd name="connsiteX14" fmla="*/ 4770882 w 4990911"/>
-              <a:gd name="connsiteY14" fmla="*/ 2014881 h 6858001"/>
-              <a:gd name="connsiteX15" fmla="*/ 4762645 w 4990911"/>
-              <a:gd name="connsiteY15" fmla="*/ 2167128 h 6858001"/>
-              <a:gd name="connsiteX16" fmla="*/ 4755754 w 4990911"/>
-              <a:gd name="connsiteY16" fmla="*/ 2318004 h 6858001"/>
-              <a:gd name="connsiteX17" fmla="*/ 4750879 w 4990911"/>
-              <a:gd name="connsiteY17" fmla="*/ 2467509 h 6858001"/>
-              <a:gd name="connsiteX18" fmla="*/ 4746677 w 4990911"/>
-              <a:gd name="connsiteY18" fmla="*/ 2617013 h 6858001"/>
-              <a:gd name="connsiteX19" fmla="*/ 4742643 w 4990911"/>
-              <a:gd name="connsiteY19" fmla="*/ 2765146 h 6858001"/>
-              <a:gd name="connsiteX20" fmla="*/ 4740794 w 4990911"/>
-              <a:gd name="connsiteY20" fmla="*/ 2911221 h 6858001"/>
-              <a:gd name="connsiteX21" fmla="*/ 4738777 w 4990911"/>
-              <a:gd name="connsiteY21" fmla="*/ 3057297 h 6858001"/>
-              <a:gd name="connsiteX22" fmla="*/ 4737768 w 4990911"/>
-              <a:gd name="connsiteY22" fmla="*/ 3201315 h 6858001"/>
-              <a:gd name="connsiteX23" fmla="*/ 4738777 w 4990911"/>
-              <a:gd name="connsiteY23" fmla="*/ 3343961 h 6858001"/>
-              <a:gd name="connsiteX24" fmla="*/ 4738777 w 4990911"/>
-              <a:gd name="connsiteY24" fmla="*/ 3485236 h 6858001"/>
-              <a:gd name="connsiteX25" fmla="*/ 4740794 w 4990911"/>
-              <a:gd name="connsiteY25" fmla="*/ 3625139 h 6858001"/>
-              <a:gd name="connsiteX26" fmla="*/ 4743819 w 4990911"/>
-              <a:gd name="connsiteY26" fmla="*/ 3762299 h 6858001"/>
-              <a:gd name="connsiteX27" fmla="*/ 4746677 w 4990911"/>
-              <a:gd name="connsiteY27" fmla="*/ 3898087 h 6858001"/>
-              <a:gd name="connsiteX28" fmla="*/ 4749871 w 4990911"/>
-              <a:gd name="connsiteY28" fmla="*/ 4031133 h 6858001"/>
-              <a:gd name="connsiteX29" fmla="*/ 4754745 w 4990911"/>
-              <a:gd name="connsiteY29" fmla="*/ 4163492 h 6858001"/>
-              <a:gd name="connsiteX30" fmla="*/ 4759956 w 4990911"/>
-              <a:gd name="connsiteY30" fmla="*/ 4293793 h 6858001"/>
-              <a:gd name="connsiteX31" fmla="*/ 4764662 w 4990911"/>
-              <a:gd name="connsiteY31" fmla="*/ 4421352 h 6858001"/>
-              <a:gd name="connsiteX32" fmla="*/ 4777942 w 4990911"/>
-              <a:gd name="connsiteY32" fmla="*/ 4670298 h 6858001"/>
-              <a:gd name="connsiteX33" fmla="*/ 4792061 w 4990911"/>
-              <a:gd name="connsiteY33" fmla="*/ 4908956 h 6858001"/>
-              <a:gd name="connsiteX34" fmla="*/ 4806853 w 4990911"/>
-              <a:gd name="connsiteY34" fmla="*/ 5138013 h 6858001"/>
-              <a:gd name="connsiteX35" fmla="*/ 4823158 w 4990911"/>
-              <a:gd name="connsiteY35" fmla="*/ 5354726 h 6858001"/>
-              <a:gd name="connsiteX36" fmla="*/ 4840135 w 4990911"/>
-              <a:gd name="connsiteY36" fmla="*/ 5561838 h 6858001"/>
-              <a:gd name="connsiteX37" fmla="*/ 4858456 w 4990911"/>
-              <a:gd name="connsiteY37" fmla="*/ 5753862 h 6858001"/>
-              <a:gd name="connsiteX38" fmla="*/ 4876442 w 4990911"/>
-              <a:gd name="connsiteY38" fmla="*/ 5934227 h 6858001"/>
-              <a:gd name="connsiteX39" fmla="*/ 4894427 w 4990911"/>
-              <a:gd name="connsiteY39" fmla="*/ 6100191 h 6858001"/>
-              <a:gd name="connsiteX40" fmla="*/ 4911404 w 4990911"/>
-              <a:gd name="connsiteY40" fmla="*/ 6252438 h 6858001"/>
-              <a:gd name="connsiteX41" fmla="*/ 4927541 w 4990911"/>
-              <a:gd name="connsiteY41" fmla="*/ 6387541 h 6858001"/>
-              <a:gd name="connsiteX42" fmla="*/ 4942837 w 4990911"/>
-              <a:gd name="connsiteY42" fmla="*/ 6509613 h 6858001"/>
-              <a:gd name="connsiteX43" fmla="*/ 4955612 w 4990911"/>
-              <a:gd name="connsiteY43" fmla="*/ 6612483 h 6858001"/>
-              <a:gd name="connsiteX44" fmla="*/ 4967714 w 4990911"/>
-              <a:gd name="connsiteY44" fmla="*/ 6698894 h 6858001"/>
-              <a:gd name="connsiteX45" fmla="*/ 4985028 w 4990911"/>
-              <a:gd name="connsiteY45" fmla="*/ 6817538 h 6858001"/>
-              <a:gd name="connsiteX46" fmla="*/ 4990911 w 4990911"/>
-              <a:gd name="connsiteY46" fmla="*/ 6858000 h 6858001"/>
-              <a:gd name="connsiteX47" fmla="*/ 4085557 w 4990911"/>
-              <a:gd name="connsiteY47" fmla="*/ 6858000 h 6858001"/>
-              <a:gd name="connsiteX48" fmla="*/ 4085557 w 4990911"/>
-              <a:gd name="connsiteY48" fmla="*/ 6858001 h 6858001"/>
-              <a:gd name="connsiteX49" fmla="*/ 0 w 4990911"/>
-              <a:gd name="connsiteY49" fmla="*/ 6858001 h 6858001"/>
-              <a:gd name="connsiteX50" fmla="*/ 0 w 4990911"/>
-              <a:gd name="connsiteY50" fmla="*/ 1 h 6858001"/>
-              <a:gd name="connsiteX51" fmla="*/ 3646196 w 4990911"/>
-              <a:gd name="connsiteY51" fmla="*/ 1 h 6858001"/>
-            </a:gdLst>
-            <a:ahLst/>
-            <a:cxnLst>
-              <a:cxn ang="0">
-                <a:pos x="connsiteX0" y="connsiteY0"/>
-              </a:cxn>
-              <a:cxn ang="0">
-                <a:pos x="connsiteX1" y="connsiteY1"/>
-              </a:cxn>
-              <a:cxn ang="0">
-                <a:pos x="connsiteX2" y="connsiteY2"/>
-              </a:cxn>
-              <a:cxn ang="0">
-                <a:pos x="connsiteX3" y="connsiteY3"/>
-              </a:cxn>
-              <a:cxn ang="0">
-                <a:pos x="connsiteX4" y="connsiteY4"/>
-              </a:cxn>
-              <a:cxn ang="0">
-                <a:pos x="connsiteX5" y="connsiteY5"/>
-              </a:cxn>
-              <a:cxn ang="0">
-                <a:pos x="connsiteX6" y="connsiteY6"/>
-              </a:cxn>
-              <a:cxn ang="0">
-                <a:pos x="connsiteX7" y="connsiteY7"/>
-              </a:cxn>
-              <a:cxn ang="0">
-                <a:pos x="connsiteX8" y="connsiteY8"/>
-              </a:cxn>
-              <a:cxn ang="0">
-                <a:pos x="connsiteX9" y="connsiteY9"/>
-              </a:cxn>
-              <a:cxn ang="0">
-                <a:pos x="connsiteX10" y="connsiteY10"/>
-              </a:cxn>
-              <a:cxn ang="0">
-                <a:pos x="connsiteX11" y="connsiteY11"/>
-              </a:cxn>
-              <a:cxn ang="0">
-                <a:pos x="connsiteX12" y="connsiteY12"/>
-              </a:cxn>
-              <a:cxn ang="0">
-                <a:pos x="connsiteX13" y="connsiteY13"/>
-              </a:cxn>
-              <a:cxn ang="0">
-                <a:pos x="connsiteX14" y="connsiteY14"/>
-              </a:cxn>
-              <a:cxn ang="0">
-                <a:pos x="connsiteX15" y="connsiteY15"/>
-              </a:cxn>
-              <a:cxn ang="0">
-                <a:pos x="connsiteX16" y="connsiteY16"/>
-              </a:cxn>
-              <a:cxn ang="0">
-                <a:pos x="connsiteX17" y="connsiteY17"/>
-              </a:cxn>
-              <a:cxn ang="0">
-                <a:pos x="connsiteX18" y="connsiteY18"/>
-              </a:cxn>
-              <a:cxn ang="0">
-                <a:pos x="connsiteX19" y="connsiteY19"/>
-              </a:cxn>
-              <a:cxn ang="0">
-                <a:pos x="connsiteX20" y="connsiteY20"/>
-              </a:cxn>
-              <a:cxn ang="0">
-                <a:pos x="connsiteX21" y="connsiteY21"/>
-              </a:cxn>
-              <a:cxn ang="0">
-                <a:pos x="connsiteX22" y="connsiteY22"/>
-              </a:cxn>
-              <a:cxn ang="0">
-                <a:pos x="connsiteX23" y="connsiteY23"/>
-              </a:cxn>
-              <a:cxn ang="0">
-                <a:pos x="connsiteX24" y="connsiteY24"/>
-              </a:cxn>
-              <a:cxn ang="0">
-                <a:pos x="connsiteX25" y="connsiteY25"/>
-              </a:cxn>
-              <a:cxn ang="0">
-                <a:pos x="connsiteX26" y="connsiteY26"/>
-              </a:cxn>
-              <a:cxn ang="0">
-                <a:pos x="connsiteX27" y="connsiteY27"/>
-              </a:cxn>
-              <a:cxn ang="0">
-                <a:pos x="connsiteX28" y="connsiteY28"/>
-              </a:cxn>
-              <a:cxn ang="0">
-                <a:pos x="connsiteX29" y="connsiteY29"/>
-              </a:cxn>
-              <a:cxn ang="0">
-                <a:pos x="connsiteX30" y="connsiteY30"/>
-              </a:cxn>
-              <a:cxn ang="0">
-                <a:pos x="connsiteX31" y="connsiteY31"/>
-              </a:cxn>
-              <a:cxn ang="0">
-                <a:pos x="connsiteX32" y="connsiteY32"/>
-              </a:cxn>
-              <a:cxn ang="0">
-                <a:pos x="connsiteX33" y="connsiteY33"/>
-              </a:cxn>
-              <a:cxn ang="0">
-                <a:pos x="connsiteX34" y="connsiteY34"/>
-              </a:cxn>
-              <a:cxn ang="0">
-                <a:pos x="connsiteX35" y="connsiteY35"/>
-              </a:cxn>
-              <a:cxn ang="0">
-                <a:pos x="connsiteX36" y="connsiteY36"/>
-              </a:cxn>
-              <a:cxn ang="0">
-                <a:pos x="connsiteX37" y="connsiteY37"/>
-              </a:cxn>
-              <a:cxn ang="0">
-                <a:pos x="connsiteX38" y="connsiteY38"/>
-              </a:cxn>
-              <a:cxn ang="0">
-                <a:pos x="connsiteX39" y="connsiteY39"/>
-              </a:cxn>
-              <a:cxn ang="0">
-                <a:pos x="connsiteX40" y="connsiteY40"/>
-              </a:cxn>
-              <a:cxn ang="0">
-                <a:pos x="connsiteX41" y="connsiteY41"/>
-              </a:cxn>
-              <a:cxn ang="0">
-                <a:pos x="connsiteX42" y="connsiteY42"/>
-              </a:cxn>
-              <a:cxn ang="0">
-                <a:pos x="connsiteX43" y="connsiteY43"/>
-              </a:cxn>
-              <a:cxn ang="0">
-                <a:pos x="connsiteX44" y="connsiteY44"/>
-              </a:cxn>
-              <a:cxn ang="0">
-                <a:pos x="connsiteX45" y="connsiteY45"/>
-              </a:cxn>
-              <a:cxn ang="0">
-                <a:pos x="connsiteX46" y="connsiteY46"/>
-              </a:cxn>
-              <a:cxn ang="0">
-                <a:pos x="connsiteX47" y="connsiteY47"/>
-              </a:cxn>
-              <a:cxn ang="0">
-                <a:pos x="connsiteX48" y="connsiteY48"/>
-              </a:cxn>
-              <a:cxn ang="0">
-                <a:pos x="connsiteX49" y="connsiteY49"/>
-              </a:cxn>
-              <a:cxn ang="0">
-                <a:pos x="connsiteX50" y="connsiteY50"/>
-              </a:cxn>
-              <a:cxn ang="0">
-                <a:pos x="connsiteX51" y="connsiteY51"/>
-              </a:cxn>
-            </a:cxnLst>
-            <a:rect l="l" t="t" r="r" b="b"/>
-            <a:pathLst>
-              <a:path w="4990911" h="6858001">
-                <a:moveTo>
-                  <a:pt x="3646196" y="0"/>
-                </a:moveTo>
-                <a:lnTo>
-                  <a:pt x="4989734" y="0"/>
-                </a:lnTo>
-                <a:lnTo>
-                  <a:pt x="4964689" y="155677"/>
-                </a:lnTo>
-                <a:lnTo>
-                  <a:pt x="4940820" y="310668"/>
-                </a:lnTo>
-                <a:lnTo>
-                  <a:pt x="4917456" y="466344"/>
-                </a:lnTo>
-                <a:lnTo>
-                  <a:pt x="4897453" y="622707"/>
-                </a:lnTo>
-                <a:lnTo>
-                  <a:pt x="4877282" y="778383"/>
-                </a:lnTo>
-                <a:lnTo>
-                  <a:pt x="4858456" y="934746"/>
-                </a:lnTo>
-                <a:lnTo>
-                  <a:pt x="4842320" y="1089051"/>
-                </a:lnTo>
-                <a:lnTo>
-                  <a:pt x="4827024" y="1245413"/>
-                </a:lnTo>
-                <a:lnTo>
-                  <a:pt x="4813072" y="1401090"/>
-                </a:lnTo>
-                <a:lnTo>
-                  <a:pt x="4800970" y="1554023"/>
-                </a:lnTo>
-                <a:lnTo>
-                  <a:pt x="4788867" y="1709014"/>
-                </a:lnTo>
-                <a:lnTo>
-                  <a:pt x="4778782" y="1861947"/>
-                </a:lnTo>
-                <a:lnTo>
-                  <a:pt x="4770882" y="2014881"/>
-                </a:lnTo>
-                <a:lnTo>
-                  <a:pt x="4762645" y="2167128"/>
-                </a:lnTo>
-                <a:lnTo>
-                  <a:pt x="4755754" y="2318004"/>
-                </a:lnTo>
-                <a:lnTo>
-                  <a:pt x="4750879" y="2467509"/>
-                </a:lnTo>
-                <a:lnTo>
-                  <a:pt x="4746677" y="2617013"/>
-                </a:lnTo>
-                <a:lnTo>
-                  <a:pt x="4742643" y="2765146"/>
-                </a:lnTo>
-                <a:lnTo>
-                  <a:pt x="4740794" y="2911221"/>
-                </a:lnTo>
-                <a:lnTo>
-                  <a:pt x="4738777" y="3057297"/>
-                </a:lnTo>
-                <a:lnTo>
-                  <a:pt x="4737768" y="3201315"/>
-                </a:lnTo>
-                <a:lnTo>
-                  <a:pt x="4738777" y="3343961"/>
-                </a:lnTo>
-                <a:lnTo>
-                  <a:pt x="4738777" y="3485236"/>
-                </a:lnTo>
-                <a:lnTo>
-                  <a:pt x="4740794" y="3625139"/>
-                </a:lnTo>
-                <a:lnTo>
-                  <a:pt x="4743819" y="3762299"/>
-                </a:lnTo>
-                <a:lnTo>
-                  <a:pt x="4746677" y="3898087"/>
-                </a:lnTo>
-                <a:lnTo>
-                  <a:pt x="4749871" y="4031133"/>
-                </a:lnTo>
-                <a:lnTo>
-                  <a:pt x="4754745" y="4163492"/>
-                </a:lnTo>
-                <a:lnTo>
-                  <a:pt x="4759956" y="4293793"/>
-                </a:lnTo>
-                <a:lnTo>
-                  <a:pt x="4764662" y="4421352"/>
-                </a:lnTo>
-                <a:lnTo>
-                  <a:pt x="4777942" y="4670298"/>
-                </a:lnTo>
-                <a:lnTo>
-                  <a:pt x="4792061" y="4908956"/>
-                </a:lnTo>
-                <a:lnTo>
-                  <a:pt x="4806853" y="5138013"/>
-                </a:lnTo>
-                <a:lnTo>
-                  <a:pt x="4823158" y="5354726"/>
-                </a:lnTo>
-                <a:lnTo>
-                  <a:pt x="4840135" y="5561838"/>
-                </a:lnTo>
-                <a:lnTo>
-                  <a:pt x="4858456" y="5753862"/>
-                </a:lnTo>
-                <a:lnTo>
-                  <a:pt x="4876442" y="5934227"/>
-                </a:lnTo>
-                <a:lnTo>
-                  <a:pt x="4894427" y="6100191"/>
-                </a:lnTo>
-                <a:lnTo>
-                  <a:pt x="4911404" y="6252438"/>
-                </a:lnTo>
-                <a:lnTo>
-                  <a:pt x="4927541" y="6387541"/>
-                </a:lnTo>
-                <a:lnTo>
-                  <a:pt x="4942837" y="6509613"/>
-                </a:lnTo>
-                <a:lnTo>
-                  <a:pt x="4955612" y="6612483"/>
-                </a:lnTo>
-                <a:lnTo>
-                  <a:pt x="4967714" y="6698894"/>
-                </a:lnTo>
-                <a:lnTo>
-                  <a:pt x="4985028" y="6817538"/>
-                </a:lnTo>
-                <a:lnTo>
-                  <a:pt x="4990911" y="6858000"/>
-                </a:lnTo>
-                <a:lnTo>
-                  <a:pt x="4085557" y="6858000"/>
-                </a:lnTo>
-                <a:lnTo>
-                  <a:pt x="4085557" y="6858001"/>
-                </a:lnTo>
-                <a:lnTo>
-                  <a:pt x="0" y="6858001"/>
-                </a:lnTo>
-                <a:lnTo>
-                  <a:pt x="0" y="1"/>
-                </a:lnTo>
-                <a:lnTo>
-                  <a:pt x="3646196" y="1"/>
-                </a:lnTo>
-                <a:close/>
-              </a:path>
-            </a:pathLst>
-          </a:custGeom>
-          <a:solidFill>
-            <a:schemeClr val="tx2"/>
-          </a:solidFill>
-          <a:ln>
-            <a:noFill/>
-          </a:ln>
-        </p:spPr>
-        <p:style>
-          <a:lnRef idx="2">
-            <a:schemeClr val="accent1">
-              <a:shade val="50000"/>
-            </a:schemeClr>
-          </a:lnRef>
-          <a:fillRef idx="1">
-            <a:schemeClr val="accent1"/>
-          </a:fillRef>
-          <a:effectRef idx="0">
-            <a:schemeClr val="accent1"/>
-          </a:effectRef>
-          <a:fontRef idx="minor">
-            <a:schemeClr val="lt1"/>
-          </a:fontRef>
-        </p:style>
-        <p:txBody>
-          <a:bodyPr rtlCol="0" anchor="ctr"/>
-          <a:lstStyle/>
-          <a:p>
-            <a:pPr algn="ctr"/>
-            <a:endParaRPr lang="en-US"/>
-          </a:p>
-        </p:txBody>
-      </p:sp>
-      <p:sp>
-        <p:nvSpPr>
           <p:cNvPr id="14" name="Rectangle 13">
             <a:extLst>
               <a:ext uri="{FF2B5EF4-FFF2-40B4-BE49-F238E27FC236}">
                 <a16:creationId xmlns:a16="http://schemas.microsoft.com/office/drawing/2014/main" id="{8ADAB9C8-EB37-4914-A699-C716FC8FE4FE}"/>
               </a:ext>
               <a:ext uri="{C183D7F6-B498-43B3-948B-1728B52AA6E4}">
-                <adec:decorative xmlns:adec="http://schemas.microsoft.com/office/drawing/2017/decorative" xmlns="" val="1"/>
+                <adec:decorative xmlns="" xmlns:adec="http://schemas.microsoft.com/office/drawing/2017/decorative" val="1"/>
               </a:ext>
             </a:extLst>
           </p:cNvPr>
@@ -28714,6 +27532,1188 @@
 </p:sld>
 </file>
 
+<file path=ppt/slides/slide19.xml><?xml version="1.0" encoding="utf-8"?>
+<p:sld xmlns:a="http://schemas.openxmlformats.org/drawingml/2006/main" xmlns:r="http://schemas.openxmlformats.org/officeDocument/2006/relationships" xmlns:p="http://schemas.openxmlformats.org/presentationml/2006/main">
+  <p:cSld>
+    <p:bg>
+      <p:bgPr>
+        <a:blipFill rotWithShape="1">
+          <a:blip r:embed="rId2">
+            <a:duotone>
+              <a:schemeClr val="bg2">
+                <a:shade val="69000"/>
+                <a:hueMod val="108000"/>
+                <a:satMod val="164000"/>
+                <a:lumMod val="74000"/>
+              </a:schemeClr>
+              <a:schemeClr val="bg2">
+                <a:tint val="96000"/>
+                <a:hueMod val="88000"/>
+                <a:satMod val="140000"/>
+                <a:lumMod val="132000"/>
+              </a:schemeClr>
+            </a:duotone>
+          </a:blip>
+          <a:stretch/>
+        </a:blipFill>
+        <a:effectLst/>
+      </p:bgPr>
+    </p:bg>
+    <p:spTree>
+      <p:nvGrpSpPr>
+        <p:cNvPr id="1" name=""/>
+        <p:cNvGrpSpPr/>
+        <p:nvPr/>
+      </p:nvGrpSpPr>
+      <p:grpSpPr>
+        <a:xfrm>
+          <a:off x="0" y="0"/>
+          <a:ext cx="0" cy="0"/>
+          <a:chOff x="0" y="0"/>
+          <a:chExt cx="0" cy="0"/>
+        </a:xfrm>
+      </p:grpSpPr>
+      <p:sp useBgFill="1">
+        <p:nvSpPr>
+          <p:cNvPr id="11" name="Rectangle 7">
+            <a:extLst>
+              <a:ext uri="{FF2B5EF4-FFF2-40B4-BE49-F238E27FC236}">
+                <a16:creationId xmlns:a16="http://schemas.microsoft.com/office/drawing/2014/main" id="{0D9B8FD4-CDEB-4EB4-B4DE-C89E11938958}"/>
+              </a:ext>
+              <a:ext uri="{C183D7F6-B498-43B3-948B-1728B52AA6E4}">
+                <adec:decorative xmlns="" xmlns:adec="http://schemas.microsoft.com/office/drawing/2017/decorative" val="1"/>
+              </a:ext>
+            </a:extLst>
+          </p:cNvPr>
+          <p:cNvSpPr>
+            <a:spLocks noGrp="1" noRot="1" noChangeAspect="1" noMove="1" noResize="1" noEditPoints="1" noAdjustHandles="1" noChangeArrowheads="1" noChangeShapeType="1" noTextEdit="1"/>
+          </p:cNvSpPr>
+          <p:nvPr>
+            <p:extLst>
+              <p:ext uri="{386F3935-93C4-4BCD-93E2-E3B085C9AB24}">
+                <p16:designElem xmlns:p16="http://schemas.microsoft.com/office/powerpoint/2015/main" val="1"/>
+              </p:ext>
+            </p:extLst>
+          </p:nvPr>
+        </p:nvSpPr>
+        <p:spPr>
+          <a:xfrm>
+            <a:off x="1" y="0"/>
+            <a:ext cx="12192000" cy="6858000"/>
+          </a:xfrm>
+          <a:prstGeom prst="rect">
+            <a:avLst/>
+          </a:prstGeom>
+          <a:ln>
+            <a:noFill/>
+          </a:ln>
+        </p:spPr>
+        <p:style>
+          <a:lnRef idx="2">
+            <a:schemeClr val="accent1">
+              <a:shade val="50000"/>
+            </a:schemeClr>
+          </a:lnRef>
+          <a:fillRef idx="1003">
+            <a:schemeClr val="dk2"/>
+          </a:fillRef>
+          <a:effectRef idx="0">
+            <a:schemeClr val="accent1"/>
+          </a:effectRef>
+          <a:fontRef idx="minor">
+            <a:schemeClr val="lt1"/>
+          </a:fontRef>
+        </p:style>
+        <p:txBody>
+          <a:bodyPr rtlCol="0" anchor="ctr"/>
+          <a:lstStyle/>
+          <a:p>
+            <a:pPr algn="ctr"/>
+            <a:endParaRPr lang="en-US"/>
+          </a:p>
+        </p:txBody>
+      </p:sp>
+      <p:sp>
+        <p:nvSpPr>
+          <p:cNvPr id="13" name="Freeform 36">
+            <a:extLst>
+              <a:ext uri="{FF2B5EF4-FFF2-40B4-BE49-F238E27FC236}">
+                <a16:creationId xmlns:a16="http://schemas.microsoft.com/office/drawing/2014/main" id="{5A2E3D1D-9E9F-4739-BA14-D4D7FA9FBDD1}"/>
+              </a:ext>
+              <a:ext uri="{C183D7F6-B498-43B3-948B-1728B52AA6E4}">
+                <adec:decorative xmlns="" xmlns:adec="http://schemas.microsoft.com/office/drawing/2017/decorative" val="1"/>
+              </a:ext>
+            </a:extLst>
+          </p:cNvPr>
+          <p:cNvSpPr>
+            <a:spLocks noGrp="1" noRot="1" noChangeAspect="1" noMove="1" noResize="1" noEditPoints="1" noAdjustHandles="1" noChangeArrowheads="1" noChangeShapeType="1" noTextEdit="1"/>
+          </p:cNvSpPr>
+          <p:nvPr>
+            <p:extLst>
+              <p:ext uri="{386F3935-93C4-4BCD-93E2-E3B085C9AB24}">
+                <p16:designElem xmlns:p16="http://schemas.microsoft.com/office/powerpoint/2015/main" val="1"/>
+              </p:ext>
+            </p:extLst>
+          </p:nvPr>
+        </p:nvSpPr>
+        <p:spPr>
+          <a:xfrm flipH="1">
+            <a:off x="4644637" y="0"/>
+            <a:ext cx="559472" cy="3709642"/>
+          </a:xfrm>
+          <a:custGeom>
+            <a:avLst/>
+            <a:gdLst>
+              <a:gd name="connsiteX0" fmla="*/ 0 w 559472"/>
+              <a:gd name="connsiteY0" fmla="*/ 0 h 3709642"/>
+              <a:gd name="connsiteX1" fmla="*/ 473952 w 559472"/>
+              <a:gd name="connsiteY1" fmla="*/ 0 h 3709642"/>
+              <a:gd name="connsiteX2" fmla="*/ 485840 w 559472"/>
+              <a:gd name="connsiteY2" fmla="*/ 161194 h 3709642"/>
+              <a:gd name="connsiteX3" fmla="*/ 523949 w 559472"/>
+              <a:gd name="connsiteY3" fmla="*/ 3672197 h 3709642"/>
+              <a:gd name="connsiteX4" fmla="*/ 454748 w 559472"/>
+              <a:gd name="connsiteY4" fmla="*/ 3709642 h 3709642"/>
+              <a:gd name="connsiteX5" fmla="*/ 448224 w 559472"/>
+              <a:gd name="connsiteY5" fmla="*/ 3510471 h 3709642"/>
+              <a:gd name="connsiteX6" fmla="*/ 443564 w 559472"/>
+              <a:gd name="connsiteY6" fmla="*/ 3408563 h 3709642"/>
+              <a:gd name="connsiteX7" fmla="*/ 438902 w 559472"/>
+              <a:gd name="connsiteY7" fmla="*/ 3304407 h 3709642"/>
+              <a:gd name="connsiteX8" fmla="*/ 433941 w 559472"/>
+              <a:gd name="connsiteY8" fmla="*/ 3198777 h 3709642"/>
+              <a:gd name="connsiteX9" fmla="*/ 427584 w 559472"/>
+              <a:gd name="connsiteY9" fmla="*/ 3092510 h 3709642"/>
+              <a:gd name="connsiteX10" fmla="*/ 420988 w 559472"/>
+              <a:gd name="connsiteY10" fmla="*/ 2984390 h 3709642"/>
+              <a:gd name="connsiteX11" fmla="*/ 414330 w 559472"/>
+              <a:gd name="connsiteY11" fmla="*/ 2874401 h 3709642"/>
+              <a:gd name="connsiteX12" fmla="*/ 406840 w 559472"/>
+              <a:gd name="connsiteY12" fmla="*/ 2762980 h 3709642"/>
+              <a:gd name="connsiteX13" fmla="*/ 397745 w 559472"/>
+              <a:gd name="connsiteY13" fmla="*/ 2650566 h 3709642"/>
+              <a:gd name="connsiteX14" fmla="*/ 389154 w 559472"/>
+              <a:gd name="connsiteY14" fmla="*/ 2536612 h 3709642"/>
+              <a:gd name="connsiteX15" fmla="*/ 379225 w 559472"/>
+              <a:gd name="connsiteY15" fmla="*/ 2421642 h 3709642"/>
+              <a:gd name="connsiteX16" fmla="*/ 368316 w 559472"/>
+              <a:gd name="connsiteY16" fmla="*/ 2305627 h 3709642"/>
+              <a:gd name="connsiteX17" fmla="*/ 357466 w 559472"/>
+              <a:gd name="connsiteY17" fmla="*/ 2189233 h 3709642"/>
+              <a:gd name="connsiteX18" fmla="*/ 344982 w 559472"/>
+              <a:gd name="connsiteY18" fmla="*/ 2071473 h 3709642"/>
+              <a:gd name="connsiteX19" fmla="*/ 332466 w 559472"/>
+              <a:gd name="connsiteY19" fmla="*/ 1952216 h 3709642"/>
+              <a:gd name="connsiteX20" fmla="*/ 319121 w 559472"/>
+              <a:gd name="connsiteY20" fmla="*/ 1833776 h 3709642"/>
+              <a:gd name="connsiteX21" fmla="*/ 304408 w 559472"/>
+              <a:gd name="connsiteY21" fmla="*/ 1713948 h 3709642"/>
+              <a:gd name="connsiteX22" fmla="*/ 288685 w 559472"/>
+              <a:gd name="connsiteY22" fmla="*/ 1592703 h 3709642"/>
+              <a:gd name="connsiteX23" fmla="*/ 273050 w 559472"/>
+              <a:gd name="connsiteY23" fmla="*/ 1471451 h 3709642"/>
+              <a:gd name="connsiteX24" fmla="*/ 255813 w 559472"/>
+              <a:gd name="connsiteY24" fmla="*/ 1350328 h 3709642"/>
+              <a:gd name="connsiteX25" fmla="*/ 237060 w 559472"/>
+              <a:gd name="connsiteY25" fmla="*/ 1227080 h 3709642"/>
+              <a:gd name="connsiteX26" fmla="*/ 218488 w 559472"/>
+              <a:gd name="connsiteY26" fmla="*/ 1106065 h 3709642"/>
+              <a:gd name="connsiteX27" fmla="*/ 198221 w 559472"/>
+              <a:gd name="connsiteY27" fmla="*/ 982940 h 3709642"/>
+              <a:gd name="connsiteX28" fmla="*/ 177152 w 559472"/>
+              <a:gd name="connsiteY28" fmla="*/ 858755 h 3709642"/>
+              <a:gd name="connsiteX29" fmla="*/ 155551 w 559472"/>
+              <a:gd name="connsiteY29" fmla="*/ 736861 h 3709642"/>
+              <a:gd name="connsiteX30" fmla="*/ 131782 w 559472"/>
+              <a:gd name="connsiteY30" fmla="*/ 613645 h 3709642"/>
+              <a:gd name="connsiteX31" fmla="*/ 107123 w 559472"/>
+              <a:gd name="connsiteY31" fmla="*/ 490500 h 3709642"/>
+              <a:gd name="connsiteX32" fmla="*/ 82552 w 559472"/>
+              <a:gd name="connsiteY32" fmla="*/ 367348 h 3709642"/>
+              <a:gd name="connsiteX33" fmla="*/ 55608 w 559472"/>
+              <a:gd name="connsiteY33" fmla="*/ 244762 h 3709642"/>
+              <a:gd name="connsiteX34" fmla="*/ 28130 w 559472"/>
+              <a:gd name="connsiteY34" fmla="*/ 122220 h 3709642"/>
+              <a:gd name="connsiteX35" fmla="*/ 0 w 559472"/>
+              <a:gd name="connsiteY35" fmla="*/ 0 h 3709642"/>
+            </a:gdLst>
+            <a:ahLst/>
+            <a:cxnLst>
+              <a:cxn ang="0">
+                <a:pos x="connsiteX0" y="connsiteY0"/>
+              </a:cxn>
+              <a:cxn ang="0">
+                <a:pos x="connsiteX1" y="connsiteY1"/>
+              </a:cxn>
+              <a:cxn ang="0">
+                <a:pos x="connsiteX2" y="connsiteY2"/>
+              </a:cxn>
+              <a:cxn ang="0">
+                <a:pos x="connsiteX3" y="connsiteY3"/>
+              </a:cxn>
+              <a:cxn ang="0">
+                <a:pos x="connsiteX4" y="connsiteY4"/>
+              </a:cxn>
+              <a:cxn ang="0">
+                <a:pos x="connsiteX5" y="connsiteY5"/>
+              </a:cxn>
+              <a:cxn ang="0">
+                <a:pos x="connsiteX6" y="connsiteY6"/>
+              </a:cxn>
+              <a:cxn ang="0">
+                <a:pos x="connsiteX7" y="connsiteY7"/>
+              </a:cxn>
+              <a:cxn ang="0">
+                <a:pos x="connsiteX8" y="connsiteY8"/>
+              </a:cxn>
+              <a:cxn ang="0">
+                <a:pos x="connsiteX9" y="connsiteY9"/>
+              </a:cxn>
+              <a:cxn ang="0">
+                <a:pos x="connsiteX10" y="connsiteY10"/>
+              </a:cxn>
+              <a:cxn ang="0">
+                <a:pos x="connsiteX11" y="connsiteY11"/>
+              </a:cxn>
+              <a:cxn ang="0">
+                <a:pos x="connsiteX12" y="connsiteY12"/>
+              </a:cxn>
+              <a:cxn ang="0">
+                <a:pos x="connsiteX13" y="connsiteY13"/>
+              </a:cxn>
+              <a:cxn ang="0">
+                <a:pos x="connsiteX14" y="connsiteY14"/>
+              </a:cxn>
+              <a:cxn ang="0">
+                <a:pos x="connsiteX15" y="connsiteY15"/>
+              </a:cxn>
+              <a:cxn ang="0">
+                <a:pos x="connsiteX16" y="connsiteY16"/>
+              </a:cxn>
+              <a:cxn ang="0">
+                <a:pos x="connsiteX17" y="connsiteY17"/>
+              </a:cxn>
+              <a:cxn ang="0">
+                <a:pos x="connsiteX18" y="connsiteY18"/>
+              </a:cxn>
+              <a:cxn ang="0">
+                <a:pos x="connsiteX19" y="connsiteY19"/>
+              </a:cxn>
+              <a:cxn ang="0">
+                <a:pos x="connsiteX20" y="connsiteY20"/>
+              </a:cxn>
+              <a:cxn ang="0">
+                <a:pos x="connsiteX21" y="connsiteY21"/>
+              </a:cxn>
+              <a:cxn ang="0">
+                <a:pos x="connsiteX22" y="connsiteY22"/>
+              </a:cxn>
+              <a:cxn ang="0">
+                <a:pos x="connsiteX23" y="connsiteY23"/>
+              </a:cxn>
+              <a:cxn ang="0">
+                <a:pos x="connsiteX24" y="connsiteY24"/>
+              </a:cxn>
+              <a:cxn ang="0">
+                <a:pos x="connsiteX25" y="connsiteY25"/>
+              </a:cxn>
+              <a:cxn ang="0">
+                <a:pos x="connsiteX26" y="connsiteY26"/>
+              </a:cxn>
+              <a:cxn ang="0">
+                <a:pos x="connsiteX27" y="connsiteY27"/>
+              </a:cxn>
+              <a:cxn ang="0">
+                <a:pos x="connsiteX28" y="connsiteY28"/>
+              </a:cxn>
+              <a:cxn ang="0">
+                <a:pos x="connsiteX29" y="connsiteY29"/>
+              </a:cxn>
+              <a:cxn ang="0">
+                <a:pos x="connsiteX30" y="connsiteY30"/>
+              </a:cxn>
+              <a:cxn ang="0">
+                <a:pos x="connsiteX31" y="connsiteY31"/>
+              </a:cxn>
+              <a:cxn ang="0">
+                <a:pos x="connsiteX32" y="connsiteY32"/>
+              </a:cxn>
+              <a:cxn ang="0">
+                <a:pos x="connsiteX33" y="connsiteY33"/>
+              </a:cxn>
+              <a:cxn ang="0">
+                <a:pos x="connsiteX34" y="connsiteY34"/>
+              </a:cxn>
+              <a:cxn ang="0">
+                <a:pos x="connsiteX35" y="connsiteY35"/>
+              </a:cxn>
+            </a:cxnLst>
+            <a:rect l="l" t="t" r="r" b="b"/>
+            <a:pathLst>
+              <a:path w="559472" h="3709642">
+                <a:moveTo>
+                  <a:pt x="0" y="0"/>
+                </a:moveTo>
+                <a:lnTo>
+                  <a:pt x="473952" y="0"/>
+                </a:lnTo>
+                <a:lnTo>
+                  <a:pt x="485840" y="161194"/>
+                </a:lnTo>
+                <a:cubicBezTo>
+                  <a:pt x="552063" y="1147770"/>
+                  <a:pt x="592441" y="3086737"/>
+                  <a:pt x="523949" y="3672197"/>
+                </a:cubicBezTo>
+                <a:cubicBezTo>
+                  <a:pt x="500842" y="3684557"/>
+                  <a:pt x="477855" y="3697282"/>
+                  <a:pt x="454748" y="3709642"/>
+                </a:cubicBezTo>
+                <a:lnTo>
+                  <a:pt x="448224" y="3510471"/>
+                </a:lnTo>
+                <a:lnTo>
+                  <a:pt x="443564" y="3408563"/>
+                </a:lnTo>
+                <a:lnTo>
+                  <a:pt x="438902" y="3304407"/>
+                </a:lnTo>
+                <a:lnTo>
+                  <a:pt x="433941" y="3198777"/>
+                </a:lnTo>
+                <a:lnTo>
+                  <a:pt x="427584" y="3092510"/>
+                </a:lnTo>
+                <a:lnTo>
+                  <a:pt x="420988" y="2984390"/>
+                </a:lnTo>
+                <a:lnTo>
+                  <a:pt x="414330" y="2874401"/>
+                </a:lnTo>
+                <a:lnTo>
+                  <a:pt x="406840" y="2762980"/>
+                </a:lnTo>
+                <a:lnTo>
+                  <a:pt x="397745" y="2650566"/>
+                </a:lnTo>
+                <a:lnTo>
+                  <a:pt x="389154" y="2536612"/>
+                </a:lnTo>
+                <a:lnTo>
+                  <a:pt x="379225" y="2421642"/>
+                </a:lnTo>
+                <a:lnTo>
+                  <a:pt x="368316" y="2305627"/>
+                </a:lnTo>
+                <a:lnTo>
+                  <a:pt x="357466" y="2189233"/>
+                </a:lnTo>
+                <a:lnTo>
+                  <a:pt x="344982" y="2071473"/>
+                </a:lnTo>
+                <a:lnTo>
+                  <a:pt x="332466" y="1952216"/>
+                </a:lnTo>
+                <a:lnTo>
+                  <a:pt x="319121" y="1833776"/>
+                </a:lnTo>
+                <a:lnTo>
+                  <a:pt x="304408" y="1713948"/>
+                </a:lnTo>
+                <a:lnTo>
+                  <a:pt x="288685" y="1592703"/>
+                </a:lnTo>
+                <a:lnTo>
+                  <a:pt x="273050" y="1471451"/>
+                </a:lnTo>
+                <a:lnTo>
+                  <a:pt x="255813" y="1350328"/>
+                </a:lnTo>
+                <a:lnTo>
+                  <a:pt x="237060" y="1227080"/>
+                </a:lnTo>
+                <a:lnTo>
+                  <a:pt x="218488" y="1106065"/>
+                </a:lnTo>
+                <a:lnTo>
+                  <a:pt x="198221" y="982940"/>
+                </a:lnTo>
+                <a:lnTo>
+                  <a:pt x="177152" y="858755"/>
+                </a:lnTo>
+                <a:lnTo>
+                  <a:pt x="155551" y="736861"/>
+                </a:lnTo>
+                <a:lnTo>
+                  <a:pt x="131782" y="613645"/>
+                </a:lnTo>
+                <a:lnTo>
+                  <a:pt x="107123" y="490500"/>
+                </a:lnTo>
+                <a:lnTo>
+                  <a:pt x="82552" y="367348"/>
+                </a:lnTo>
+                <a:lnTo>
+                  <a:pt x="55608" y="244762"/>
+                </a:lnTo>
+                <a:lnTo>
+                  <a:pt x="28130" y="122220"/>
+                </a:lnTo>
+                <a:lnTo>
+                  <a:pt x="0" y="0"/>
+                </a:lnTo>
+                <a:close/>
+              </a:path>
+            </a:pathLst>
+          </a:custGeom>
+          <a:solidFill>
+            <a:schemeClr val="tx1">
+              <a:alpha val="20000"/>
+            </a:schemeClr>
+          </a:solidFill>
+          <a:ln>
+            <a:noFill/>
+          </a:ln>
+        </p:spPr>
+        <p:txBody>
+          <a:bodyPr rtlCol="0" anchor="ctr"/>
+          <a:lstStyle/>
+          <a:p>
+            <a:pPr algn="ctr"/>
+            <a:endParaRPr lang="en-US"/>
+          </a:p>
+        </p:txBody>
+      </p:sp>
+      <p:sp>
+        <p:nvSpPr>
+          <p:cNvPr id="15" name="Freeform: Shape 11">
+            <a:extLst>
+              <a:ext uri="{FF2B5EF4-FFF2-40B4-BE49-F238E27FC236}">
+                <a16:creationId xmlns:a16="http://schemas.microsoft.com/office/drawing/2014/main" id="{1FFB365B-E9DC-4859-B8AB-CB83EEBE4E28}"/>
+              </a:ext>
+              <a:ext uri="{C183D7F6-B498-43B3-948B-1728B52AA6E4}">
+                <adec:decorative xmlns="" xmlns:adec="http://schemas.microsoft.com/office/drawing/2017/decorative" val="1"/>
+              </a:ext>
+            </a:extLst>
+          </p:cNvPr>
+          <p:cNvSpPr>
+            <a:spLocks noGrp="1" noRot="1" noChangeAspect="1" noMove="1" noResize="1" noEditPoints="1" noAdjustHandles="1" noChangeArrowheads="1" noChangeShapeType="1" noTextEdit="1"/>
+          </p:cNvSpPr>
+          <p:nvPr>
+            <p:extLst>
+              <p:ext uri="{386F3935-93C4-4BCD-93E2-E3B085C9AB24}">
+                <p16:designElem xmlns:p16="http://schemas.microsoft.com/office/powerpoint/2015/main" val="1"/>
+              </p:ext>
+            </p:extLst>
+          </p:nvPr>
+        </p:nvSpPr>
+        <p:spPr>
+          <a:xfrm>
+            <a:off x="1" y="1"/>
+            <a:ext cx="4990911" cy="6858001"/>
+          </a:xfrm>
+          <a:custGeom>
+            <a:avLst/>
+            <a:gdLst>
+              <a:gd name="connsiteX0" fmla="*/ 3646196 w 4990911"/>
+              <a:gd name="connsiteY0" fmla="*/ 0 h 6858001"/>
+              <a:gd name="connsiteX1" fmla="*/ 4989734 w 4990911"/>
+              <a:gd name="connsiteY1" fmla="*/ 0 h 6858001"/>
+              <a:gd name="connsiteX2" fmla="*/ 4964689 w 4990911"/>
+              <a:gd name="connsiteY2" fmla="*/ 155677 h 6858001"/>
+              <a:gd name="connsiteX3" fmla="*/ 4940820 w 4990911"/>
+              <a:gd name="connsiteY3" fmla="*/ 310668 h 6858001"/>
+              <a:gd name="connsiteX4" fmla="*/ 4917456 w 4990911"/>
+              <a:gd name="connsiteY4" fmla="*/ 466344 h 6858001"/>
+              <a:gd name="connsiteX5" fmla="*/ 4897453 w 4990911"/>
+              <a:gd name="connsiteY5" fmla="*/ 622707 h 6858001"/>
+              <a:gd name="connsiteX6" fmla="*/ 4877282 w 4990911"/>
+              <a:gd name="connsiteY6" fmla="*/ 778383 h 6858001"/>
+              <a:gd name="connsiteX7" fmla="*/ 4858456 w 4990911"/>
+              <a:gd name="connsiteY7" fmla="*/ 934746 h 6858001"/>
+              <a:gd name="connsiteX8" fmla="*/ 4842320 w 4990911"/>
+              <a:gd name="connsiteY8" fmla="*/ 1089051 h 6858001"/>
+              <a:gd name="connsiteX9" fmla="*/ 4827024 w 4990911"/>
+              <a:gd name="connsiteY9" fmla="*/ 1245413 h 6858001"/>
+              <a:gd name="connsiteX10" fmla="*/ 4813072 w 4990911"/>
+              <a:gd name="connsiteY10" fmla="*/ 1401090 h 6858001"/>
+              <a:gd name="connsiteX11" fmla="*/ 4800970 w 4990911"/>
+              <a:gd name="connsiteY11" fmla="*/ 1554023 h 6858001"/>
+              <a:gd name="connsiteX12" fmla="*/ 4788867 w 4990911"/>
+              <a:gd name="connsiteY12" fmla="*/ 1709014 h 6858001"/>
+              <a:gd name="connsiteX13" fmla="*/ 4778782 w 4990911"/>
+              <a:gd name="connsiteY13" fmla="*/ 1861947 h 6858001"/>
+              <a:gd name="connsiteX14" fmla="*/ 4770882 w 4990911"/>
+              <a:gd name="connsiteY14" fmla="*/ 2014881 h 6858001"/>
+              <a:gd name="connsiteX15" fmla="*/ 4762645 w 4990911"/>
+              <a:gd name="connsiteY15" fmla="*/ 2167128 h 6858001"/>
+              <a:gd name="connsiteX16" fmla="*/ 4755754 w 4990911"/>
+              <a:gd name="connsiteY16" fmla="*/ 2318004 h 6858001"/>
+              <a:gd name="connsiteX17" fmla="*/ 4750879 w 4990911"/>
+              <a:gd name="connsiteY17" fmla="*/ 2467509 h 6858001"/>
+              <a:gd name="connsiteX18" fmla="*/ 4746677 w 4990911"/>
+              <a:gd name="connsiteY18" fmla="*/ 2617013 h 6858001"/>
+              <a:gd name="connsiteX19" fmla="*/ 4742643 w 4990911"/>
+              <a:gd name="connsiteY19" fmla="*/ 2765146 h 6858001"/>
+              <a:gd name="connsiteX20" fmla="*/ 4740794 w 4990911"/>
+              <a:gd name="connsiteY20" fmla="*/ 2911221 h 6858001"/>
+              <a:gd name="connsiteX21" fmla="*/ 4738777 w 4990911"/>
+              <a:gd name="connsiteY21" fmla="*/ 3057297 h 6858001"/>
+              <a:gd name="connsiteX22" fmla="*/ 4737768 w 4990911"/>
+              <a:gd name="connsiteY22" fmla="*/ 3201315 h 6858001"/>
+              <a:gd name="connsiteX23" fmla="*/ 4738777 w 4990911"/>
+              <a:gd name="connsiteY23" fmla="*/ 3343961 h 6858001"/>
+              <a:gd name="connsiteX24" fmla="*/ 4738777 w 4990911"/>
+              <a:gd name="connsiteY24" fmla="*/ 3485236 h 6858001"/>
+              <a:gd name="connsiteX25" fmla="*/ 4740794 w 4990911"/>
+              <a:gd name="connsiteY25" fmla="*/ 3625139 h 6858001"/>
+              <a:gd name="connsiteX26" fmla="*/ 4743819 w 4990911"/>
+              <a:gd name="connsiteY26" fmla="*/ 3762299 h 6858001"/>
+              <a:gd name="connsiteX27" fmla="*/ 4746677 w 4990911"/>
+              <a:gd name="connsiteY27" fmla="*/ 3898087 h 6858001"/>
+              <a:gd name="connsiteX28" fmla="*/ 4749871 w 4990911"/>
+              <a:gd name="connsiteY28" fmla="*/ 4031133 h 6858001"/>
+              <a:gd name="connsiteX29" fmla="*/ 4754745 w 4990911"/>
+              <a:gd name="connsiteY29" fmla="*/ 4163492 h 6858001"/>
+              <a:gd name="connsiteX30" fmla="*/ 4759956 w 4990911"/>
+              <a:gd name="connsiteY30" fmla="*/ 4293793 h 6858001"/>
+              <a:gd name="connsiteX31" fmla="*/ 4764662 w 4990911"/>
+              <a:gd name="connsiteY31" fmla="*/ 4421352 h 6858001"/>
+              <a:gd name="connsiteX32" fmla="*/ 4777942 w 4990911"/>
+              <a:gd name="connsiteY32" fmla="*/ 4670298 h 6858001"/>
+              <a:gd name="connsiteX33" fmla="*/ 4792061 w 4990911"/>
+              <a:gd name="connsiteY33" fmla="*/ 4908956 h 6858001"/>
+              <a:gd name="connsiteX34" fmla="*/ 4806853 w 4990911"/>
+              <a:gd name="connsiteY34" fmla="*/ 5138013 h 6858001"/>
+              <a:gd name="connsiteX35" fmla="*/ 4823158 w 4990911"/>
+              <a:gd name="connsiteY35" fmla="*/ 5354726 h 6858001"/>
+              <a:gd name="connsiteX36" fmla="*/ 4840135 w 4990911"/>
+              <a:gd name="connsiteY36" fmla="*/ 5561838 h 6858001"/>
+              <a:gd name="connsiteX37" fmla="*/ 4858456 w 4990911"/>
+              <a:gd name="connsiteY37" fmla="*/ 5753862 h 6858001"/>
+              <a:gd name="connsiteX38" fmla="*/ 4876442 w 4990911"/>
+              <a:gd name="connsiteY38" fmla="*/ 5934227 h 6858001"/>
+              <a:gd name="connsiteX39" fmla="*/ 4894427 w 4990911"/>
+              <a:gd name="connsiteY39" fmla="*/ 6100191 h 6858001"/>
+              <a:gd name="connsiteX40" fmla="*/ 4911404 w 4990911"/>
+              <a:gd name="connsiteY40" fmla="*/ 6252438 h 6858001"/>
+              <a:gd name="connsiteX41" fmla="*/ 4927541 w 4990911"/>
+              <a:gd name="connsiteY41" fmla="*/ 6387541 h 6858001"/>
+              <a:gd name="connsiteX42" fmla="*/ 4942837 w 4990911"/>
+              <a:gd name="connsiteY42" fmla="*/ 6509613 h 6858001"/>
+              <a:gd name="connsiteX43" fmla="*/ 4955612 w 4990911"/>
+              <a:gd name="connsiteY43" fmla="*/ 6612483 h 6858001"/>
+              <a:gd name="connsiteX44" fmla="*/ 4967714 w 4990911"/>
+              <a:gd name="connsiteY44" fmla="*/ 6698894 h 6858001"/>
+              <a:gd name="connsiteX45" fmla="*/ 4985028 w 4990911"/>
+              <a:gd name="connsiteY45" fmla="*/ 6817538 h 6858001"/>
+              <a:gd name="connsiteX46" fmla="*/ 4990911 w 4990911"/>
+              <a:gd name="connsiteY46" fmla="*/ 6858000 h 6858001"/>
+              <a:gd name="connsiteX47" fmla="*/ 4085557 w 4990911"/>
+              <a:gd name="connsiteY47" fmla="*/ 6858000 h 6858001"/>
+              <a:gd name="connsiteX48" fmla="*/ 4085557 w 4990911"/>
+              <a:gd name="connsiteY48" fmla="*/ 6858001 h 6858001"/>
+              <a:gd name="connsiteX49" fmla="*/ 0 w 4990911"/>
+              <a:gd name="connsiteY49" fmla="*/ 6858001 h 6858001"/>
+              <a:gd name="connsiteX50" fmla="*/ 0 w 4990911"/>
+              <a:gd name="connsiteY50" fmla="*/ 1 h 6858001"/>
+              <a:gd name="connsiteX51" fmla="*/ 3646196 w 4990911"/>
+              <a:gd name="connsiteY51" fmla="*/ 1 h 6858001"/>
+            </a:gdLst>
+            <a:ahLst/>
+            <a:cxnLst>
+              <a:cxn ang="0">
+                <a:pos x="connsiteX0" y="connsiteY0"/>
+              </a:cxn>
+              <a:cxn ang="0">
+                <a:pos x="connsiteX1" y="connsiteY1"/>
+              </a:cxn>
+              <a:cxn ang="0">
+                <a:pos x="connsiteX2" y="connsiteY2"/>
+              </a:cxn>
+              <a:cxn ang="0">
+                <a:pos x="connsiteX3" y="connsiteY3"/>
+              </a:cxn>
+              <a:cxn ang="0">
+                <a:pos x="connsiteX4" y="connsiteY4"/>
+              </a:cxn>
+              <a:cxn ang="0">
+                <a:pos x="connsiteX5" y="connsiteY5"/>
+              </a:cxn>
+              <a:cxn ang="0">
+                <a:pos x="connsiteX6" y="connsiteY6"/>
+              </a:cxn>
+              <a:cxn ang="0">
+                <a:pos x="connsiteX7" y="connsiteY7"/>
+              </a:cxn>
+              <a:cxn ang="0">
+                <a:pos x="connsiteX8" y="connsiteY8"/>
+              </a:cxn>
+              <a:cxn ang="0">
+                <a:pos x="connsiteX9" y="connsiteY9"/>
+              </a:cxn>
+              <a:cxn ang="0">
+                <a:pos x="connsiteX10" y="connsiteY10"/>
+              </a:cxn>
+              <a:cxn ang="0">
+                <a:pos x="connsiteX11" y="connsiteY11"/>
+              </a:cxn>
+              <a:cxn ang="0">
+                <a:pos x="connsiteX12" y="connsiteY12"/>
+              </a:cxn>
+              <a:cxn ang="0">
+                <a:pos x="connsiteX13" y="connsiteY13"/>
+              </a:cxn>
+              <a:cxn ang="0">
+                <a:pos x="connsiteX14" y="connsiteY14"/>
+              </a:cxn>
+              <a:cxn ang="0">
+                <a:pos x="connsiteX15" y="connsiteY15"/>
+              </a:cxn>
+              <a:cxn ang="0">
+                <a:pos x="connsiteX16" y="connsiteY16"/>
+              </a:cxn>
+              <a:cxn ang="0">
+                <a:pos x="connsiteX17" y="connsiteY17"/>
+              </a:cxn>
+              <a:cxn ang="0">
+                <a:pos x="connsiteX18" y="connsiteY18"/>
+              </a:cxn>
+              <a:cxn ang="0">
+                <a:pos x="connsiteX19" y="connsiteY19"/>
+              </a:cxn>
+              <a:cxn ang="0">
+                <a:pos x="connsiteX20" y="connsiteY20"/>
+              </a:cxn>
+              <a:cxn ang="0">
+                <a:pos x="connsiteX21" y="connsiteY21"/>
+              </a:cxn>
+              <a:cxn ang="0">
+                <a:pos x="connsiteX22" y="connsiteY22"/>
+              </a:cxn>
+              <a:cxn ang="0">
+                <a:pos x="connsiteX23" y="connsiteY23"/>
+              </a:cxn>
+              <a:cxn ang="0">
+                <a:pos x="connsiteX24" y="connsiteY24"/>
+              </a:cxn>
+              <a:cxn ang="0">
+                <a:pos x="connsiteX25" y="connsiteY25"/>
+              </a:cxn>
+              <a:cxn ang="0">
+                <a:pos x="connsiteX26" y="connsiteY26"/>
+              </a:cxn>
+              <a:cxn ang="0">
+                <a:pos x="connsiteX27" y="connsiteY27"/>
+              </a:cxn>
+              <a:cxn ang="0">
+                <a:pos x="connsiteX28" y="connsiteY28"/>
+              </a:cxn>
+              <a:cxn ang="0">
+                <a:pos x="connsiteX29" y="connsiteY29"/>
+              </a:cxn>
+              <a:cxn ang="0">
+                <a:pos x="connsiteX30" y="connsiteY30"/>
+              </a:cxn>
+              <a:cxn ang="0">
+                <a:pos x="connsiteX31" y="connsiteY31"/>
+              </a:cxn>
+              <a:cxn ang="0">
+                <a:pos x="connsiteX32" y="connsiteY32"/>
+              </a:cxn>
+              <a:cxn ang="0">
+                <a:pos x="connsiteX33" y="connsiteY33"/>
+              </a:cxn>
+              <a:cxn ang="0">
+                <a:pos x="connsiteX34" y="connsiteY34"/>
+              </a:cxn>
+              <a:cxn ang="0">
+                <a:pos x="connsiteX35" y="connsiteY35"/>
+              </a:cxn>
+              <a:cxn ang="0">
+                <a:pos x="connsiteX36" y="connsiteY36"/>
+              </a:cxn>
+              <a:cxn ang="0">
+                <a:pos x="connsiteX37" y="connsiteY37"/>
+              </a:cxn>
+              <a:cxn ang="0">
+                <a:pos x="connsiteX38" y="connsiteY38"/>
+              </a:cxn>
+              <a:cxn ang="0">
+                <a:pos x="connsiteX39" y="connsiteY39"/>
+              </a:cxn>
+              <a:cxn ang="0">
+                <a:pos x="connsiteX40" y="connsiteY40"/>
+              </a:cxn>
+              <a:cxn ang="0">
+                <a:pos x="connsiteX41" y="connsiteY41"/>
+              </a:cxn>
+              <a:cxn ang="0">
+                <a:pos x="connsiteX42" y="connsiteY42"/>
+              </a:cxn>
+              <a:cxn ang="0">
+                <a:pos x="connsiteX43" y="connsiteY43"/>
+              </a:cxn>
+              <a:cxn ang="0">
+                <a:pos x="connsiteX44" y="connsiteY44"/>
+              </a:cxn>
+              <a:cxn ang="0">
+                <a:pos x="connsiteX45" y="connsiteY45"/>
+              </a:cxn>
+              <a:cxn ang="0">
+                <a:pos x="connsiteX46" y="connsiteY46"/>
+              </a:cxn>
+              <a:cxn ang="0">
+                <a:pos x="connsiteX47" y="connsiteY47"/>
+              </a:cxn>
+              <a:cxn ang="0">
+                <a:pos x="connsiteX48" y="connsiteY48"/>
+              </a:cxn>
+              <a:cxn ang="0">
+                <a:pos x="connsiteX49" y="connsiteY49"/>
+              </a:cxn>
+              <a:cxn ang="0">
+                <a:pos x="connsiteX50" y="connsiteY50"/>
+              </a:cxn>
+              <a:cxn ang="0">
+                <a:pos x="connsiteX51" y="connsiteY51"/>
+              </a:cxn>
+            </a:cxnLst>
+            <a:rect l="l" t="t" r="r" b="b"/>
+            <a:pathLst>
+              <a:path w="4990911" h="6858001">
+                <a:moveTo>
+                  <a:pt x="3646196" y="0"/>
+                </a:moveTo>
+                <a:lnTo>
+                  <a:pt x="4989734" y="0"/>
+                </a:lnTo>
+                <a:lnTo>
+                  <a:pt x="4964689" y="155677"/>
+                </a:lnTo>
+                <a:lnTo>
+                  <a:pt x="4940820" y="310668"/>
+                </a:lnTo>
+                <a:lnTo>
+                  <a:pt x="4917456" y="466344"/>
+                </a:lnTo>
+                <a:lnTo>
+                  <a:pt x="4897453" y="622707"/>
+                </a:lnTo>
+                <a:lnTo>
+                  <a:pt x="4877282" y="778383"/>
+                </a:lnTo>
+                <a:lnTo>
+                  <a:pt x="4858456" y="934746"/>
+                </a:lnTo>
+                <a:lnTo>
+                  <a:pt x="4842320" y="1089051"/>
+                </a:lnTo>
+                <a:lnTo>
+                  <a:pt x="4827024" y="1245413"/>
+                </a:lnTo>
+                <a:lnTo>
+                  <a:pt x="4813072" y="1401090"/>
+                </a:lnTo>
+                <a:lnTo>
+                  <a:pt x="4800970" y="1554023"/>
+                </a:lnTo>
+                <a:lnTo>
+                  <a:pt x="4788867" y="1709014"/>
+                </a:lnTo>
+                <a:lnTo>
+                  <a:pt x="4778782" y="1861947"/>
+                </a:lnTo>
+                <a:lnTo>
+                  <a:pt x="4770882" y="2014881"/>
+                </a:lnTo>
+                <a:lnTo>
+                  <a:pt x="4762645" y="2167128"/>
+                </a:lnTo>
+                <a:lnTo>
+                  <a:pt x="4755754" y="2318004"/>
+                </a:lnTo>
+                <a:lnTo>
+                  <a:pt x="4750879" y="2467509"/>
+                </a:lnTo>
+                <a:lnTo>
+                  <a:pt x="4746677" y="2617013"/>
+                </a:lnTo>
+                <a:lnTo>
+                  <a:pt x="4742643" y="2765146"/>
+                </a:lnTo>
+                <a:lnTo>
+                  <a:pt x="4740794" y="2911221"/>
+                </a:lnTo>
+                <a:lnTo>
+                  <a:pt x="4738777" y="3057297"/>
+                </a:lnTo>
+                <a:lnTo>
+                  <a:pt x="4737768" y="3201315"/>
+                </a:lnTo>
+                <a:lnTo>
+                  <a:pt x="4738777" y="3343961"/>
+                </a:lnTo>
+                <a:lnTo>
+                  <a:pt x="4738777" y="3485236"/>
+                </a:lnTo>
+                <a:lnTo>
+                  <a:pt x="4740794" y="3625139"/>
+                </a:lnTo>
+                <a:lnTo>
+                  <a:pt x="4743819" y="3762299"/>
+                </a:lnTo>
+                <a:lnTo>
+                  <a:pt x="4746677" y="3898087"/>
+                </a:lnTo>
+                <a:lnTo>
+                  <a:pt x="4749871" y="4031133"/>
+                </a:lnTo>
+                <a:lnTo>
+                  <a:pt x="4754745" y="4163492"/>
+                </a:lnTo>
+                <a:lnTo>
+                  <a:pt x="4759956" y="4293793"/>
+                </a:lnTo>
+                <a:lnTo>
+                  <a:pt x="4764662" y="4421352"/>
+                </a:lnTo>
+                <a:lnTo>
+                  <a:pt x="4777942" y="4670298"/>
+                </a:lnTo>
+                <a:lnTo>
+                  <a:pt x="4792061" y="4908956"/>
+                </a:lnTo>
+                <a:lnTo>
+                  <a:pt x="4806853" y="5138013"/>
+                </a:lnTo>
+                <a:lnTo>
+                  <a:pt x="4823158" y="5354726"/>
+                </a:lnTo>
+                <a:lnTo>
+                  <a:pt x="4840135" y="5561838"/>
+                </a:lnTo>
+                <a:lnTo>
+                  <a:pt x="4858456" y="5753862"/>
+                </a:lnTo>
+                <a:lnTo>
+                  <a:pt x="4876442" y="5934227"/>
+                </a:lnTo>
+                <a:lnTo>
+                  <a:pt x="4894427" y="6100191"/>
+                </a:lnTo>
+                <a:lnTo>
+                  <a:pt x="4911404" y="6252438"/>
+                </a:lnTo>
+                <a:lnTo>
+                  <a:pt x="4927541" y="6387541"/>
+                </a:lnTo>
+                <a:lnTo>
+                  <a:pt x="4942837" y="6509613"/>
+                </a:lnTo>
+                <a:lnTo>
+                  <a:pt x="4955612" y="6612483"/>
+                </a:lnTo>
+                <a:lnTo>
+                  <a:pt x="4967714" y="6698894"/>
+                </a:lnTo>
+                <a:lnTo>
+                  <a:pt x="4985028" y="6817538"/>
+                </a:lnTo>
+                <a:lnTo>
+                  <a:pt x="4990911" y="6858000"/>
+                </a:lnTo>
+                <a:lnTo>
+                  <a:pt x="4085557" y="6858000"/>
+                </a:lnTo>
+                <a:lnTo>
+                  <a:pt x="4085557" y="6858001"/>
+                </a:lnTo>
+                <a:lnTo>
+                  <a:pt x="0" y="6858001"/>
+                </a:lnTo>
+                <a:lnTo>
+                  <a:pt x="0" y="1"/>
+                </a:lnTo>
+                <a:lnTo>
+                  <a:pt x="3646196" y="1"/>
+                </a:lnTo>
+                <a:close/>
+              </a:path>
+            </a:pathLst>
+          </a:custGeom>
+          <a:solidFill>
+            <a:schemeClr val="tx2"/>
+          </a:solidFill>
+          <a:ln>
+            <a:noFill/>
+          </a:ln>
+        </p:spPr>
+        <p:style>
+          <a:lnRef idx="2">
+            <a:schemeClr val="accent1">
+              <a:shade val="50000"/>
+            </a:schemeClr>
+          </a:lnRef>
+          <a:fillRef idx="1">
+            <a:schemeClr val="accent1"/>
+          </a:fillRef>
+          <a:effectRef idx="0">
+            <a:schemeClr val="accent1"/>
+          </a:effectRef>
+          <a:fontRef idx="minor">
+            <a:schemeClr val="lt1"/>
+          </a:fontRef>
+        </p:style>
+        <p:txBody>
+          <a:bodyPr rtlCol="0" anchor="ctr"/>
+          <a:lstStyle/>
+          <a:p>
+            <a:pPr algn="ctr"/>
+            <a:endParaRPr lang="en-US"/>
+          </a:p>
+        </p:txBody>
+      </p:sp>
+      <p:sp>
+        <p:nvSpPr>
+          <p:cNvPr id="17" name="Rectangle 13">
+            <a:extLst>
+              <a:ext uri="{FF2B5EF4-FFF2-40B4-BE49-F238E27FC236}">
+                <a16:creationId xmlns:a16="http://schemas.microsoft.com/office/drawing/2014/main" id="{8ADAB9C8-EB37-4914-A699-C716FC8FE4FE}"/>
+              </a:ext>
+              <a:ext uri="{C183D7F6-B498-43B3-948B-1728B52AA6E4}">
+                <adec:decorative xmlns="" xmlns:adec="http://schemas.microsoft.com/office/drawing/2017/decorative" val="1"/>
+              </a:ext>
+            </a:extLst>
+          </p:cNvPr>
+          <p:cNvSpPr>
+            <a:spLocks noGrp="1" noRot="1" noChangeAspect="1" noMove="1" noResize="1" noEditPoints="1" noAdjustHandles="1" noChangeArrowheads="1" noChangeShapeType="1" noTextEdit="1"/>
+          </p:cNvSpPr>
+          <p:nvPr>
+            <p:extLst>
+              <p:ext uri="{386F3935-93C4-4BCD-93E2-E3B085C9AB24}">
+                <p16:designElem xmlns:p16="http://schemas.microsoft.com/office/powerpoint/2015/main" val="1"/>
+              </p:ext>
+            </p:extLst>
+          </p:nvPr>
+        </p:nvSpPr>
+        <p:spPr>
+          <a:xfrm>
+            <a:off x="10437812" y="0"/>
+            <a:ext cx="685800" cy="1143000"/>
+          </a:xfrm>
+          <a:prstGeom prst="rect">
+            <a:avLst/>
+          </a:prstGeom>
+          <a:solidFill>
+            <a:schemeClr val="accent1"/>
+          </a:solidFill>
+          <a:ln>
+            <a:noFill/>
+          </a:ln>
+        </p:spPr>
+        <p:style>
+          <a:lnRef idx="1">
+            <a:schemeClr val="accent1"/>
+          </a:lnRef>
+          <a:fillRef idx="3">
+            <a:schemeClr val="accent1"/>
+          </a:fillRef>
+          <a:effectRef idx="2">
+            <a:schemeClr val="accent1"/>
+          </a:effectRef>
+          <a:fontRef idx="minor">
+            <a:schemeClr val="lt1"/>
+          </a:fontRef>
+        </p:style>
+      </p:sp>
+      <p:sp>
+        <p:nvSpPr>
+          <p:cNvPr id="2" name="Título 1">
+            <a:extLst>
+              <a:ext uri="{FF2B5EF4-FFF2-40B4-BE49-F238E27FC236}">
+                <a16:creationId xmlns:a16="http://schemas.microsoft.com/office/drawing/2014/main" id="{766E7729-507A-4963-8D21-F1DA9947AF7B}"/>
+              </a:ext>
+            </a:extLst>
+          </p:cNvPr>
+          <p:cNvSpPr>
+            <a:spLocks noGrp="1"/>
+          </p:cNvSpPr>
+          <p:nvPr>
+            <p:ph type="title"/>
+          </p:nvPr>
+        </p:nvSpPr>
+        <p:spPr>
+          <a:xfrm>
+            <a:off x="653143" y="1645920"/>
+            <a:ext cx="3522879" cy="4470821"/>
+          </a:xfrm>
+        </p:spPr>
+        <p:txBody>
+          <a:bodyPr>
+            <a:normAutofit/>
+          </a:bodyPr>
+          <a:lstStyle/>
+          <a:p>
+            <a:pPr algn="r"/>
+            <a:r>
+              <a:rPr lang="pt-BR">
+                <a:solidFill>
+                  <a:schemeClr val="bg2"/>
+                </a:solidFill>
+                <a:latin typeface="Arial" panose="020B0604020202020204" pitchFamily="34" charset="0"/>
+                <a:cs typeface="Arial" panose="020B0604020202020204" pitchFamily="34" charset="0"/>
+              </a:rPr>
+              <a:t>Roadmap</a:t>
+            </a:r>
+          </a:p>
+        </p:txBody>
+      </p:sp>
+      <p:sp>
+        <p:nvSpPr>
+          <p:cNvPr id="3" name="Espaço Reservado para Conteúdo 2">
+            <a:extLst>
+              <a:ext uri="{FF2B5EF4-FFF2-40B4-BE49-F238E27FC236}">
+                <a16:creationId xmlns:a16="http://schemas.microsoft.com/office/drawing/2014/main" id="{78875C80-6D58-4D9A-93D9-1A0771E562AE}"/>
+              </a:ext>
+            </a:extLst>
+          </p:cNvPr>
+          <p:cNvSpPr>
+            <a:spLocks noGrp="1"/>
+          </p:cNvSpPr>
+          <p:nvPr>
+            <p:ph idx="1"/>
+          </p:nvPr>
+        </p:nvSpPr>
+        <p:spPr>
+          <a:xfrm>
+            <a:off x="5204109" y="1645920"/>
+            <a:ext cx="6269434" cy="4873387"/>
+          </a:xfrm>
+        </p:spPr>
+        <p:txBody>
+          <a:bodyPr vert="horz" lIns="91440" tIns="45720" rIns="91440" bIns="45720" rtlCol="0" anchor="t">
+            <a:noAutofit/>
+          </a:bodyPr>
+          <a:lstStyle/>
+          <a:p>
+            <a:r>
+              <a:rPr lang="pt-BR" sz="2800" dirty="0">
+                <a:latin typeface="Arial"/>
+                <a:cs typeface="Arial"/>
+              </a:rPr>
+              <a:t>Veremos por aqui, caminhos a seguir de um desenvolvedor web.</a:t>
+            </a:r>
+          </a:p>
+          <a:p>
+            <a:pPr marL="0" indent="0">
+              <a:buNone/>
+            </a:pPr>
+            <a:endParaRPr lang="pt-BR" sz="2800" dirty="0">
+              <a:latin typeface="Arial"/>
+              <a:cs typeface="Arial"/>
+            </a:endParaRPr>
+          </a:p>
+          <a:p>
+            <a:r>
+              <a:rPr lang="pt-BR" sz="2800" dirty="0">
+                <a:latin typeface="Arial"/>
+                <a:cs typeface="Arial"/>
+              </a:rPr>
+              <a:t>Link do site:</a:t>
+            </a:r>
+          </a:p>
+          <a:p>
+            <a:pPr marL="0" indent="0">
+              <a:buNone/>
+            </a:pPr>
+            <a:r>
+              <a:rPr lang="pt-BR" sz="2800" dirty="0">
+                <a:latin typeface="Arial"/>
+                <a:cs typeface="Arial"/>
+                <a:hlinkClick r:id="rId3"/>
+              </a:rPr>
+              <a:t>https://roadmap.sh/</a:t>
+            </a:r>
+            <a:endParaRPr lang="pt-BR" sz="2800" dirty="0">
+              <a:latin typeface="Arial"/>
+              <a:cs typeface="Arial"/>
+            </a:endParaRPr>
+          </a:p>
+          <a:p>
+            <a:pPr marL="0" indent="0">
+              <a:buNone/>
+            </a:pPr>
+            <a:endParaRPr lang="pt-BR" sz="2800" dirty="0">
+              <a:latin typeface="Arial"/>
+              <a:cs typeface="Arial"/>
+            </a:endParaRPr>
+          </a:p>
+          <a:p>
+            <a:r>
+              <a:rPr lang="pt-BR" sz="2800" dirty="0">
+                <a:latin typeface="Arial"/>
+                <a:cs typeface="Arial"/>
+              </a:rPr>
+              <a:t>Link para o </a:t>
+            </a:r>
+            <a:r>
+              <a:rPr lang="pt-BR" sz="2800" dirty="0" err="1">
+                <a:latin typeface="Arial"/>
+                <a:cs typeface="Arial"/>
+              </a:rPr>
+              <a:t>Roadmap</a:t>
+            </a:r>
+            <a:r>
+              <a:rPr lang="pt-BR" sz="2800" dirty="0">
+                <a:latin typeface="Arial"/>
+                <a:cs typeface="Arial"/>
+              </a:rPr>
+              <a:t> (direto):</a:t>
+            </a:r>
+          </a:p>
+          <a:p>
+            <a:pPr marL="0" indent="0">
+              <a:buNone/>
+            </a:pPr>
+            <a:r>
+              <a:rPr lang="pt-BR" sz="2800" dirty="0">
+                <a:latin typeface="Arial"/>
+                <a:cs typeface="Arial"/>
+                <a:hlinkClick r:id="rId4"/>
+              </a:rPr>
+              <a:t>https://github.com/kamranahmedse/developer-roadmap</a:t>
+            </a:r>
+            <a:endParaRPr lang="pt-BR" sz="2800" dirty="0">
+              <a:latin typeface="Arial"/>
+              <a:cs typeface="Arial"/>
+            </a:endParaRPr>
+          </a:p>
+          <a:p>
+            <a:pPr marL="0" indent="0">
+              <a:buNone/>
+            </a:pPr>
+            <a:endParaRPr lang="pt-BR" dirty="0"/>
+          </a:p>
+        </p:txBody>
+      </p:sp>
+    </p:spTree>
+    <p:extLst>
+      <p:ext uri="{BB962C8B-B14F-4D97-AF65-F5344CB8AC3E}">
+        <p14:creationId xmlns:p14="http://schemas.microsoft.com/office/powerpoint/2010/main" val="1302451237"/>
+      </p:ext>
+    </p:extLst>
+  </p:cSld>
+  <p:clrMapOvr>
+    <a:masterClrMapping/>
+  </p:clrMapOvr>
+  <p:transition spd="med">
+    <p:pull/>
+  </p:transition>
+</p:sld>
+</file>
+
 <file path=ppt/slides/slide2.xml><?xml version="1.0" encoding="utf-8"?>
 <p:sld xmlns:a="http://schemas.openxmlformats.org/drawingml/2006/main" xmlns:r="http://schemas.openxmlformats.org/officeDocument/2006/relationships" xmlns:p="http://schemas.openxmlformats.org/presentationml/2006/main">
   <p:cSld>
@@ -28847,7 +28847,7 @@
                 <a:hlinkClick r:id="rId3">
                   <a:extLst>
                     <a:ext uri="{A12FA001-AC4F-418D-AE19-62706E023703}">
-                      <ahyp:hlinkClr xmlns:ahyp="http://schemas.microsoft.com/office/drawing/2018/hyperlinkcolor" xmlns="" val="tx"/>
+                      <ahyp:hlinkClr xmlns="" xmlns:ahyp="http://schemas.microsoft.com/office/drawing/2018/hyperlinkcolor" val="tx"/>
                     </a:ext>
                   </a:extLst>
                 </a:hlinkClick>
@@ -28923,7 +28923,7 @@
                 <a:hlinkClick r:id="rId4">
                   <a:extLst>
                     <a:ext uri="{A12FA001-AC4F-418D-AE19-62706E023703}">
-                      <ahyp:hlinkClr xmlns:ahyp="http://schemas.microsoft.com/office/drawing/2018/hyperlinkcolor" xmlns="" val="tx"/>
+                      <ahyp:hlinkClr xmlns="" xmlns:ahyp="http://schemas.microsoft.com/office/drawing/2018/hyperlinkcolor" val="tx"/>
                     </a:ext>
                   </a:extLst>
                 </a:hlinkClick>
@@ -28949,7 +28949,7 @@
                 <a16:creationId xmlns:a16="http://schemas.microsoft.com/office/drawing/2014/main" id="{0D187C4E-14B9-4504-B200-5127823FA78C}"/>
               </a:ext>
               <a:ext uri="{C183D7F6-B498-43B3-948B-1728B52AA6E4}">
-                <adec:decorative xmlns:adec="http://schemas.microsoft.com/office/drawing/2017/decorative" xmlns="" val="1"/>
+                <adec:decorative xmlns="" xmlns:adec="http://schemas.microsoft.com/office/drawing/2017/decorative" val="1"/>
               </a:ext>
             </a:extLst>
           </p:cNvPr>
@@ -29310,7 +29310,7 @@
                 <a16:creationId xmlns:a16="http://schemas.microsoft.com/office/drawing/2014/main" id="{0D9B8FD4-CDEB-4EB4-B4DE-C89E11938958}"/>
               </a:ext>
               <a:ext uri="{C183D7F6-B498-43B3-948B-1728B52AA6E4}">
-                <adec:decorative xmlns:adec="http://schemas.microsoft.com/office/drawing/2017/decorative" xmlns="" val="1"/>
+                <adec:decorative xmlns="" xmlns:adec="http://schemas.microsoft.com/office/drawing/2017/decorative" val="1"/>
               </a:ext>
             </a:extLst>
           </p:cNvPr>
@@ -29370,7 +29370,7 @@
                 <a16:creationId xmlns:a16="http://schemas.microsoft.com/office/drawing/2014/main" id="{5A2E3D1D-9E9F-4739-BA14-D4D7FA9FBDD1}"/>
               </a:ext>
               <a:ext uri="{C183D7F6-B498-43B3-948B-1728B52AA6E4}">
-                <adec:decorative xmlns:adec="http://schemas.microsoft.com/office/drawing/2017/decorative" xmlns="" val="1"/>
+                <adec:decorative xmlns="" xmlns:adec="http://schemas.microsoft.com/office/drawing/2017/decorative" val="1"/>
               </a:ext>
             </a:extLst>
           </p:cNvPr>
@@ -29722,7 +29722,7 @@
                 <a16:creationId xmlns:a16="http://schemas.microsoft.com/office/drawing/2014/main" id="{1FFB365B-E9DC-4859-B8AB-CB83EEBE4E28}"/>
               </a:ext>
               <a:ext uri="{C183D7F6-B498-43B3-948B-1728B52AA6E4}">
-                <adec:decorative xmlns:adec="http://schemas.microsoft.com/office/drawing/2017/decorative" xmlns="" val="1"/>
+                <adec:decorative xmlns="" xmlns:adec="http://schemas.microsoft.com/office/drawing/2017/decorative" val="1"/>
               </a:ext>
             </a:extLst>
           </p:cNvPr>
@@ -30212,7 +30212,7 @@
                 <a16:creationId xmlns:a16="http://schemas.microsoft.com/office/drawing/2014/main" id="{8ADAB9C8-EB37-4914-A699-C716FC8FE4FE}"/>
               </a:ext>
               <a:ext uri="{C183D7F6-B498-43B3-948B-1728B52AA6E4}">
-                <adec:decorative xmlns:adec="http://schemas.microsoft.com/office/drawing/2017/decorative" xmlns="" val="1"/>
+                <adec:decorative xmlns="" xmlns:adec="http://schemas.microsoft.com/office/drawing/2017/decorative" val="1"/>
               </a:ext>
             </a:extLst>
           </p:cNvPr>
@@ -30449,7 +30449,7 @@
                 <a16:creationId xmlns:a16="http://schemas.microsoft.com/office/drawing/2014/main" id="{C9ECDD5C-152A-4CC7-8333-0F367B3A62EA}"/>
               </a:ext>
               <a:ext uri="{C183D7F6-B498-43B3-948B-1728B52AA6E4}">
-                <adec:decorative xmlns:adec="http://schemas.microsoft.com/office/drawing/2017/decorative" xmlns="" val="1"/>
+                <adec:decorative xmlns="" xmlns:adec="http://schemas.microsoft.com/office/drawing/2017/decorative" val="1"/>
               </a:ext>
             </a:extLst>
           </p:cNvPr>
@@ -30493,7 +30493,7 @@
                 <a16:creationId xmlns:a16="http://schemas.microsoft.com/office/drawing/2014/main" id="{7F5C92A3-369B-43F3-BDCE-E560B1B0EC89}"/>
               </a:ext>
               <a:ext uri="{C183D7F6-B498-43B3-948B-1728B52AA6E4}">
-                <adec:decorative xmlns:adec="http://schemas.microsoft.com/office/drawing/2017/decorative" xmlns="" val="1"/>
+                <adec:decorative xmlns="" xmlns:adec="http://schemas.microsoft.com/office/drawing/2017/decorative" val="1"/>
               </a:ext>
             </a:extLst>
           </p:cNvPr>
@@ -30537,7 +30537,7 @@
                 <a16:creationId xmlns:a16="http://schemas.microsoft.com/office/drawing/2014/main" id="{AEBE9F1A-B38D-446E-83AE-14B17CE77FF2}"/>
               </a:ext>
               <a:ext uri="{C183D7F6-B498-43B3-948B-1728B52AA6E4}">
-                <adec:decorative xmlns:adec="http://schemas.microsoft.com/office/drawing/2017/decorative" xmlns="" val="1"/>
+                <adec:decorative xmlns="" xmlns:adec="http://schemas.microsoft.com/office/drawing/2017/decorative" val="1"/>
               </a:ext>
             </a:extLst>
           </p:cNvPr>
@@ -30617,7 +30617,7 @@
                 <a16:creationId xmlns:a16="http://schemas.microsoft.com/office/drawing/2014/main" id="{915B5014-A7EC-4BA6-9C83-8840CF81DB28}"/>
               </a:ext>
               <a:ext uri="{C183D7F6-B498-43B3-948B-1728B52AA6E4}">
-                <adec:decorative xmlns:adec="http://schemas.microsoft.com/office/drawing/2017/decorative" xmlns="" val="1"/>
+                <adec:decorative xmlns="" xmlns:adec="http://schemas.microsoft.com/office/drawing/2017/decorative" val="1"/>
               </a:ext>
             </a:extLst>
           </p:cNvPr>
@@ -30661,7 +30661,7 @@
                 <a16:creationId xmlns:a16="http://schemas.microsoft.com/office/drawing/2014/main" id="{022C43AB-86D7-420D-8AD7-DC0A15FDD0AF}"/>
               </a:ext>
               <a:ext uri="{C183D7F6-B498-43B3-948B-1728B52AA6E4}">
-                <adec:decorative xmlns:adec="http://schemas.microsoft.com/office/drawing/2017/decorative" xmlns="" val="1"/>
+                <adec:decorative xmlns="" xmlns:adec="http://schemas.microsoft.com/office/drawing/2017/decorative" val="1"/>
               </a:ext>
             </a:extLst>
           </p:cNvPr>
@@ -30705,7 +30705,7 @@
                 <a16:creationId xmlns:a16="http://schemas.microsoft.com/office/drawing/2014/main" id="{5E3EB826-A471-488F-9E8A-D65528A3C0CA}"/>
               </a:ext>
               <a:ext uri="{C183D7F6-B498-43B3-948B-1728B52AA6E4}">
-                <adec:decorative xmlns:adec="http://schemas.microsoft.com/office/drawing/2017/decorative" xmlns="" val="1"/>
+                <adec:decorative xmlns="" xmlns:adec="http://schemas.microsoft.com/office/drawing/2017/decorative" val="1"/>
               </a:ext>
             </a:extLst>
           </p:cNvPr>
@@ -30758,7 +30758,7 @@
                 <a16:creationId xmlns:a16="http://schemas.microsoft.com/office/drawing/2014/main" id="{DFB3CEA1-88D9-42FB-88ED-1E9807FE6596}"/>
               </a:ext>
               <a:ext uri="{C183D7F6-B498-43B3-948B-1728B52AA6E4}">
-                <adec:decorative xmlns:adec="http://schemas.microsoft.com/office/drawing/2017/decorative" xmlns="" val="1"/>
+                <adec:decorative xmlns="" xmlns:adec="http://schemas.microsoft.com/office/drawing/2017/decorative" val="1"/>
               </a:ext>
             </a:extLst>
           </p:cNvPr>
@@ -30851,7 +30851,7 @@
                 <a16:creationId xmlns:a16="http://schemas.microsoft.com/office/drawing/2014/main" id="{9A6C928E-4252-4F33-8C34-E50A12A3170B}"/>
               </a:ext>
               <a:ext uri="{C183D7F6-B498-43B3-948B-1728B52AA6E4}">
-                <adec:decorative xmlns:adec="http://schemas.microsoft.com/office/drawing/2017/decorative" xmlns="" val="1"/>
+                <adec:decorative xmlns="" xmlns:adec="http://schemas.microsoft.com/office/drawing/2017/decorative" val="1"/>
               </a:ext>
             </a:extLst>
           </p:cNvPr>
@@ -30945,7 +30945,7 @@
                 <a16:creationId xmlns:a16="http://schemas.microsoft.com/office/drawing/2014/main" id="{5F3FC718-FDE3-4EF7-921E-A5F374EAF824}"/>
               </a:ext>
               <a:ext uri="{C183D7F6-B498-43B3-948B-1728B52AA6E4}">
-                <adec:decorative xmlns:adec="http://schemas.microsoft.com/office/drawing/2017/decorative" xmlns="" val="1"/>
+                <adec:decorative xmlns="" xmlns:adec="http://schemas.microsoft.com/office/drawing/2017/decorative" val="1"/>
               </a:ext>
             </a:extLst>
           </p:cNvPr>
@@ -31005,7 +31005,7 @@
                 <a16:creationId xmlns:a16="http://schemas.microsoft.com/office/drawing/2014/main" id="{FAA0F719-3DC8-4F08-AD8F-5A845658CB9D}"/>
               </a:ext>
               <a:ext uri="{C183D7F6-B498-43B3-948B-1728B52AA6E4}">
-                <adec:decorative xmlns:adec="http://schemas.microsoft.com/office/drawing/2017/decorative" xmlns="" val="1"/>
+                <adec:decorative xmlns="" xmlns:adec="http://schemas.microsoft.com/office/drawing/2017/decorative" val="1"/>
               </a:ext>
             </a:extLst>
           </p:cNvPr>
@@ -31357,7 +31357,7 @@
                 <a16:creationId xmlns:a16="http://schemas.microsoft.com/office/drawing/2014/main" id="{7DCB61BE-FA0F-4EFB-BE0E-268BAD8E30D6}"/>
               </a:ext>
               <a:ext uri="{C183D7F6-B498-43B3-948B-1728B52AA6E4}">
-                <adec:decorative xmlns:adec="http://schemas.microsoft.com/office/drawing/2017/decorative" xmlns="" val="1"/>
+                <adec:decorative xmlns="" xmlns:adec="http://schemas.microsoft.com/office/drawing/2017/decorative" val="1"/>
               </a:ext>
             </a:extLst>
           </p:cNvPr>
@@ -31820,7 +31820,7 @@
                 <a16:creationId xmlns:a16="http://schemas.microsoft.com/office/drawing/2014/main" id="{A4B31EAA-7423-46F7-9B90-4AB2B09C35C4}"/>
               </a:ext>
               <a:ext uri="{C183D7F6-B498-43B3-948B-1728B52AA6E4}">
-                <adec:decorative xmlns:adec="http://schemas.microsoft.com/office/drawing/2017/decorative" xmlns="" val="1"/>
+                <adec:decorative xmlns="" xmlns:adec="http://schemas.microsoft.com/office/drawing/2017/decorative" val="1"/>
               </a:ext>
             </a:extLst>
           </p:cNvPr>
@@ -32012,7 +32012,7 @@
                 <a16:creationId xmlns:a16="http://schemas.microsoft.com/office/drawing/2014/main" id="{5F3FC718-FDE3-4EF7-921E-A5F374EAF824}"/>
               </a:ext>
               <a:ext uri="{C183D7F6-B498-43B3-948B-1728B52AA6E4}">
-                <adec:decorative xmlns:adec="http://schemas.microsoft.com/office/drawing/2017/decorative" xmlns="" val="1"/>
+                <adec:decorative xmlns="" xmlns:adec="http://schemas.microsoft.com/office/drawing/2017/decorative" val="1"/>
               </a:ext>
             </a:extLst>
           </p:cNvPr>
@@ -32121,7 +32121,7 @@
                 <a16:creationId xmlns:a16="http://schemas.microsoft.com/office/drawing/2014/main" id="{FAA0F719-3DC8-4F08-AD8F-5A845658CB9D}"/>
               </a:ext>
               <a:ext uri="{C183D7F6-B498-43B3-948B-1728B52AA6E4}">
-                <adec:decorative xmlns:adec="http://schemas.microsoft.com/office/drawing/2017/decorative" xmlns="" val="1"/>
+                <adec:decorative xmlns="" xmlns:adec="http://schemas.microsoft.com/office/drawing/2017/decorative" val="1"/>
               </a:ext>
             </a:extLst>
           </p:cNvPr>
@@ -32473,7 +32473,7 @@
                 <a16:creationId xmlns:a16="http://schemas.microsoft.com/office/drawing/2014/main" id="{7DCB61BE-FA0F-4EFB-BE0E-268BAD8E30D6}"/>
               </a:ext>
               <a:ext uri="{C183D7F6-B498-43B3-948B-1728B52AA6E4}">
-                <adec:decorative xmlns:adec="http://schemas.microsoft.com/office/drawing/2017/decorative" xmlns="" val="1"/>
+                <adec:decorative xmlns="" xmlns:adec="http://schemas.microsoft.com/office/drawing/2017/decorative" val="1"/>
               </a:ext>
             </a:extLst>
           </p:cNvPr>
@@ -32936,7 +32936,7 @@
                 <a16:creationId xmlns:a16="http://schemas.microsoft.com/office/drawing/2014/main" id="{A4B31EAA-7423-46F7-9B90-4AB2B09C35C4}"/>
               </a:ext>
               <a:ext uri="{C183D7F6-B498-43B3-948B-1728B52AA6E4}">
-                <adec:decorative xmlns:adec="http://schemas.microsoft.com/office/drawing/2017/decorative" xmlns="" val="1"/>
+                <adec:decorative xmlns="" xmlns:adec="http://schemas.microsoft.com/office/drawing/2017/decorative" val="1"/>
               </a:ext>
             </a:extLst>
           </p:cNvPr>
@@ -33992,7 +33992,7 @@
                 <a16:creationId xmlns:a16="http://schemas.microsoft.com/office/drawing/2014/main" id="{B4AAD3FD-83A5-4B89-9F8F-01B8870865BE}"/>
               </a:ext>
               <a:ext uri="{C183D7F6-B498-43B3-948B-1728B52AA6E4}">
-                <adec:decorative xmlns:adec="http://schemas.microsoft.com/office/drawing/2017/decorative" xmlns="" val="1"/>
+                <adec:decorative xmlns="" xmlns:adec="http://schemas.microsoft.com/office/drawing/2017/decorative" val="1"/>
               </a:ext>
             </a:extLst>
           </p:cNvPr>
@@ -34052,7 +34052,7 @@
                 <a16:creationId xmlns:a16="http://schemas.microsoft.com/office/drawing/2014/main" id="{61752F1D-FC0F-4103-9584-630E643CCDA6}"/>
               </a:ext>
               <a:ext uri="{C183D7F6-B498-43B3-948B-1728B52AA6E4}">
-                <adec:decorative xmlns:adec="http://schemas.microsoft.com/office/drawing/2017/decorative" xmlns="" val="1"/>
+                <adec:decorative xmlns="" xmlns:adec="http://schemas.microsoft.com/office/drawing/2017/decorative" val="1"/>
               </a:ext>
             </a:extLst>
           </p:cNvPr>
@@ -34404,7 +34404,7 @@
                 <a16:creationId xmlns:a16="http://schemas.microsoft.com/office/drawing/2014/main" id="{70151CB7-E7DE-4917-B831-01DF9CE01306}"/>
               </a:ext>
               <a:ext uri="{C183D7F6-B498-43B3-948B-1728B52AA6E4}">
-                <adec:decorative xmlns:adec="http://schemas.microsoft.com/office/drawing/2017/decorative" xmlns="" val="1"/>
+                <adec:decorative xmlns="" xmlns:adec="http://schemas.microsoft.com/office/drawing/2017/decorative" val="1"/>
               </a:ext>
             </a:extLst>
           </p:cNvPr>
@@ -34898,7 +34898,7 @@
                 <a16:creationId xmlns:a16="http://schemas.microsoft.com/office/drawing/2014/main" id="{A92A1116-1C84-41DF-B803-1F7B0883EC82}"/>
               </a:ext>
               <a:ext uri="{C183D7F6-B498-43B3-948B-1728B52AA6E4}">
-                <adec:decorative xmlns:adec="http://schemas.microsoft.com/office/drawing/2017/decorative" xmlns="" val="1"/>
+                <adec:decorative xmlns="" xmlns:adec="http://schemas.microsoft.com/office/drawing/2017/decorative" val="1"/>
               </a:ext>
             </a:extLst>
           </p:cNvPr>
@@ -35193,7 +35193,7 @@
                 <a16:creationId xmlns:a16="http://schemas.microsoft.com/office/drawing/2014/main" id="{B4AAD3FD-83A5-4B89-9F8F-01B8870865BE}"/>
               </a:ext>
               <a:ext uri="{C183D7F6-B498-43B3-948B-1728B52AA6E4}">
-                <adec:decorative xmlns:adec="http://schemas.microsoft.com/office/drawing/2017/decorative" xmlns="" val="1"/>
+                <adec:decorative xmlns="" xmlns:adec="http://schemas.microsoft.com/office/drawing/2017/decorative" val="1"/>
               </a:ext>
             </a:extLst>
           </p:cNvPr>
@@ -35297,7 +35297,7 @@
                 <a16:creationId xmlns:a16="http://schemas.microsoft.com/office/drawing/2014/main" id="{61752F1D-FC0F-4103-9584-630E643CCDA6}"/>
               </a:ext>
               <a:ext uri="{C183D7F6-B498-43B3-948B-1728B52AA6E4}">
-                <adec:decorative xmlns:adec="http://schemas.microsoft.com/office/drawing/2017/decorative" xmlns="" val="1"/>
+                <adec:decorative xmlns="" xmlns:adec="http://schemas.microsoft.com/office/drawing/2017/decorative" val="1"/>
               </a:ext>
             </a:extLst>
           </p:cNvPr>
@@ -35649,7 +35649,7 @@
                 <a16:creationId xmlns:a16="http://schemas.microsoft.com/office/drawing/2014/main" id="{70151CB7-E7DE-4917-B831-01DF9CE01306}"/>
               </a:ext>
               <a:ext uri="{C183D7F6-B498-43B3-948B-1728B52AA6E4}">
-                <adec:decorative xmlns:adec="http://schemas.microsoft.com/office/drawing/2017/decorative" xmlns="" val="1"/>
+                <adec:decorative xmlns="" xmlns:adec="http://schemas.microsoft.com/office/drawing/2017/decorative" val="1"/>
               </a:ext>
             </a:extLst>
           </p:cNvPr>
@@ -36143,7 +36143,7 @@
                 <a16:creationId xmlns:a16="http://schemas.microsoft.com/office/drawing/2014/main" id="{A92A1116-1C84-41DF-B803-1F7B0883EC82}"/>
               </a:ext>
               <a:ext uri="{C183D7F6-B498-43B3-948B-1728B52AA6E4}">
-                <adec:decorative xmlns:adec="http://schemas.microsoft.com/office/drawing/2017/decorative" xmlns="" val="1"/>
+                <adec:decorative xmlns="" xmlns:adec="http://schemas.microsoft.com/office/drawing/2017/decorative" val="1"/>
               </a:ext>
             </a:extLst>
           </p:cNvPr>

</xml_diff>